<commit_message>
Updated per Nick's comments
</commit_message>
<xml_diff>
--- a/Presentation/Basic Data and Analysis.pptx
+++ b/Presentation/Basic Data and Analysis.pptx
@@ -227,43 +227,35 @@
       </a:defRPr>
     </a:lvl9pPr>
   </p:defaultTextStyle>
+  <p:extLst>
+    <p:ext uri="{EFAFB233-063F-42B5-8137-9DF3F51BA10A}">
+      <p15:sldGuideLst xmlns:p15="http://schemas.microsoft.com/office/powerpoint/2012/main"/>
+    </p:ext>
+  </p:extLst>
 </p:presentation>
 </file>
 
 <file path=ppt/commentAuthors.xml><?xml version="1.0" encoding="utf-8"?>
 <p:cmAuthorLst xmlns:a="http://schemas.openxmlformats.org/drawingml/2006/main" xmlns:r="http://schemas.openxmlformats.org/officeDocument/2006/relationships" xmlns:p="http://schemas.openxmlformats.org/presentationml/2006/main">
   <p:cmAuthor id="1" name="Nicholas Chen" initials="NC" lastIdx="1" clrIdx="0">
+    <p:extLst/>
+  </p:cmAuthor>
+  <p:cmAuthor id="2" name="Nicholas Chen" initials="NC [2]" lastIdx="1" clrIdx="1">
+    <p:extLst/>
+  </p:cmAuthor>
+  <p:cmAuthor id="3" name="Nicholas Chen" initials="NC [3]" lastIdx="1" clrIdx="2">
+    <p:extLst/>
+  </p:cmAuthor>
+  <p:cmAuthor id="4" name="Nicholas Chen" initials="NC [4]" lastIdx="1" clrIdx="3">
+    <p:extLst/>
+  </p:cmAuthor>
+  <p:cmAuthor id="5" name="Nicholas Chen" initials="NC [5]" lastIdx="1" clrIdx="4">
+    <p:extLst/>
+  </p:cmAuthor>
+  <p:cmAuthor id="6" name="L Teo" initials="LT" lastIdx="1" clrIdx="5">
     <p:extLst>
       <p:ext uri="{19B8F6BF-5375-455C-9EA6-DF929625EA0E}">
-        <p15:presenceInfo xmlns:p15="http://schemas.microsoft.com/office/powerpoint/2012/main" userId="" providerId=""/>
-      </p:ext>
-    </p:extLst>
-  </p:cmAuthor>
-  <p:cmAuthor id="2" name="Nicholas Chen" initials="NC [2]" lastIdx="1" clrIdx="1">
-    <p:extLst>
-      <p:ext uri="{19B8F6BF-5375-455C-9EA6-DF929625EA0E}">
-        <p15:presenceInfo xmlns:p15="http://schemas.microsoft.com/office/powerpoint/2012/main" userId="" providerId=""/>
-      </p:ext>
-    </p:extLst>
-  </p:cmAuthor>
-  <p:cmAuthor id="3" name="Nicholas Chen" initials="NC [3]" lastIdx="1" clrIdx="2">
-    <p:extLst>
-      <p:ext uri="{19B8F6BF-5375-455C-9EA6-DF929625EA0E}">
-        <p15:presenceInfo xmlns:p15="http://schemas.microsoft.com/office/powerpoint/2012/main" userId="" providerId=""/>
-      </p:ext>
-    </p:extLst>
-  </p:cmAuthor>
-  <p:cmAuthor id="4" name="Nicholas Chen" initials="NC [4]" lastIdx="1" clrIdx="3">
-    <p:extLst>
-      <p:ext uri="{19B8F6BF-5375-455C-9EA6-DF929625EA0E}">
-        <p15:presenceInfo xmlns:p15="http://schemas.microsoft.com/office/powerpoint/2012/main" userId="" providerId=""/>
-      </p:ext>
-    </p:extLst>
-  </p:cmAuthor>
-  <p:cmAuthor id="5" name="Nicholas Chen" initials="NC [5]" lastIdx="1" clrIdx="4">
-    <p:extLst>
-      <p:ext uri="{19B8F6BF-5375-455C-9EA6-DF929625EA0E}">
-        <p15:presenceInfo xmlns:p15="http://schemas.microsoft.com/office/powerpoint/2012/main" userId="" providerId=""/>
+        <p15:presenceInfo xmlns:p15="http://schemas.microsoft.com/office/powerpoint/2012/main" userId="f03b176214deead3" providerId="Windows Live"/>
       </p:ext>
     </p:extLst>
   </p:cmAuthor>
@@ -271,29 +263,6 @@
 </file>
 
 <file path=ppt/comments/comment1.xml><?xml version="1.0" encoding="utf-8"?>
-<p:cmLst xmlns:a="http://schemas.openxmlformats.org/drawingml/2006/main" xmlns:r="http://schemas.openxmlformats.org/officeDocument/2006/relationships" xmlns:p="http://schemas.openxmlformats.org/presentationml/2006/main">
-  <p:cm authorId="4" dt="2017-04-16T17:27:08.829" idx="1">
-    <p:pos x="630" y="918"/>
-    <p:text>What do the 0 and 1 flags mean here? Can you replace with labels 'No Response' and 'Positive Response'?</p:text>
-    <p:extLst>
-      <p:ext uri="{C676402C-5697-4E1C-873F-D02D1690AC5C}">
-        <p15:threadingInfo xmlns:p15="http://schemas.microsoft.com/office/powerpoint/2012/main" timeZoneBias="360"/>
-      </p:ext>
-    </p:extLst>
-  </p:cm>
-  <p:cm authorId="5" dt="2017-04-16T17:27:39.191" idx="1">
-    <p:pos x="1112" y="1393"/>
-    <p:text>Same comment here, can you please replace the 0 and 1 with labels (male/female and response/no response)?</p:text>
-    <p:extLst>
-      <p:ext uri="{C676402C-5697-4E1C-873F-D02D1690AC5C}">
-        <p15:threadingInfo xmlns:p15="http://schemas.microsoft.com/office/powerpoint/2012/main" timeZoneBias="360"/>
-      </p:ext>
-    </p:extLst>
-  </p:cm>
-</p:cmLst>
-</file>
-
-<file path=ppt/comments/comment2.xml><?xml version="1.0" encoding="utf-8"?>
 <p:cmLst xmlns:a="http://schemas.openxmlformats.org/drawingml/2006/main" xmlns:r="http://schemas.openxmlformats.org/officeDocument/2006/relationships" xmlns:p="http://schemas.openxmlformats.org/presentationml/2006/main">
   <p:cm authorId="1" dt="2017-04-16T17:24:11.781" idx="1">
     <p:pos x="950" y="1440"/>
@@ -304,10 +273,21 @@
       </p:ext>
     </p:extLst>
   </p:cm>
+  <p:cm authorId="6" dt="2017-04-17T21:50:21.131" idx="1">
+    <p:pos x="950" y="1536"/>
+    <p:text>I tried different versions, but here treatment is 1 for low, 2 for high</p:text>
+    <p:extLst>
+      <p:ext uri="{C676402C-5697-4E1C-873F-D02D1690AC5C}">
+        <p15:threadingInfo xmlns:p15="http://schemas.microsoft.com/office/powerpoint/2012/main" timeZoneBias="-480">
+          <p15:parentCm authorId="1" idx="1"/>
+        </p15:threadingInfo>
+      </p:ext>
+    </p:extLst>
+  </p:cm>
 </p:cmLst>
 </file>
 
-<file path=ppt/comments/comment3.xml><?xml version="1.0" encoding="utf-8"?>
+<file path=ppt/comments/comment2.xml><?xml version="1.0" encoding="utf-8"?>
 <p:cmLst xmlns:a="http://schemas.openxmlformats.org/drawingml/2006/main" xmlns:r="http://schemas.openxmlformats.org/officeDocument/2006/relationships" xmlns:p="http://schemas.openxmlformats.org/presentationml/2006/main">
   <p:cm authorId="2" dt="2017-04-16T17:24:43.720" idx="1">
     <p:pos x="770" y="1433"/>
@@ -321,7 +301,7 @@
 </p:cmLst>
 </file>
 
-<file path=ppt/comments/comment4.xml><?xml version="1.0" encoding="utf-8"?>
+<file path=ppt/comments/comment3.xml><?xml version="1.0" encoding="utf-8"?>
 <p:cmLst xmlns:a="http://schemas.openxmlformats.org/drawingml/2006/main" xmlns:r="http://schemas.openxmlformats.org/officeDocument/2006/relationships" xmlns:p="http://schemas.openxmlformats.org/presentationml/2006/main">
   <p:cm authorId="3" dt="2017-04-16T17:25:46.519" idx="1">
     <p:pos x="1875" y="335"/>
@@ -1188,7 +1168,7 @@
           </a:lstStyle>
           <a:p>
             <a:r>
-              <a:rPr lang="en-US" smtClean="0"/>
+              <a:rPr lang="en-US"/>
               <a:t>Click to edit Master title style</a:t>
             </a:r>
             <a:endParaRPr lang="en-US" dirty="0"/>
@@ -1261,7 +1241,7 @@
           </a:lstStyle>
           <a:p>
             <a:r>
-              <a:rPr lang="en-US" smtClean="0"/>
+              <a:rPr lang="en-US"/>
               <a:t>Click to edit Master subtitle style</a:t>
             </a:r>
             <a:endParaRPr lang="en-US" dirty="0"/>
@@ -1295,7 +1275,7 @@
           <a:p>
             <a:fld id="{1160EA64-D806-43AC-9DF2-F8C432F32B4C}" type="datetimeFigureOut">
               <a:rPr lang="en-US" smtClean="0"/>
-              <a:t>4/16/17</a:t>
+              <a:t>4/17/2017</a:t>
             </a:fld>
             <a:endParaRPr lang="en-US" dirty="0"/>
           </a:p>
@@ -1462,7 +1442,7 @@
           <a:lstStyle/>
           <a:p>
             <a:r>
-              <a:rPr lang="en-US" smtClean="0"/>
+              <a:rPr lang="en-US"/>
               <a:t>Click to edit Master title style</a:t>
             </a:r>
             <a:endParaRPr lang="en-US" dirty="0"/>
@@ -1486,35 +1466,35 @@
           <a:p>
             <a:pPr lvl="0"/>
             <a:r>
-              <a:rPr lang="en-US" smtClean="0"/>
+              <a:rPr lang="en-US"/>
               <a:t>Click to edit Master text styles</a:t>
             </a:r>
           </a:p>
           <a:p>
             <a:pPr lvl="1"/>
             <a:r>
-              <a:rPr lang="en-US" smtClean="0"/>
+              <a:rPr lang="en-US"/>
               <a:t>Second level</a:t>
             </a:r>
           </a:p>
           <a:p>
             <a:pPr lvl="2"/>
             <a:r>
-              <a:rPr lang="en-US" smtClean="0"/>
+              <a:rPr lang="en-US"/>
               <a:t>Third level</a:t>
             </a:r>
           </a:p>
           <a:p>
             <a:pPr lvl="3"/>
             <a:r>
-              <a:rPr lang="en-US" smtClean="0"/>
+              <a:rPr lang="en-US"/>
               <a:t>Fourth level</a:t>
             </a:r>
           </a:p>
           <a:p>
             <a:pPr lvl="4"/>
             <a:r>
-              <a:rPr lang="en-US" smtClean="0"/>
+              <a:rPr lang="en-US"/>
               <a:t>Fifth level</a:t>
             </a:r>
             <a:endParaRPr lang="en-US" dirty="0"/>
@@ -1538,7 +1518,7 @@
           <a:p>
             <a:fld id="{E9F9C37B-1D36-470B-8223-D6C91242EC14}" type="datetimeFigureOut">
               <a:rPr lang="en-US" smtClean="0"/>
-              <a:t>4/16/17</a:t>
+              <a:t>4/17/2017</a:t>
             </a:fld>
             <a:endParaRPr lang="en-US" dirty="0"/>
           </a:p>
@@ -1652,7 +1632,7 @@
           <a:lstStyle/>
           <a:p>
             <a:r>
-              <a:rPr lang="en-US" smtClean="0"/>
+              <a:rPr lang="en-US"/>
               <a:t>Click to edit Master title style</a:t>
             </a:r>
             <a:endParaRPr lang="en-US" dirty="0"/>
@@ -1681,35 +1661,35 @@
           <a:p>
             <a:pPr lvl="0"/>
             <a:r>
-              <a:rPr lang="en-US" smtClean="0"/>
+              <a:rPr lang="en-US"/>
               <a:t>Click to edit Master text styles</a:t>
             </a:r>
           </a:p>
           <a:p>
             <a:pPr lvl="1"/>
             <a:r>
-              <a:rPr lang="en-US" smtClean="0"/>
+              <a:rPr lang="en-US"/>
               <a:t>Second level</a:t>
             </a:r>
           </a:p>
           <a:p>
             <a:pPr lvl="2"/>
             <a:r>
-              <a:rPr lang="en-US" smtClean="0"/>
+              <a:rPr lang="en-US"/>
               <a:t>Third level</a:t>
             </a:r>
           </a:p>
           <a:p>
             <a:pPr lvl="3"/>
             <a:r>
-              <a:rPr lang="en-US" smtClean="0"/>
+              <a:rPr lang="en-US"/>
               <a:t>Fourth level</a:t>
             </a:r>
           </a:p>
           <a:p>
             <a:pPr lvl="4"/>
             <a:r>
-              <a:rPr lang="en-US" smtClean="0"/>
+              <a:rPr lang="en-US"/>
               <a:t>Fifth level</a:t>
             </a:r>
             <a:endParaRPr lang="en-US" dirty="0"/>
@@ -1733,7 +1713,7 @@
           <a:p>
             <a:fld id="{67C6F52A-A82B-47A2-A83A-8C4C91F2D59F}" type="datetimeFigureOut">
               <a:rPr lang="en-US" smtClean="0"/>
-              <a:t>4/16/17</a:t>
+              <a:t>4/17/2017</a:t>
             </a:fld>
             <a:endParaRPr lang="en-US" dirty="0"/>
           </a:p>
@@ -2235,7 +2215,7 @@
           <a:lstStyle/>
           <a:p>
             <a:r>
-              <a:rPr lang="en-US" smtClean="0"/>
+              <a:rPr lang="en-US"/>
               <a:t>Click to edit Master title style</a:t>
             </a:r>
             <a:endParaRPr lang="en-US" dirty="0"/>
@@ -2259,35 +2239,35 @@
           <a:p>
             <a:pPr lvl="0"/>
             <a:r>
-              <a:rPr lang="en-US" smtClean="0"/>
+              <a:rPr lang="en-US"/>
               <a:t>Click to edit Master text styles</a:t>
             </a:r>
           </a:p>
           <a:p>
             <a:pPr lvl="1"/>
             <a:r>
-              <a:rPr lang="en-US" smtClean="0"/>
+              <a:rPr lang="en-US"/>
               <a:t>Second level</a:t>
             </a:r>
           </a:p>
           <a:p>
             <a:pPr lvl="2"/>
             <a:r>
-              <a:rPr lang="en-US" smtClean="0"/>
+              <a:rPr lang="en-US"/>
               <a:t>Third level</a:t>
             </a:r>
           </a:p>
           <a:p>
             <a:pPr lvl="3"/>
             <a:r>
-              <a:rPr lang="en-US" smtClean="0"/>
+              <a:rPr lang="en-US"/>
               <a:t>Fourth level</a:t>
             </a:r>
           </a:p>
           <a:p>
             <a:pPr lvl="4"/>
             <a:r>
-              <a:rPr lang="en-US" smtClean="0"/>
+              <a:rPr lang="en-US"/>
               <a:t>Fifth level</a:t>
             </a:r>
             <a:endParaRPr lang="en-US" dirty="0"/>
@@ -2311,7 +2291,7 @@
           <a:p>
             <a:fld id="{F070A7B3-6521-4DCA-87E5-044747A908C1}" type="datetimeFigureOut">
               <a:rPr lang="en-US" smtClean="0"/>
-              <a:t>4/16/17</a:t>
+              <a:t>4/17/2017</a:t>
             </a:fld>
             <a:endParaRPr lang="en-US" dirty="0"/>
           </a:p>
@@ -2434,7 +2414,7 @@
           </a:lstStyle>
           <a:p>
             <a:r>
-              <a:rPr lang="en-US" smtClean="0"/>
+              <a:rPr lang="en-US"/>
               <a:t>Click to edit Master title style</a:t>
             </a:r>
             <a:endParaRPr lang="en-US" dirty="0"/>
@@ -2557,7 +2537,7 @@
           <a:p>
             <a:pPr lvl="0"/>
             <a:r>
-              <a:rPr lang="en-US" smtClean="0"/>
+              <a:rPr lang="en-US"/>
               <a:t>Click to edit Master text styles</a:t>
             </a:r>
           </a:p>
@@ -2580,7 +2560,7 @@
           <a:p>
             <a:fld id="{1160EA64-D806-43AC-9DF2-F8C432F32B4C}" type="datetimeFigureOut">
               <a:rPr lang="en-US" smtClean="0"/>
-              <a:t>4/16/17</a:t>
+              <a:t>4/17/2017</a:t>
             </a:fld>
             <a:endParaRPr lang="en-US" dirty="0"/>
           </a:p>
@@ -2727,7 +2707,7 @@
           <a:lstStyle/>
           <a:p>
             <a:r>
-              <a:rPr lang="en-US" smtClean="0"/>
+              <a:rPr lang="en-US"/>
               <a:t>Click to edit Master title style</a:t>
             </a:r>
             <a:endParaRPr lang="en-US" dirty="0"/>
@@ -2784,35 +2764,35 @@
           <a:p>
             <a:pPr lvl="0"/>
             <a:r>
-              <a:rPr lang="en-US" smtClean="0"/>
+              <a:rPr lang="en-US"/>
               <a:t>Click to edit Master text styles</a:t>
             </a:r>
           </a:p>
           <a:p>
             <a:pPr lvl="1"/>
             <a:r>
-              <a:rPr lang="en-US" smtClean="0"/>
+              <a:rPr lang="en-US"/>
               <a:t>Second level</a:t>
             </a:r>
           </a:p>
           <a:p>
             <a:pPr lvl="2"/>
             <a:r>
-              <a:rPr lang="en-US" smtClean="0"/>
+              <a:rPr lang="en-US"/>
               <a:t>Third level</a:t>
             </a:r>
           </a:p>
           <a:p>
             <a:pPr lvl="3"/>
             <a:r>
-              <a:rPr lang="en-US" smtClean="0"/>
+              <a:rPr lang="en-US"/>
               <a:t>Fourth level</a:t>
             </a:r>
           </a:p>
           <a:p>
             <a:pPr lvl="4"/>
             <a:r>
-              <a:rPr lang="en-US" smtClean="0"/>
+              <a:rPr lang="en-US"/>
               <a:t>Fifth level</a:t>
             </a:r>
             <a:endParaRPr lang="en-US" dirty="0"/>
@@ -2869,35 +2849,35 @@
           <a:p>
             <a:pPr lvl="0"/>
             <a:r>
-              <a:rPr lang="en-US" smtClean="0"/>
+              <a:rPr lang="en-US"/>
               <a:t>Click to edit Master text styles</a:t>
             </a:r>
           </a:p>
           <a:p>
             <a:pPr lvl="1"/>
             <a:r>
-              <a:rPr lang="en-US" smtClean="0"/>
+              <a:rPr lang="en-US"/>
               <a:t>Second level</a:t>
             </a:r>
           </a:p>
           <a:p>
             <a:pPr lvl="2"/>
             <a:r>
-              <a:rPr lang="en-US" smtClean="0"/>
+              <a:rPr lang="en-US"/>
               <a:t>Third level</a:t>
             </a:r>
           </a:p>
           <a:p>
             <a:pPr lvl="3"/>
             <a:r>
-              <a:rPr lang="en-US" smtClean="0"/>
+              <a:rPr lang="en-US"/>
               <a:t>Fourth level</a:t>
             </a:r>
           </a:p>
           <a:p>
             <a:pPr lvl="4"/>
             <a:r>
-              <a:rPr lang="en-US" smtClean="0"/>
+              <a:rPr lang="en-US"/>
               <a:t>Fifth level</a:t>
             </a:r>
             <a:endParaRPr lang="en-US" dirty="0"/>
@@ -2921,7 +2901,7 @@
           <a:p>
             <a:fld id="{AB134690-1557-4C89-A502-4959FE7FAD70}" type="datetimeFigureOut">
               <a:rPr lang="en-US" smtClean="0"/>
-              <a:t>4/16/17</a:t>
+              <a:t>4/17/2017</a:t>
             </a:fld>
             <a:endParaRPr lang="en-US" dirty="0"/>
           </a:p>
@@ -3030,7 +3010,7 @@
           <a:lstStyle/>
           <a:p>
             <a:r>
-              <a:rPr lang="en-US" smtClean="0"/>
+              <a:rPr lang="en-US"/>
               <a:t>Click to edit Master title style</a:t>
             </a:r>
             <a:endParaRPr lang="en-US" dirty="0"/>
@@ -3105,7 +3085,7 @@
           <a:p>
             <a:pPr lvl="0"/>
             <a:r>
-              <a:rPr lang="en-US" smtClean="0"/>
+              <a:rPr lang="en-US"/>
               <a:t>Click to edit Master text styles</a:t>
             </a:r>
           </a:p>
@@ -3161,35 +3141,35 @@
           <a:p>
             <a:pPr lvl="0"/>
             <a:r>
-              <a:rPr lang="en-US" smtClean="0"/>
+              <a:rPr lang="en-US"/>
               <a:t>Click to edit Master text styles</a:t>
             </a:r>
           </a:p>
           <a:p>
             <a:pPr lvl="1"/>
             <a:r>
-              <a:rPr lang="en-US" smtClean="0"/>
+              <a:rPr lang="en-US"/>
               <a:t>Second level</a:t>
             </a:r>
           </a:p>
           <a:p>
             <a:pPr lvl="2"/>
             <a:r>
-              <a:rPr lang="en-US" smtClean="0"/>
+              <a:rPr lang="en-US"/>
               <a:t>Third level</a:t>
             </a:r>
           </a:p>
           <a:p>
             <a:pPr lvl="3"/>
             <a:r>
-              <a:rPr lang="en-US" smtClean="0"/>
+              <a:rPr lang="en-US"/>
               <a:t>Fourth level</a:t>
             </a:r>
           </a:p>
           <a:p>
             <a:pPr lvl="4"/>
             <a:r>
-              <a:rPr lang="en-US" smtClean="0"/>
+              <a:rPr lang="en-US"/>
               <a:t>Fifth level</a:t>
             </a:r>
             <a:endParaRPr lang="en-US" dirty="0"/>
@@ -3279,7 +3259,7 @@
               <a:buNone/>
             </a:pPr>
             <a:r>
-              <a:rPr lang="en-US" smtClean="0"/>
+              <a:rPr lang="en-US"/>
               <a:t>Click to edit Master text styles</a:t>
             </a:r>
           </a:p>
@@ -3335,35 +3315,35 @@
           <a:p>
             <a:pPr lvl="0"/>
             <a:r>
-              <a:rPr lang="en-US" smtClean="0"/>
+              <a:rPr lang="en-US"/>
               <a:t>Click to edit Master text styles</a:t>
             </a:r>
           </a:p>
           <a:p>
             <a:pPr lvl="1"/>
             <a:r>
-              <a:rPr lang="en-US" smtClean="0"/>
+              <a:rPr lang="en-US"/>
               <a:t>Second level</a:t>
             </a:r>
           </a:p>
           <a:p>
             <a:pPr lvl="2"/>
             <a:r>
-              <a:rPr lang="en-US" smtClean="0"/>
+              <a:rPr lang="en-US"/>
               <a:t>Third level</a:t>
             </a:r>
           </a:p>
           <a:p>
             <a:pPr lvl="3"/>
             <a:r>
-              <a:rPr lang="en-US" smtClean="0"/>
+              <a:rPr lang="en-US"/>
               <a:t>Fourth level</a:t>
             </a:r>
           </a:p>
           <a:p>
             <a:pPr lvl="4"/>
             <a:r>
-              <a:rPr lang="en-US" smtClean="0"/>
+              <a:rPr lang="en-US"/>
               <a:t>Fifth level</a:t>
             </a:r>
             <a:endParaRPr lang="en-US" dirty="0"/>
@@ -3387,7 +3367,7 @@
           <a:p>
             <a:fld id="{4F7D4976-E339-4826-83B7-FBD03F55ECF8}" type="datetimeFigureOut">
               <a:rPr lang="en-US" smtClean="0"/>
-              <a:t>4/16/17</a:t>
+              <a:t>4/17/2017</a:t>
             </a:fld>
             <a:endParaRPr lang="en-US" dirty="0"/>
           </a:p>
@@ -3496,7 +3476,7 @@
           <a:lstStyle/>
           <a:p>
             <a:r>
-              <a:rPr lang="en-US" smtClean="0"/>
+              <a:rPr lang="en-US"/>
               <a:t>Click to edit Master title style</a:t>
             </a:r>
             <a:endParaRPr lang="en-US" dirty="0"/>
@@ -3520,7 +3500,7 @@
           <a:p>
             <a:fld id="{E1037C31-9E7A-4F99-8774-A0E530DE1A42}" type="datetimeFigureOut">
               <a:rPr lang="en-US" smtClean="0"/>
-              <a:t>4/16/17</a:t>
+              <a:t>4/17/2017</a:t>
             </a:fld>
             <a:endParaRPr lang="en-US" dirty="0"/>
           </a:p>
@@ -3630,7 +3610,7 @@
           <a:p>
             <a:fld id="{C278504F-A551-4DE0-9316-4DCD1D8CC752}" type="datetimeFigureOut">
               <a:rPr lang="en-US" smtClean="0"/>
-              <a:t>4/16/17</a:t>
+              <a:t>4/17/2017</a:t>
             </a:fld>
             <a:endParaRPr lang="en-US" dirty="0"/>
           </a:p>
@@ -3741,7 +3721,7 @@
           </a:lstStyle>
           <a:p>
             <a:r>
-              <a:rPr lang="en-US" smtClean="0"/>
+              <a:rPr lang="en-US"/>
               <a:t>Click to edit Master title style</a:t>
             </a:r>
             <a:endParaRPr lang="en-US" dirty="0"/>
@@ -3798,35 +3778,35 @@
           <a:p>
             <a:pPr lvl="0"/>
             <a:r>
-              <a:rPr lang="en-US" smtClean="0"/>
+              <a:rPr lang="en-US"/>
               <a:t>Click to edit Master text styles</a:t>
             </a:r>
           </a:p>
           <a:p>
             <a:pPr lvl="1"/>
             <a:r>
-              <a:rPr lang="en-US" smtClean="0"/>
+              <a:rPr lang="en-US"/>
               <a:t>Second level</a:t>
             </a:r>
           </a:p>
           <a:p>
             <a:pPr lvl="2"/>
             <a:r>
-              <a:rPr lang="en-US" smtClean="0"/>
+              <a:rPr lang="en-US"/>
               <a:t>Third level</a:t>
             </a:r>
           </a:p>
           <a:p>
             <a:pPr lvl="3"/>
             <a:r>
-              <a:rPr lang="en-US" smtClean="0"/>
+              <a:rPr lang="en-US"/>
               <a:t>Fourth level</a:t>
             </a:r>
           </a:p>
           <a:p>
             <a:pPr lvl="4"/>
             <a:r>
-              <a:rPr lang="en-US" smtClean="0"/>
+              <a:rPr lang="en-US"/>
               <a:t>Fifth level</a:t>
             </a:r>
             <a:endParaRPr lang="en-US" dirty="0"/>
@@ -3900,7 +3880,7 @@
           <a:p>
             <a:pPr lvl="0"/>
             <a:r>
-              <a:rPr lang="en-US" smtClean="0"/>
+              <a:rPr lang="en-US"/>
               <a:t>Click to edit Master text styles</a:t>
             </a:r>
           </a:p>
@@ -3923,7 +3903,7 @@
           <a:p>
             <a:fld id="{D1BE4249-C0D0-4B06-8692-E8BB871AF643}" type="datetimeFigureOut">
               <a:rPr lang="en-US" smtClean="0"/>
-              <a:t>4/16/17</a:t>
+              <a:t>4/17/2017</a:t>
             </a:fld>
             <a:endParaRPr lang="en-US" dirty="0"/>
           </a:p>
@@ -4085,7 +4065,7 @@
           </a:lstStyle>
           <a:p>
             <a:r>
-              <a:rPr lang="en-US" smtClean="0"/>
+              <a:rPr lang="en-US"/>
               <a:t>Click to edit Master title style</a:t>
             </a:r>
             <a:endParaRPr lang="en-US" dirty="0"/>
@@ -4157,7 +4137,7 @@
           </a:lstStyle>
           <a:p>
             <a:r>
-              <a:rPr lang="en-US" smtClean="0"/>
+              <a:rPr lang="en-US"/>
               <a:t>Drag picture to placeholder or click icon to add</a:t>
             </a:r>
             <a:endParaRPr lang="en-US" dirty="0"/>
@@ -4237,7 +4217,7 @@
           <a:p>
             <a:pPr lvl="0"/>
             <a:r>
-              <a:rPr lang="en-US" smtClean="0"/>
+              <a:rPr lang="en-US"/>
               <a:t>Click to edit Master text styles</a:t>
             </a:r>
           </a:p>
@@ -4260,7 +4240,7 @@
           <a:p>
             <a:fld id="{042B0DB6-F5C7-45FB-8CF3-31B45F9C2DAC}" type="datetimeFigureOut">
               <a:rPr lang="en-US" smtClean="0"/>
-              <a:t>4/16/17</a:t>
+              <a:t>4/17/2017</a:t>
             </a:fld>
             <a:endParaRPr lang="en-US" dirty="0"/>
           </a:p>
@@ -4424,7 +4404,7 @@
           <a:lstStyle/>
           <a:p>
             <a:r>
-              <a:rPr lang="en-US" smtClean="0"/>
+              <a:rPr lang="en-US"/>
               <a:t>Click to edit Master title style</a:t>
             </a:r>
             <a:endParaRPr lang="en-US" dirty="0"/>
@@ -4458,35 +4438,35 @@
           <a:p>
             <a:pPr lvl="0"/>
             <a:r>
-              <a:rPr lang="en-US" smtClean="0"/>
+              <a:rPr lang="en-US"/>
               <a:t>Click to edit Master text styles</a:t>
             </a:r>
           </a:p>
           <a:p>
             <a:pPr lvl="1"/>
             <a:r>
-              <a:rPr lang="en-US" smtClean="0"/>
+              <a:rPr lang="en-US"/>
               <a:t>Second level</a:t>
             </a:r>
           </a:p>
           <a:p>
             <a:pPr lvl="2"/>
             <a:r>
-              <a:rPr lang="en-US" smtClean="0"/>
+              <a:rPr lang="en-US"/>
               <a:t>Third level</a:t>
             </a:r>
           </a:p>
           <a:p>
             <a:pPr lvl="3"/>
             <a:r>
-              <a:rPr lang="en-US" smtClean="0"/>
+              <a:rPr lang="en-US"/>
               <a:t>Fourth level</a:t>
             </a:r>
           </a:p>
           <a:p>
             <a:pPr lvl="4"/>
             <a:r>
-              <a:rPr lang="en-US" smtClean="0"/>
+              <a:rPr lang="en-US"/>
               <a:t>Fifth level</a:t>
             </a:r>
             <a:endParaRPr lang="en-US" dirty="0"/>
@@ -4529,7 +4509,7 @@
           <a:p>
             <a:fld id="{1160EA64-D806-43AC-9DF2-F8C432F32B4C}" type="datetimeFigureOut">
               <a:rPr lang="en-US" smtClean="0"/>
-              <a:t>4/16/17</a:t>
+              <a:t>4/17/2017</a:t>
             </a:fld>
             <a:endParaRPr lang="en-US" dirty="0"/>
           </a:p>
@@ -5055,52 +5035,44 @@
           <a:lstStyle/>
           <a:p>
             <a:r>
-              <a:rPr lang="en-US" dirty="0" smtClean="0"/>
+              <a:rPr lang="en-US" dirty="0"/>
               <a:t>Effect of Exclamation Points on Rental Market Outcomes</a:t>
             </a:r>
             <a:br>
-              <a:rPr lang="en-US" dirty="0" smtClean="0"/>
+              <a:rPr lang="en-US" dirty="0"/>
             </a:br>
-            <a:r>
-              <a:rPr lang="en-US" dirty="0" smtClean="0"/>
-              <a:t/>
-            </a:r>
             <a:br>
-              <a:rPr lang="en-US" dirty="0" smtClean="0"/>
+              <a:rPr lang="en-US" dirty="0"/>
             </a:br>
             <a:r>
-              <a:rPr lang="en-US" sz="1600" dirty="0" smtClean="0"/>
+              <a:rPr lang="en-US" sz="1600" dirty="0"/>
               <a:t>Chris </a:t>
             </a:r>
             <a:r>
-              <a:rPr lang="en-US" sz="1600" dirty="0" err="1" smtClean="0"/>
+              <a:rPr lang="en-US" sz="1600" dirty="0" err="1"/>
               <a:t>Mcpherson</a:t>
             </a:r>
             <a:r>
-              <a:rPr lang="en-US" sz="1600" dirty="0" smtClean="0"/>
+              <a:rPr lang="en-US" sz="1600" dirty="0"/>
               <a:t> | Leslie </a:t>
             </a:r>
             <a:r>
-              <a:rPr lang="en-US" sz="1600" dirty="0" err="1" smtClean="0"/>
+              <a:rPr lang="en-US" sz="1600" dirty="0" err="1"/>
               <a:t>Teo</a:t>
             </a:r>
             <a:r>
-              <a:rPr lang="en-US" sz="1600" dirty="0" smtClean="0"/>
+              <a:rPr lang="en-US" sz="1600" dirty="0"/>
               <a:t> | Nicholas Chen | Paul </a:t>
             </a:r>
             <a:r>
-              <a:rPr lang="en-US" sz="1600" dirty="0" err="1" smtClean="0"/>
+              <a:rPr lang="en-US" sz="1600" dirty="0" err="1"/>
               <a:t>Varjan</a:t>
             </a:r>
-            <a:r>
-              <a:rPr lang="en-US" sz="1600" dirty="0" smtClean="0"/>
-              <a:t/>
-            </a:r>
             <a:br>
-              <a:rPr lang="en-US" sz="1600" dirty="0" smtClean="0"/>
+              <a:rPr lang="en-US" sz="1600" dirty="0"/>
             </a:br>
             <a:r>
-              <a:rPr lang="en-US" sz="1600" i="1" dirty="0" smtClean="0"/>
+              <a:rPr lang="en-US" sz="1600" i="1" dirty="0"/>
               <a:t>w241 Final Project</a:t>
             </a:r>
             <a:endParaRPr lang="en-US" sz="3200" dirty="0"/>
@@ -5190,21 +5162,6 @@
               </a:rPr>
               <a:t># Model 2 - Treatment &amp; gender</a:t>
             </a:r>
-            <a:r>
-              <a:rPr lang="en" sz="1200" b="1">
-                <a:solidFill>
-                  <a:srgbClr val="333333"/>
-                </a:solidFill>
-                <a:highlight>
-                  <a:srgbClr val="F5F5F5"/>
-                </a:highlight>
-                <a:latin typeface="Courier New"/>
-                <a:ea typeface="Courier New"/>
-                <a:cs typeface="Courier New"/>
-                <a:sym typeface="Courier New"/>
-              </a:rPr>
-              <a:t/>
-            </a:r>
             <a:br>
               <a:rPr lang="en" sz="1200" b="1">
                 <a:solidFill>
@@ -5517,21 +5474,6 @@
                 <a:sym typeface="Courier New"/>
               </a:rPr>
             </a:br>
-            <a:r>
-              <a:rPr lang="en" sz="1200" b="1" dirty="0">
-                <a:solidFill>
-                  <a:srgbClr val="333333"/>
-                </a:solidFill>
-                <a:highlight>
-                  <a:srgbClr val="FFFFFF"/>
-                </a:highlight>
-                <a:latin typeface="Courier New"/>
-                <a:ea typeface="Courier New"/>
-                <a:cs typeface="Courier New"/>
-                <a:sym typeface="Courier New"/>
-              </a:rPr>
-              <a:t/>
-            </a:r>
             <a:br>
               <a:rPr lang="en" sz="1200" b="1" dirty="0">
                 <a:solidFill>
@@ -5795,6 +5737,79 @@
               </a:rPr>
               <a:t>. codes:  0 ‘***’ 0.001 ‘**’ 0.01 ‘*’ 0.05 ‘.’ 0.1 ‘ ’ 1</a:t>
             </a:r>
+          </a:p>
+          <a:p>
+            <a:pPr>
+              <a:lnSpc>
+                <a:spcPct val="142857"/>
+              </a:lnSpc>
+              <a:spcAft>
+                <a:spcPts val="800"/>
+              </a:spcAft>
+              <a:buClr>
+                <a:schemeClr val="dk1"/>
+              </a:buClr>
+              <a:buSzPct val="91666"/>
+              <a:buNone/>
+            </a:pPr>
+            <a:r>
+              <a:rPr lang="en-US" sz="1200" b="1" dirty="0">
+                <a:solidFill>
+                  <a:srgbClr val="333333"/>
+                </a:solidFill>
+                <a:highlight>
+                  <a:srgbClr val="FFFFFF"/>
+                </a:highlight>
+                <a:latin typeface="Courier New"/>
+                <a:ea typeface="Courier New"/>
+                <a:cs typeface="Courier New"/>
+                <a:sym typeface="Courier New"/>
+              </a:rPr>
+              <a:t>treatment variable is coded 2 for high, 1 for low, 0 for none</a:t>
+            </a:r>
+            <a:endParaRPr lang="en" sz="1200" b="1" dirty="0">
+              <a:solidFill>
+                <a:srgbClr val="333333"/>
+              </a:solidFill>
+              <a:highlight>
+                <a:srgbClr val="FFFFFF"/>
+              </a:highlight>
+              <a:latin typeface="Courier New"/>
+              <a:ea typeface="Courier New"/>
+              <a:cs typeface="Courier New"/>
+              <a:sym typeface="Courier New"/>
+            </a:endParaRPr>
+          </a:p>
+          <a:p>
+            <a:pPr lvl="0" rtl="0">
+              <a:lnSpc>
+                <a:spcPct val="142857"/>
+              </a:lnSpc>
+              <a:spcBef>
+                <a:spcPts val="0"/>
+              </a:spcBef>
+              <a:spcAft>
+                <a:spcPts val="800"/>
+              </a:spcAft>
+              <a:buClr>
+                <a:schemeClr val="dk1"/>
+              </a:buClr>
+              <a:buSzPct val="91666"/>
+              <a:buFont typeface="Arial"/>
+              <a:buNone/>
+            </a:pPr>
+            <a:endParaRPr lang="en" sz="1200" b="1" dirty="0">
+              <a:solidFill>
+                <a:srgbClr val="333333"/>
+              </a:solidFill>
+              <a:highlight>
+                <a:srgbClr val="FFFFFF"/>
+              </a:highlight>
+              <a:latin typeface="Courier New"/>
+              <a:ea typeface="Courier New"/>
+              <a:cs typeface="Courier New"/>
+              <a:sym typeface="Courier New"/>
+            </a:endParaRPr>
           </a:p>
           <a:p>
             <a:pPr lvl="0">
@@ -5886,7 +5901,7 @@
               <a:t># Model 4 - Treatment &amp; </a:t>
             </a:r>
             <a:r>
-              <a:rPr lang="en" sz="1200" b="1" dirty="0" err="1" smtClean="0">
+              <a:rPr lang="en" sz="1200" b="1" dirty="0" err="1">
                 <a:solidFill>
                   <a:srgbClr val="4C886B"/>
                 </a:solidFill>
@@ -5901,7 +5916,7 @@
               <a:t>ge</a:t>
             </a:r>
             <a:r>
-              <a:rPr lang="en-US" sz="1200" b="1" dirty="0" smtClean="0">
+              <a:rPr lang="en-US" sz="1200" b="1" dirty="0">
                 <a:solidFill>
                   <a:srgbClr val="4C886B"/>
                 </a:solidFill>
@@ -5916,7 +5931,7 @@
               <a:t>n</a:t>
             </a:r>
             <a:r>
-              <a:rPr lang="en" sz="1200" b="1" dirty="0" smtClean="0">
+              <a:rPr lang="en" sz="1200" b="1" dirty="0">
                 <a:solidFill>
                   <a:srgbClr val="4C886B"/>
                 </a:solidFill>
@@ -5928,37 +5943,7 @@
                 <a:cs typeface="Courier New"/>
                 <a:sym typeface="Courier New"/>
               </a:rPr>
-              <a:t>der </a:t>
-            </a:r>
-            <a:r>
-              <a:rPr lang="en" sz="1200" b="1" dirty="0">
-                <a:solidFill>
-                  <a:srgbClr val="4C886B"/>
-                </a:solidFill>
-                <a:highlight>
-                  <a:srgbClr val="F5F5F5"/>
-                </a:highlight>
-                <a:latin typeface="Courier New"/>
-                <a:ea typeface="Courier New"/>
-                <a:cs typeface="Courier New"/>
-                <a:sym typeface="Courier New"/>
-              </a:rPr>
-              <a:t>+ covariates</a:t>
-            </a:r>
-            <a:r>
-              <a:rPr lang="en" sz="1200" b="1" dirty="0">
-                <a:solidFill>
-                  <a:srgbClr val="333333"/>
-                </a:solidFill>
-                <a:highlight>
-                  <a:srgbClr val="F5F5F5"/>
-                </a:highlight>
-                <a:latin typeface="Courier New"/>
-                <a:ea typeface="Courier New"/>
-                <a:cs typeface="Courier New"/>
-                <a:sym typeface="Courier New"/>
-              </a:rPr>
-              <a:t/>
+              <a:t>der + covariates</a:t>
             </a:r>
             <a:br>
               <a:rPr lang="en" sz="1200" b="1" dirty="0">
@@ -6407,21 +6392,6 @@
                 <a:sym typeface="Courier New"/>
               </a:rPr>
             </a:br>
-            <a:r>
-              <a:rPr lang="en" sz="1200" b="1">
-                <a:solidFill>
-                  <a:srgbClr val="333333"/>
-                </a:solidFill>
-                <a:highlight>
-                  <a:srgbClr val="FFFFFF"/>
-                </a:highlight>
-                <a:latin typeface="Courier New"/>
-                <a:ea typeface="Courier New"/>
-                <a:cs typeface="Courier New"/>
-                <a:sym typeface="Courier New"/>
-              </a:rPr>
-              <a:t/>
-            </a:r>
             <a:br>
               <a:rPr lang="en" sz="1200" b="1">
                 <a:solidFill>
@@ -6825,14 +6795,13 @@
           <a:lstStyle/>
           <a:p>
             <a:r>
-              <a:rPr lang="en-US" b="1" dirty="0" smtClean="0"/>
+              <a:rPr lang="en-US" b="1" dirty="0"/>
               <a:t>Conclusions and </a:t>
             </a:r>
             <a:r>
-              <a:rPr lang="en-US" b="1" smtClean="0"/>
+              <a:rPr lang="en-US" b="1"/>
               <a:t>Next Steps</a:t>
             </a:r>
-            <a:endParaRPr lang="en-US" b="1"/>
           </a:p>
         </p:txBody>
       </p:sp>
@@ -6883,10 +6852,9 @@
           <a:p>
             <a:pPr algn="ctr"/>
             <a:r>
-              <a:rPr lang="en-US" b="1" dirty="0" smtClean="0"/>
+              <a:rPr lang="en-US" b="1" dirty="0"/>
               <a:t>Discussion of Results</a:t>
             </a:r>
-            <a:endParaRPr lang="en-US" b="1" dirty="0"/>
           </a:p>
         </p:txBody>
       </p:sp>
@@ -6908,25 +6876,25 @@
           <a:lstStyle/>
           <a:p>
             <a:r>
-              <a:rPr lang="en-US" sz="1600" dirty="0" smtClean="0"/>
+              <a:rPr lang="en-US" sz="1600" dirty="0"/>
               <a:t>No significant effects of gender or exclamation point treatment on response rates.</a:t>
             </a:r>
           </a:p>
           <a:p>
             <a:r>
-              <a:rPr lang="en-US" sz="1600" dirty="0" smtClean="0"/>
+              <a:rPr lang="en-US" sz="1600" dirty="0"/>
               <a:t>Perhaps due to high prevalence of professional management companies</a:t>
             </a:r>
           </a:p>
           <a:p>
             <a:r>
-              <a:rPr lang="en-US" sz="1600" dirty="0" smtClean="0"/>
+              <a:rPr lang="en-US" sz="1600" dirty="0"/>
               <a:t>Management companies have incentive to respond no matter what</a:t>
             </a:r>
           </a:p>
           <a:p>
             <a:r>
-              <a:rPr lang="en-US" sz="1600" dirty="0" smtClean="0"/>
+              <a:rPr lang="en-US" sz="1600" dirty="0"/>
               <a:t>We also observed same individual listing agents receiving multiple emails</a:t>
             </a:r>
           </a:p>
@@ -6981,10 +6949,9 @@
           <a:p>
             <a:pPr algn="ctr"/>
             <a:r>
-              <a:rPr lang="en-US" b="1" dirty="0" smtClean="0"/>
+              <a:rPr lang="en-US" b="1" dirty="0"/>
               <a:t>Next Steps</a:t>
             </a:r>
-            <a:endParaRPr lang="en-US" b="1" dirty="0"/>
           </a:p>
         </p:txBody>
       </p:sp>
@@ -7006,22 +6973,21 @@
           <a:lstStyle/>
           <a:p>
             <a:r>
-              <a:rPr lang="en-US" sz="1600" dirty="0" smtClean="0"/>
+              <a:rPr lang="en-US" sz="1600" dirty="0"/>
               <a:t>Could have been appropriate use-case for adaptive sampling where we may have wanted to collect additional data on private party postings</a:t>
             </a:r>
           </a:p>
           <a:p>
             <a:r>
-              <a:rPr lang="en-US" sz="1600" dirty="0" smtClean="0"/>
+              <a:rPr lang="en-US" sz="1600" dirty="0"/>
               <a:t>Try the same experiment in a different market without so many professionally managed listings (e.g. cars for sale by owner)</a:t>
             </a:r>
           </a:p>
           <a:p>
             <a:r>
-              <a:rPr lang="en-US" sz="1600" dirty="0" smtClean="0"/>
+              <a:rPr lang="en-US" sz="1600" dirty="0"/>
               <a:t>Determine whether postings are by same individual or for same property</a:t>
             </a:r>
-            <a:endParaRPr lang="en-US" sz="1600" dirty="0"/>
           </a:p>
         </p:txBody>
       </p:sp>
@@ -7079,10 +7045,9 @@
           <a:p>
             <a:pPr algn="ctr"/>
             <a:r>
-              <a:rPr lang="en-US" b="1" dirty="0" smtClean="0"/>
+              <a:rPr lang="en-US" b="1" dirty="0"/>
               <a:t>Research Question</a:t>
             </a:r>
-            <a:endParaRPr lang="en-US" b="1" dirty="0"/>
           </a:p>
         </p:txBody>
       </p:sp>
@@ -7115,7 +7080,6 @@
               <a:rPr lang="en-US" sz="1600" dirty="0"/>
               <a:t>Do exclamation points signal sincerity and friendliness in an email to a prospective landlord? Operationalized, does including an exclamation point (or more) make you more likely to receive a positive response when applying to an apartment?</a:t>
             </a:r>
-            <a:endParaRPr lang="en-US" sz="1600" dirty="0"/>
           </a:p>
         </p:txBody>
       </p:sp>
@@ -7171,10 +7135,9 @@
           <a:p>
             <a:pPr algn="ctr"/>
             <a:r>
-              <a:rPr lang="en-US" b="1" dirty="0" smtClean="0"/>
+              <a:rPr lang="en-US" b="1" dirty="0"/>
               <a:t>Experimental Design</a:t>
             </a:r>
-            <a:endParaRPr lang="en-US" b="1" dirty="0"/>
           </a:p>
         </p:txBody>
       </p:sp>
@@ -7201,42 +7164,33 @@
           <a:lstStyle/>
           <a:p>
             <a:r>
-              <a:rPr lang="en-US" sz="1600" dirty="0" smtClean="0"/>
+              <a:rPr lang="en-US" sz="1600" dirty="0"/>
               <a:t>Multi-factor audit study</a:t>
             </a:r>
           </a:p>
           <a:p>
             <a:r>
-              <a:rPr lang="en-US" sz="1600" dirty="0" smtClean="0"/>
-              <a:t>Two treatment levels (! </a:t>
-            </a:r>
-            <a:r>
               <a:rPr lang="en-US" sz="1600" dirty="0"/>
-              <a:t>a</a:t>
-            </a:r>
-            <a:r>
-              <a:rPr lang="en-US" sz="1600" dirty="0" smtClean="0"/>
-              <a:t>nd !!!!)</a:t>
-            </a:r>
-          </a:p>
-          <a:p>
-            <a:r>
-              <a:rPr lang="en-US" sz="1600" dirty="0" smtClean="0"/>
+              <a:t>Two treatment levels (! and !!!!)</a:t>
+            </a:r>
+          </a:p>
+          <a:p>
+            <a:r>
+              <a:rPr lang="en-US" sz="1600" dirty="0"/>
               <a:t>Gender variation</a:t>
             </a:r>
           </a:p>
           <a:p>
             <a:r>
-              <a:rPr lang="en-US" sz="1600" dirty="0" smtClean="0"/>
+              <a:rPr lang="en-US" sz="1600" dirty="0"/>
               <a:t>Drafted stock emails for each treatment level, varied only punctuation</a:t>
             </a:r>
           </a:p>
           <a:p>
             <a:r>
-              <a:rPr lang="en-US" sz="1600" dirty="0" smtClean="0"/>
+              <a:rPr lang="en-US" sz="1600" dirty="0"/>
               <a:t>Record response rates to each treatment level</a:t>
             </a:r>
-            <a:endParaRPr lang="en-US" sz="1600" dirty="0"/>
           </a:p>
         </p:txBody>
       </p:sp>
@@ -7316,25 +7270,25 @@
           <a:lstStyle/>
           <a:p>
             <a:r>
-              <a:rPr lang="en-US" sz="1600" dirty="0" smtClean="0"/>
+              <a:rPr lang="en-US" sz="1600" dirty="0"/>
               <a:t>Scraped apartment listings from Craigslist in four cities</a:t>
             </a:r>
           </a:p>
           <a:p>
             <a:r>
-              <a:rPr lang="en-US" sz="1600" dirty="0" smtClean="0"/>
+              <a:rPr lang="en-US" sz="1600" dirty="0"/>
               <a:t>First 100 results of search queries for 1 and 2 bedroom apartments in $500 price buckets from $1,000 per month to $4,000 per month</a:t>
             </a:r>
           </a:p>
           <a:p>
             <a:r>
-              <a:rPr lang="en-US" sz="1600" dirty="0" smtClean="0"/>
+              <a:rPr lang="en-US" sz="1600" dirty="0"/>
               <a:t>Randomly selected 180 listings from each city</a:t>
             </a:r>
           </a:p>
           <a:p>
             <a:r>
-              <a:rPr lang="en-US" sz="1600" dirty="0" smtClean="0"/>
+              <a:rPr lang="en-US" sz="1600" dirty="0"/>
               <a:t>Randomly assigned 30 selected listings from each city to each treatment / control group</a:t>
             </a:r>
           </a:p>
@@ -7388,13 +7342,8 @@
             <a:pPr algn="ctr"/>
             <a:r>
               <a:rPr lang="en-US" b="1" dirty="0"/>
-              <a:t>Data </a:t>
-            </a:r>
-            <a:r>
-              <a:rPr lang="en-US" b="1" dirty="0" smtClean="0"/>
-              <a:t>Issues</a:t>
-            </a:r>
-            <a:endParaRPr lang="en-US" b="1" dirty="0"/>
+              <a:t>Data Issues</a:t>
+            </a:r>
           </a:p>
         </p:txBody>
       </p:sp>
@@ -7421,19 +7370,19 @@
           <a:lstStyle/>
           <a:p>
             <a:r>
-              <a:rPr lang="en-US" sz="1600" dirty="0" smtClean="0"/>
+              <a:rPr lang="en-US" sz="1600" dirty="0"/>
               <a:t>Multiple emails sent to same listing agents</a:t>
             </a:r>
           </a:p>
           <a:p>
             <a:r>
-              <a:rPr lang="en-US" sz="1600" dirty="0" smtClean="0"/>
+              <a:rPr lang="en-US" sz="1600" dirty="0"/>
               <a:t>All emails not sent at same time of day / week</a:t>
             </a:r>
           </a:p>
           <a:p>
             <a:r>
-              <a:rPr lang="en-US" sz="1600" dirty="0" smtClean="0"/>
+              <a:rPr lang="en-US" sz="1600" dirty="0"/>
               <a:t>Multiple listings for the same property</a:t>
             </a:r>
           </a:p>
@@ -7485,10 +7434,9 @@
           <a:lstStyle/>
           <a:p>
             <a:r>
-              <a:rPr lang="en-US" b="1" dirty="0" smtClean="0"/>
+              <a:rPr lang="en-US" b="1" dirty="0"/>
               <a:t>Analysis</a:t>
             </a:r>
-            <a:endParaRPr lang="en-US" b="1" dirty="0"/>
           </a:p>
         </p:txBody>
       </p:sp>
@@ -7634,34 +7582,19 @@
               <a:t>  </a:t>
             </a:r>
             <a:r>
-              <a:rPr lang="en-US" sz="1000" b="1" dirty="0" smtClean="0">
-                <a:solidFill>
-                  <a:srgbClr val="333333"/>
-                </a:solidFill>
-                <a:highlight>
-                  <a:srgbClr val="FFFFFF"/>
-                </a:highlight>
-                <a:latin typeface="Courier New"/>
-                <a:ea typeface="Courier New"/>
-                <a:cs typeface="Courier New"/>
-                <a:sym typeface="Courier New"/>
-              </a:rPr>
-              <a:t>0    1</a:t>
-            </a:r>
-            <a:r>
-              <a:rPr lang="en" sz="1000" b="1" dirty="0">
-                <a:solidFill>
-                  <a:srgbClr val="333333"/>
-                </a:solidFill>
-                <a:highlight>
-                  <a:srgbClr val="FFFFFF"/>
-                </a:highlight>
-                <a:latin typeface="Courier New"/>
-                <a:ea typeface="Courier New"/>
-                <a:cs typeface="Courier New"/>
-                <a:sym typeface="Courier New"/>
-              </a:rPr>
-              <a:t/>
+              <a:rPr lang="en-US" sz="1000" b="1" dirty="0">
+                <a:solidFill>
+                  <a:srgbClr val="333333"/>
+                </a:solidFill>
+                <a:highlight>
+                  <a:srgbClr val="FFFFFF"/>
+                </a:highlight>
+                <a:latin typeface="Courier New"/>
+                <a:ea typeface="Courier New"/>
+                <a:cs typeface="Courier New"/>
+                <a:sym typeface="Courier New"/>
+              </a:rPr>
+              <a:t>No Response 	Positive Response</a:t>
             </a:r>
             <a:br>
               <a:rPr lang="en" sz="1000" b="1" dirty="0">
@@ -7678,7 +7611,7 @@
               </a:rPr>
             </a:br>
             <a:r>
-              <a:rPr lang="en-US" sz="1000" b="1" dirty="0" smtClean="0">
+              <a:rPr lang="en-US" sz="1000" b="1" dirty="0">
                 <a:solidFill>
                   <a:srgbClr val="333333"/>
                 </a:solidFill>
@@ -7693,7 +7626,7 @@
               <a:t>  </a:t>
             </a:r>
             <a:r>
-              <a:rPr lang="en" sz="1000" b="1" dirty="0" smtClean="0">
+              <a:rPr lang="en" sz="1000" b="1" dirty="0">
                 <a:solidFill>
                   <a:srgbClr val="333333"/>
                 </a:solidFill>
@@ -7708,22 +7641,22 @@
               <a:t>264</a:t>
             </a:r>
             <a:r>
-              <a:rPr lang="en-US" sz="1000" b="1" dirty="0" smtClean="0">
-                <a:solidFill>
-                  <a:srgbClr val="333333"/>
-                </a:solidFill>
-                <a:highlight>
-                  <a:srgbClr val="FFFFFF"/>
-                </a:highlight>
-                <a:latin typeface="Courier New"/>
-                <a:ea typeface="Courier New"/>
-                <a:cs typeface="Courier New"/>
-                <a:sym typeface="Courier New"/>
-              </a:rPr>
-              <a:t>  </a:t>
-            </a:r>
-            <a:r>
-              <a:rPr lang="en" sz="1000" b="1" dirty="0" smtClean="0">
+              <a:rPr lang="en-US" sz="1000" b="1" dirty="0">
+                <a:solidFill>
+                  <a:srgbClr val="333333"/>
+                </a:solidFill>
+                <a:highlight>
+                  <a:srgbClr val="FFFFFF"/>
+                </a:highlight>
+                <a:latin typeface="Courier New"/>
+                <a:ea typeface="Courier New"/>
+                <a:cs typeface="Courier New"/>
+                <a:sym typeface="Courier New"/>
+              </a:rPr>
+              <a:t>  		</a:t>
+            </a:r>
+            <a:r>
+              <a:rPr lang="en" sz="1000" b="1" dirty="0">
                 <a:solidFill>
                   <a:srgbClr val="333333"/>
                 </a:solidFill>
@@ -7737,18 +7670,6 @@
               </a:rPr>
               <a:t>219</a:t>
             </a:r>
-            <a:endParaRPr lang="en" sz="1000" b="1" dirty="0">
-              <a:solidFill>
-                <a:srgbClr val="333333"/>
-              </a:solidFill>
-              <a:highlight>
-                <a:srgbClr val="FFFFFF"/>
-              </a:highlight>
-              <a:latin typeface="Courier New"/>
-              <a:ea typeface="Courier New"/>
-              <a:cs typeface="Courier New"/>
-              <a:sym typeface="Courier New"/>
-            </a:endParaRPr>
           </a:p>
           <a:p>
             <a:pPr lvl="0" rtl="0">
@@ -7763,21 +7684,6 @@
               </a:spcAft>
               <a:buNone/>
             </a:pPr>
-            <a:r>
-              <a:rPr lang="en" sz="1000" b="1" dirty="0">
-                <a:solidFill>
-                  <a:srgbClr val="333333"/>
-                </a:solidFill>
-                <a:highlight>
-                  <a:srgbClr val="FFFFFF"/>
-                </a:highlight>
-                <a:latin typeface="Courier New"/>
-                <a:ea typeface="Courier New"/>
-                <a:cs typeface="Courier New"/>
-                <a:sym typeface="Courier New"/>
-              </a:rPr>
-              <a:t/>
-            </a:r>
             <a:br>
               <a:rPr lang="en" sz="1000" b="1" dirty="0">
                 <a:solidFill>
@@ -7834,7 +7740,7 @@
                 <a:cs typeface="Courier New"/>
                 <a:sym typeface="Courier New"/>
               </a:rPr>
-              <a:t>      0   1</a:t>
+              <a:t>      			Male	Female</a:t>
             </a:r>
             <a:br>
               <a:rPr lang="en" sz="1000" b="1" dirty="0">
@@ -7863,7 +7769,7 @@
                 <a:cs typeface="Courier New"/>
                 <a:sym typeface="Courier New"/>
               </a:rPr>
-              <a:t>  0 135 129</a:t>
+              <a:t>  No Response	 	135 	129</a:t>
             </a:r>
             <a:br>
               <a:rPr lang="en" sz="1000" b="1" dirty="0">
@@ -7892,7 +7798,7 @@
                 <a:cs typeface="Courier New"/>
                 <a:sym typeface="Courier New"/>
               </a:rPr>
-              <a:t>  1 104 115</a:t>
+              <a:t>  Positive Response 	104 	115</a:t>
             </a:r>
           </a:p>
           <a:p>
@@ -7922,13 +7828,10 @@
             </a:endParaRPr>
           </a:p>
           <a:p>
-            <a:pPr lvl="0" rtl="0">
+            <a:pPr lvl="0">
               <a:lnSpc>
                 <a:spcPct val="142857"/>
               </a:lnSpc>
-              <a:spcBef>
-                <a:spcPts val="0"/>
-              </a:spcBef>
               <a:spcAft>
                 <a:spcPts val="800"/>
               </a:spcAft>
@@ -7976,187 +7879,7 @@
                 <a:cs typeface="Courier New"/>
                 <a:sym typeface="Courier New"/>
               </a:rPr>
-              <a:t>    </a:t>
-            </a:r>
-            <a:r>
-              <a:rPr lang="en" sz="1000" b="1" dirty="0" err="1">
-                <a:solidFill>
-                  <a:srgbClr val="333333"/>
-                </a:solidFill>
-                <a:highlight>
-                  <a:srgbClr val="FFFFFF"/>
-                </a:highlight>
-                <a:latin typeface="Courier New"/>
-                <a:ea typeface="Courier New"/>
-                <a:cs typeface="Courier New"/>
-                <a:sym typeface="Courier New"/>
-              </a:rPr>
-              <a:t>Jane_Control</a:t>
-            </a:r>
-            <a:r>
-              <a:rPr lang="en" sz="1000" b="1" dirty="0">
-                <a:solidFill>
-                  <a:srgbClr val="333333"/>
-                </a:solidFill>
-                <a:highlight>
-                  <a:srgbClr val="FFFFFF"/>
-                </a:highlight>
-                <a:latin typeface="Courier New"/>
-                <a:ea typeface="Courier New"/>
-                <a:cs typeface="Courier New"/>
-                <a:sym typeface="Courier New"/>
-              </a:rPr>
-              <a:t> </a:t>
-            </a:r>
-            <a:r>
-              <a:rPr lang="en" sz="1000" b="1" dirty="0" err="1">
-                <a:solidFill>
-                  <a:srgbClr val="333333"/>
-                </a:solidFill>
-                <a:highlight>
-                  <a:srgbClr val="FFFFFF"/>
-                </a:highlight>
-                <a:latin typeface="Courier New"/>
-                <a:ea typeface="Courier New"/>
-                <a:cs typeface="Courier New"/>
-                <a:sym typeface="Courier New"/>
-              </a:rPr>
-              <a:t>Jane_Treat_High</a:t>
-            </a:r>
-            <a:r>
-              <a:rPr lang="en" sz="1000" b="1" dirty="0">
-                <a:solidFill>
-                  <a:srgbClr val="333333"/>
-                </a:solidFill>
-                <a:highlight>
-                  <a:srgbClr val="FFFFFF"/>
-                </a:highlight>
-                <a:latin typeface="Courier New"/>
-                <a:ea typeface="Courier New"/>
-                <a:cs typeface="Courier New"/>
-                <a:sym typeface="Courier New"/>
-              </a:rPr>
-              <a:t> </a:t>
-            </a:r>
-            <a:r>
-              <a:rPr lang="en" sz="1000" b="1" dirty="0" err="1">
-                <a:solidFill>
-                  <a:srgbClr val="333333"/>
-                </a:solidFill>
-                <a:highlight>
-                  <a:srgbClr val="FFFFFF"/>
-                </a:highlight>
-                <a:latin typeface="Courier New"/>
-                <a:ea typeface="Courier New"/>
-                <a:cs typeface="Courier New"/>
-                <a:sym typeface="Courier New"/>
-              </a:rPr>
-              <a:t>Jane_Treat_Low</a:t>
-            </a:r>
-            <a:r>
-              <a:rPr lang="en" sz="1000" b="1" dirty="0">
-                <a:solidFill>
-                  <a:srgbClr val="333333"/>
-                </a:solidFill>
-                <a:highlight>
-                  <a:srgbClr val="FFFFFF"/>
-                </a:highlight>
-                <a:latin typeface="Courier New"/>
-                <a:ea typeface="Courier New"/>
-                <a:cs typeface="Courier New"/>
-                <a:sym typeface="Courier New"/>
-              </a:rPr>
-              <a:t> </a:t>
-            </a:r>
-            <a:r>
-              <a:rPr lang="en" sz="1000" b="1" dirty="0" err="1">
-                <a:solidFill>
-                  <a:srgbClr val="333333"/>
-                </a:solidFill>
-                <a:highlight>
-                  <a:srgbClr val="FFFFFF"/>
-                </a:highlight>
-                <a:latin typeface="Courier New"/>
-                <a:ea typeface="Courier New"/>
-                <a:cs typeface="Courier New"/>
-                <a:sym typeface="Courier New"/>
-              </a:rPr>
-              <a:t>John_Control</a:t>
-            </a:r>
-            <a:r>
-              <a:rPr lang="en" sz="1000" b="1" dirty="0">
-                <a:solidFill>
-                  <a:srgbClr val="333333"/>
-                </a:solidFill>
-                <a:highlight>
-                  <a:srgbClr val="FFFFFF"/>
-                </a:highlight>
-                <a:latin typeface="Courier New"/>
-                <a:ea typeface="Courier New"/>
-                <a:cs typeface="Courier New"/>
-                <a:sym typeface="Courier New"/>
-              </a:rPr>
-              <a:t> </a:t>
-            </a:r>
-            <a:r>
-              <a:rPr lang="en" sz="1000" b="1" dirty="0" err="1">
-                <a:solidFill>
-                  <a:srgbClr val="333333"/>
-                </a:solidFill>
-                <a:highlight>
-                  <a:srgbClr val="FFFFFF"/>
-                </a:highlight>
-                <a:latin typeface="Courier New"/>
-                <a:ea typeface="Courier New"/>
-                <a:cs typeface="Courier New"/>
-                <a:sym typeface="Courier New"/>
-              </a:rPr>
-              <a:t>John_Treat_High</a:t>
-            </a:r>
-            <a:r>
-              <a:rPr lang="en" sz="1000" b="1" dirty="0">
-                <a:solidFill>
-                  <a:srgbClr val="333333"/>
-                </a:solidFill>
-                <a:highlight>
-                  <a:srgbClr val="FFFFFF"/>
-                </a:highlight>
-                <a:latin typeface="Courier New"/>
-                <a:ea typeface="Courier New"/>
-                <a:cs typeface="Courier New"/>
-                <a:sym typeface="Courier New"/>
-              </a:rPr>
-              <a:t> </a:t>
-            </a:r>
-            <a:r>
-              <a:rPr lang="en" sz="1000" b="1" dirty="0" err="1">
-                <a:solidFill>
-                  <a:srgbClr val="333333"/>
-                </a:solidFill>
-                <a:highlight>
-                  <a:srgbClr val="FFFFFF"/>
-                </a:highlight>
-                <a:latin typeface="Courier New"/>
-                <a:ea typeface="Courier New"/>
-                <a:cs typeface="Courier New"/>
-                <a:sym typeface="Courier New"/>
-              </a:rPr>
-              <a:t>John_Treat_Low</a:t>
-            </a:r>
-            <a:r>
-              <a:rPr lang="en" sz="1000" b="1" dirty="0">
-                <a:solidFill>
-                  <a:srgbClr val="333333"/>
-                </a:solidFill>
-                <a:highlight>
-                  <a:srgbClr val="FFFFFF"/>
-                </a:highlight>
-                <a:latin typeface="Courier New"/>
-                <a:ea typeface="Courier New"/>
-                <a:cs typeface="Courier New"/>
-                <a:sym typeface="Courier New"/>
-              </a:rPr>
-              <a:t/>
+              <a:t>    	        Jane_Control Jane_Treat_High Jane_Treat_Low John_Control John_Treat_High John_Treat_Low</a:t>
             </a:r>
             <a:br>
               <a:rPr lang="en" sz="1000" b="1" dirty="0">
@@ -8185,7 +7908,7 @@
                 <a:cs typeface="Courier New"/>
                 <a:sym typeface="Courier New"/>
               </a:rPr>
-              <a:t>  0           39              41             49           49              46             40</a:t>
+              <a:t>  No Response          39              41             49           49              46             40</a:t>
             </a:r>
             <a:br>
               <a:rPr lang="en" sz="1000" b="1" dirty="0">
@@ -8214,7 +7937,7 @@
                 <a:cs typeface="Courier New"/>
                 <a:sym typeface="Courier New"/>
               </a:rPr>
-              <a:t>  1           39              40             36           33              35             36</a:t>
+              <a:t> Positive Respons      39              40             36           33              35             36</a:t>
             </a:r>
           </a:p>
           <a:p>
@@ -8421,21 +8144,6 @@
               <a:buFont typeface="Arial"/>
               <a:buNone/>
             </a:pPr>
-            <a:r>
-              <a:rPr lang="en" sz="1000" b="1" dirty="0">
-                <a:solidFill>
-                  <a:srgbClr val="333333"/>
-                </a:solidFill>
-                <a:highlight>
-                  <a:srgbClr val="FFFFFF"/>
-                </a:highlight>
-                <a:latin typeface="Courier New"/>
-                <a:ea typeface="Courier New"/>
-                <a:cs typeface="Courier New"/>
-                <a:sym typeface="Courier New"/>
-              </a:rPr>
-              <a:t/>
-            </a:r>
             <a:br>
               <a:rPr lang="en" sz="1000" b="1" dirty="0">
                 <a:solidFill>
@@ -8463,127 +8171,7 @@
                 <a:cs typeface="Courier New"/>
                 <a:sym typeface="Courier New"/>
               </a:rPr>
-              <a:t>    </a:t>
-            </a:r>
-            <a:r>
-              <a:rPr lang="en" sz="1000" b="1" dirty="0" err="1">
-                <a:solidFill>
-                  <a:srgbClr val="333333"/>
-                </a:solidFill>
-                <a:highlight>
-                  <a:srgbClr val="FFFFFF"/>
-                </a:highlight>
-                <a:latin typeface="Courier New"/>
-                <a:ea typeface="Courier New"/>
-                <a:cs typeface="Courier New"/>
-                <a:sym typeface="Courier New"/>
-              </a:rPr>
-              <a:t>chicago</a:t>
-            </a:r>
-            <a:r>
-              <a:rPr lang="en" sz="1000" b="1" dirty="0">
-                <a:solidFill>
-                  <a:srgbClr val="333333"/>
-                </a:solidFill>
-                <a:highlight>
-                  <a:srgbClr val="FFFFFF"/>
-                </a:highlight>
-                <a:latin typeface="Courier New"/>
-                <a:ea typeface="Courier New"/>
-                <a:cs typeface="Courier New"/>
-                <a:sym typeface="Courier New"/>
-              </a:rPr>
-              <a:t> </a:t>
-            </a:r>
-            <a:r>
-              <a:rPr lang="en" sz="1000" b="1" dirty="0" err="1">
-                <a:solidFill>
-                  <a:srgbClr val="333333"/>
-                </a:solidFill>
-                <a:highlight>
-                  <a:srgbClr val="FFFFFF"/>
-                </a:highlight>
-                <a:latin typeface="Courier New"/>
-                <a:ea typeface="Courier New"/>
-                <a:cs typeface="Courier New"/>
-                <a:sym typeface="Courier New"/>
-              </a:rPr>
-              <a:t>houston</a:t>
-            </a:r>
-            <a:r>
-              <a:rPr lang="en" sz="1000" b="1" dirty="0">
-                <a:solidFill>
-                  <a:srgbClr val="333333"/>
-                </a:solidFill>
-                <a:highlight>
-                  <a:srgbClr val="FFFFFF"/>
-                </a:highlight>
-                <a:latin typeface="Courier New"/>
-                <a:ea typeface="Courier New"/>
-                <a:cs typeface="Courier New"/>
-                <a:sym typeface="Courier New"/>
-              </a:rPr>
-              <a:t> </a:t>
-            </a:r>
-            <a:r>
-              <a:rPr lang="en" sz="1000" b="1" dirty="0" err="1">
-                <a:solidFill>
-                  <a:srgbClr val="333333"/>
-                </a:solidFill>
-                <a:highlight>
-                  <a:srgbClr val="FFFFFF"/>
-                </a:highlight>
-                <a:latin typeface="Courier New"/>
-                <a:ea typeface="Courier New"/>
-                <a:cs typeface="Courier New"/>
-                <a:sym typeface="Courier New"/>
-              </a:rPr>
-              <a:t>sandiego</a:t>
-            </a:r>
-            <a:r>
-              <a:rPr lang="en" sz="1000" b="1" dirty="0">
-                <a:solidFill>
-                  <a:srgbClr val="333333"/>
-                </a:solidFill>
-                <a:highlight>
-                  <a:srgbClr val="FFFFFF"/>
-                </a:highlight>
-                <a:latin typeface="Courier New"/>
-                <a:ea typeface="Courier New"/>
-                <a:cs typeface="Courier New"/>
-                <a:sym typeface="Courier New"/>
-              </a:rPr>
-              <a:t> </a:t>
-            </a:r>
-            <a:r>
-              <a:rPr lang="en" sz="1000" b="1" dirty="0" err="1">
-                <a:solidFill>
-                  <a:srgbClr val="333333"/>
-                </a:solidFill>
-                <a:highlight>
-                  <a:srgbClr val="FFFFFF"/>
-                </a:highlight>
-                <a:latin typeface="Courier New"/>
-                <a:ea typeface="Courier New"/>
-                <a:cs typeface="Courier New"/>
-                <a:sym typeface="Courier New"/>
-              </a:rPr>
-              <a:t>seattle</a:t>
-            </a:r>
-            <a:r>
-              <a:rPr lang="en" sz="1000" b="1" dirty="0">
-                <a:solidFill>
-                  <a:srgbClr val="333333"/>
-                </a:solidFill>
-                <a:highlight>
-                  <a:srgbClr val="FFFFFF"/>
-                </a:highlight>
-                <a:latin typeface="Courier New"/>
-                <a:ea typeface="Courier New"/>
-                <a:cs typeface="Courier New"/>
-                <a:sym typeface="Courier New"/>
-              </a:rPr>
-              <a:t/>
+              <a:t>    		chicago houston sandiego seattle</a:t>
             </a:r>
             <a:br>
               <a:rPr lang="en" sz="1000" b="1" dirty="0">
@@ -8612,7 +8200,7 @@
                 <a:cs typeface="Courier New"/>
                 <a:sym typeface="Courier New"/>
               </a:rPr>
-              <a:t>  0      63      79       65      57</a:t>
+              <a:t>  No Response      63      79       65      57</a:t>
             </a:r>
             <a:br>
               <a:rPr lang="en" sz="1000" b="1" dirty="0">
@@ -8641,7 +8229,7 @@
                 <a:cs typeface="Courier New"/>
                 <a:sym typeface="Courier New"/>
               </a:rPr>
-              <a:t>  1      61      40       52      66</a:t>
+              <a:t>  Pos Response     61      40       52      66</a:t>
             </a:r>
           </a:p>
           <a:p>
@@ -8662,21 +8250,6 @@
               <a:buFont typeface="Arial"/>
               <a:buNone/>
             </a:pPr>
-            <a:r>
-              <a:rPr lang="en" sz="1000" b="1" dirty="0">
-                <a:solidFill>
-                  <a:srgbClr val="333333"/>
-                </a:solidFill>
-                <a:highlight>
-                  <a:srgbClr val="FFFFFF"/>
-                </a:highlight>
-                <a:latin typeface="Courier New"/>
-                <a:ea typeface="Courier New"/>
-                <a:cs typeface="Courier New"/>
-                <a:sym typeface="Courier New"/>
-              </a:rPr>
-              <a:t/>
-            </a:r>
             <a:br>
               <a:rPr lang="en" sz="1000" b="1" dirty="0">
                 <a:solidFill>
@@ -8725,21 +8298,6 @@
               <a:buFont typeface="Arial"/>
               <a:buNone/>
             </a:pPr>
-            <a:r>
-              <a:rPr lang="en" sz="1000" b="1" dirty="0">
-                <a:solidFill>
-                  <a:srgbClr val="333333"/>
-                </a:solidFill>
-                <a:highlight>
-                  <a:srgbClr val="FFFFFF"/>
-                </a:highlight>
-                <a:latin typeface="Courier New"/>
-                <a:ea typeface="Courier New"/>
-                <a:cs typeface="Courier New"/>
-                <a:sym typeface="Courier New"/>
-              </a:rPr>
-              <a:t/>
-            </a:r>
             <a:br>
               <a:rPr lang="en" sz="1000" b="1" dirty="0">
                 <a:solidFill>
@@ -8767,7 +8325,7 @@
                 <a:cs typeface="Courier New"/>
                 <a:sym typeface="Courier New"/>
               </a:rPr>
-              <a:t>      1   2</a:t>
+              <a:t>      		1   2 (Bedrooms)</a:t>
             </a:r>
             <a:br>
               <a:rPr lang="en" sz="1000" b="1" dirty="0">
@@ -8796,7 +8354,7 @@
                 <a:cs typeface="Courier New"/>
                 <a:sym typeface="Courier New"/>
               </a:rPr>
-              <a:t>  0 130 134</a:t>
+              <a:t>  No Response 	130 134</a:t>
             </a:r>
             <a:br>
               <a:rPr lang="en" sz="1000" b="1" dirty="0">
@@ -8825,7 +8383,7 @@
                 <a:cs typeface="Courier New"/>
                 <a:sym typeface="Courier New"/>
               </a:rPr>
-              <a:t>  1 103 116</a:t>
+              <a:t>  Pos Response 	103 116</a:t>
             </a:r>
           </a:p>
           <a:p>
@@ -8922,21 +8480,6 @@
               </a:rPr>
               <a:t># Model 1 - Basic model</a:t>
             </a:r>
-            <a:r>
-              <a:rPr lang="en" sz="1200" b="1" dirty="0">
-                <a:solidFill>
-                  <a:srgbClr val="333333"/>
-                </a:solidFill>
-                <a:highlight>
-                  <a:srgbClr val="F5F5F5"/>
-                </a:highlight>
-                <a:latin typeface="Courier New"/>
-                <a:ea typeface="Courier New"/>
-                <a:cs typeface="Courier New"/>
-                <a:sym typeface="Courier New"/>
-              </a:rPr>
-              <a:t/>
-            </a:r>
             <a:br>
               <a:rPr lang="en" sz="1200" b="1" dirty="0">
                 <a:solidFill>
@@ -9213,21 +8756,6 @@
                 <a:sym typeface="Courier New"/>
               </a:rPr>
             </a:br>
-            <a:r>
-              <a:rPr lang="en" sz="1200" b="1" dirty="0">
-                <a:solidFill>
-                  <a:srgbClr val="333333"/>
-                </a:solidFill>
-                <a:highlight>
-                  <a:srgbClr val="FFFFFF"/>
-                </a:highlight>
-                <a:latin typeface="Courier New"/>
-                <a:ea typeface="Courier New"/>
-                <a:cs typeface="Courier New"/>
-                <a:sym typeface="Courier New"/>
-              </a:rPr>
-              <a:t/>
-            </a:r>
             <a:br>
               <a:rPr lang="en" sz="1200" b="1" dirty="0">
                 <a:solidFill>
@@ -9417,6 +8945,135 @@
                 <a:sym typeface="Courier New"/>
               </a:rPr>
               <a:t>. codes:  0 ‘***’ 0.001 ‘**’ 0.01 ‘*’ 0.05 ‘.’ 0.1 ‘ ’ 1</a:t>
+            </a:r>
+          </a:p>
+          <a:p>
+            <a:pPr lvl="0" rtl="0">
+              <a:lnSpc>
+                <a:spcPct val="142857"/>
+              </a:lnSpc>
+              <a:spcBef>
+                <a:spcPts val="0"/>
+              </a:spcBef>
+              <a:spcAft>
+                <a:spcPts val="800"/>
+              </a:spcAft>
+              <a:buClr>
+                <a:schemeClr val="dk1"/>
+              </a:buClr>
+              <a:buSzPct val="91666"/>
+              <a:buFont typeface="Arial"/>
+              <a:buNone/>
+            </a:pPr>
+            <a:endParaRPr lang="en" sz="1200" b="1" dirty="0">
+              <a:solidFill>
+                <a:srgbClr val="333333"/>
+              </a:solidFill>
+              <a:highlight>
+                <a:srgbClr val="FFFFFF"/>
+              </a:highlight>
+              <a:latin typeface="Courier New"/>
+              <a:ea typeface="Courier New"/>
+              <a:cs typeface="Courier New"/>
+              <a:sym typeface="Courier New"/>
+            </a:endParaRPr>
+          </a:p>
+          <a:p>
+            <a:pPr lvl="0" rtl="0">
+              <a:lnSpc>
+                <a:spcPct val="142857"/>
+              </a:lnSpc>
+              <a:spcBef>
+                <a:spcPts val="0"/>
+              </a:spcBef>
+              <a:spcAft>
+                <a:spcPts val="800"/>
+              </a:spcAft>
+              <a:buClr>
+                <a:schemeClr val="dk1"/>
+              </a:buClr>
+              <a:buSzPct val="91666"/>
+              <a:buFont typeface="Arial"/>
+              <a:buNone/>
+            </a:pPr>
+            <a:r>
+              <a:rPr lang="en-US" sz="1200" b="1" dirty="0">
+                <a:solidFill>
+                  <a:srgbClr val="333333"/>
+                </a:solidFill>
+                <a:highlight>
+                  <a:srgbClr val="FFFFFF"/>
+                </a:highlight>
+                <a:latin typeface="Courier New"/>
+                <a:ea typeface="Courier New"/>
+                <a:cs typeface="Courier New"/>
+                <a:sym typeface="Courier New"/>
+              </a:rPr>
+              <a:t>Note: treatment variable is coded 2 for high, 1 for low, 0 for none</a:t>
+            </a:r>
+          </a:p>
+          <a:p>
+            <a:pPr lvl="0" rtl="0">
+              <a:lnSpc>
+                <a:spcPct val="142857"/>
+              </a:lnSpc>
+              <a:spcBef>
+                <a:spcPts val="0"/>
+              </a:spcBef>
+              <a:spcAft>
+                <a:spcPts val="800"/>
+              </a:spcAft>
+              <a:buClr>
+                <a:schemeClr val="dk1"/>
+              </a:buClr>
+              <a:buSzPct val="91666"/>
+              <a:buFont typeface="Arial"/>
+              <a:buNone/>
+            </a:pPr>
+            <a:r>
+              <a:rPr lang="en" sz="1200" b="1" dirty="0">
+                <a:solidFill>
+                  <a:srgbClr val="333333"/>
+                </a:solidFill>
+                <a:highlight>
+                  <a:srgbClr val="FFFFFF"/>
+                </a:highlight>
+                <a:latin typeface="Courier New"/>
+                <a:ea typeface="Courier New"/>
+                <a:cs typeface="Courier New"/>
+                <a:sym typeface="Courier New"/>
+              </a:rPr>
+              <a:t>We also ran this regression in complete form ie. </a:t>
+            </a:r>
+            <a:r>
+              <a:rPr lang="en-US" sz="1200" b="1" dirty="0">
+                <a:solidFill>
+                  <a:srgbClr val="333333"/>
+                </a:solidFill>
+                <a:highlight>
+                  <a:srgbClr val="FFFFFF"/>
+                </a:highlight>
+                <a:latin typeface="Courier New"/>
+                <a:ea typeface="Courier New"/>
+                <a:cs typeface="Courier New"/>
+                <a:sym typeface="Courier New"/>
+              </a:rPr>
+              <a:t>F</a:t>
+            </a:r>
+            <a:r>
+              <a:rPr lang="en" sz="1200" b="1" dirty="0">
+                <a:solidFill>
+                  <a:srgbClr val="333333"/>
+                </a:solidFill>
+                <a:highlight>
+                  <a:srgbClr val="FFFFFF"/>
+                </a:highlight>
+                <a:latin typeface="Courier New"/>
+                <a:ea typeface="Courier New"/>
+                <a:cs typeface="Courier New"/>
+                <a:sym typeface="Courier New"/>
+              </a:rPr>
+              <a:t>actors for each treatment/control assignment</a:t>
             </a:r>
           </a:p>
           <a:p>

</xml_diff>

<commit_message>
Added analysis slides to Presentation and additional work to the analysis itself
</commit_message>
<xml_diff>
--- a/Presentation/Basic Data and Analysis.pptx
+++ b/Presentation/Basic Data and Analysis.pptx
@@ -5,7 +5,7 @@
     <p:sldMasterId id="2147483829" r:id="rId1"/>
   </p:sldMasterIdLst>
   <p:notesMasterIdLst>
-    <p:notesMasterId r:id="rId16"/>
+    <p:notesMasterId r:id="rId17"/>
   </p:notesMasterIdLst>
   <p:sldIdLst>
     <p:sldId id="262" r:id="rId2"/>
@@ -14,14 +14,15 @@
     <p:sldId id="267" r:id="rId5"/>
     <p:sldId id="272" r:id="rId6"/>
     <p:sldId id="268" r:id="rId7"/>
-    <p:sldId id="257" r:id="rId8"/>
-    <p:sldId id="258" r:id="rId9"/>
-    <p:sldId id="259" r:id="rId10"/>
-    <p:sldId id="260" r:id="rId11"/>
-    <p:sldId id="261" r:id="rId12"/>
-    <p:sldId id="269" r:id="rId13"/>
-    <p:sldId id="270" r:id="rId14"/>
-    <p:sldId id="271" r:id="rId15"/>
+    <p:sldId id="274" r:id="rId8"/>
+    <p:sldId id="278" r:id="rId9"/>
+    <p:sldId id="280" r:id="rId10"/>
+    <p:sldId id="276" r:id="rId11"/>
+    <p:sldId id="277" r:id="rId12"/>
+    <p:sldId id="279" r:id="rId13"/>
+    <p:sldId id="269" r:id="rId14"/>
+    <p:sldId id="270" r:id="rId15"/>
+    <p:sldId id="271" r:id="rId16"/>
   </p:sldIdLst>
   <p:sldSz cx="9144000" cy="5143500" type="screen16x9"/>
   <p:notesSz cx="6858000" cy="9144000"/>
@@ -262,59 +263,6 @@
 </p:cmAuthorLst>
 </file>
 
-<file path=ppt/comments/comment1.xml><?xml version="1.0" encoding="utf-8"?>
-<p:cmLst xmlns:a="http://schemas.openxmlformats.org/drawingml/2006/main" xmlns:r="http://schemas.openxmlformats.org/officeDocument/2006/relationships" xmlns:p="http://schemas.openxmlformats.org/presentationml/2006/main">
-  <p:cm authorId="1" dt="2017-04-16T17:24:11.781" idx="1">
-    <p:pos x="950" y="1440"/>
-    <p:text>What is the treatment here? Is this a combined version of the low treatment and the high treatment?</p:text>
-    <p:extLst>
-      <p:ext uri="{C676402C-5697-4E1C-873F-D02D1690AC5C}">
-        <p15:threadingInfo xmlns:p15="http://schemas.microsoft.com/office/powerpoint/2012/main" timeZoneBias="360"/>
-      </p:ext>
-    </p:extLst>
-  </p:cm>
-  <p:cm authorId="6" dt="2017-04-17T21:50:21.131" idx="1">
-    <p:pos x="950" y="1536"/>
-    <p:text>I tried different versions, but here treatment is 1 for low, 2 for high</p:text>
-    <p:extLst>
-      <p:ext uri="{C676402C-5697-4E1C-873F-D02D1690AC5C}">
-        <p15:threadingInfo xmlns:p15="http://schemas.microsoft.com/office/powerpoint/2012/main" timeZoneBias="-480">
-          <p15:parentCm authorId="1" idx="1"/>
-        </p15:threadingInfo>
-      </p:ext>
-    </p:extLst>
-  </p:cm>
-</p:cmLst>
-</file>
-
-<file path=ppt/comments/comment2.xml><?xml version="1.0" encoding="utf-8"?>
-<p:cmLst xmlns:a="http://schemas.openxmlformats.org/drawingml/2006/main" xmlns:r="http://schemas.openxmlformats.org/officeDocument/2006/relationships" xmlns:p="http://schemas.openxmlformats.org/presentationml/2006/main">
-  <p:cm authorId="2" dt="2017-04-16T17:24:43.720" idx="1">
-    <p:pos x="770" y="1433"/>
-    <p:text>What is the treatment here? Combination of low and high treatment? Can you clarify the labelling here or perhaps add a note describing?</p:text>
-    <p:extLst>
-      <p:ext uri="{C676402C-5697-4E1C-873F-D02D1690AC5C}">
-        <p15:threadingInfo xmlns:p15="http://schemas.microsoft.com/office/powerpoint/2012/main" timeZoneBias="360"/>
-      </p:ext>
-    </p:extLst>
-  </p:cm>
-</p:cmLst>
-</file>
-
-<file path=ppt/comments/comment3.xml><?xml version="1.0" encoding="utf-8"?>
-<p:cmLst xmlns:a="http://schemas.openxmlformats.org/drawingml/2006/main" xmlns:r="http://schemas.openxmlformats.org/officeDocument/2006/relationships" xmlns:p="http://schemas.openxmlformats.org/presentationml/2006/main">
-  <p:cm authorId="3" dt="2017-04-16T17:25:46.519" idx="1">
-    <p:pos x="1875" y="335"/>
-    <p:text>Again, can you clarify whether the treatment here is just low treatment level, just the high treatment level, or just pooling them together?</p:text>
-    <p:extLst>
-      <p:ext uri="{C676402C-5697-4E1C-873F-D02D1690AC5C}">
-        <p15:threadingInfo xmlns:p15="http://schemas.microsoft.com/office/powerpoint/2012/main" timeZoneBias="360"/>
-      </p:ext>
-    </p:extLst>
-  </p:cm>
-</p:cmLst>
-</file>
-
 <file path=ppt/notesMasters/notesMaster1.xml><?xml version="1.0" encoding="utf-8"?>
 <p:notesMaster xmlns:a="http://schemas.openxmlformats.org/drawingml/2006/main" xmlns:r="http://schemas.openxmlformats.org/officeDocument/2006/relationships" xmlns:p="http://schemas.openxmlformats.org/presentationml/2006/main">
   <p:cSld>
@@ -577,536 +525,6 @@
 </p:notesMaster>
 </file>
 
-<file path=ppt/notesSlides/notesSlide1.xml><?xml version="1.0" encoding="utf-8"?>
-<p:notes xmlns:a="http://schemas.openxmlformats.org/drawingml/2006/main" xmlns:r="http://schemas.openxmlformats.org/officeDocument/2006/relationships" xmlns:p="http://schemas.openxmlformats.org/presentationml/2006/main" showMasterSp="0" showMasterPhAnim="0">
-  <p:cSld>
-    <p:spTree>
-      <p:nvGrpSpPr>
-        <p:cNvPr id="1" name="Shape 56"/>
-        <p:cNvGrpSpPr/>
-        <p:nvPr/>
-      </p:nvGrpSpPr>
-      <p:grpSpPr>
-        <a:xfrm>
-          <a:off x="0" y="0"/>
-          <a:ext cx="0" cy="0"/>
-          <a:chOff x="0" y="0"/>
-          <a:chExt cx="0" cy="0"/>
-        </a:xfrm>
-      </p:grpSpPr>
-      <p:sp>
-        <p:nvSpPr>
-          <p:cNvPr id="57" name="Shape 57"/>
-          <p:cNvSpPr>
-            <a:spLocks noGrp="1" noRot="1" noChangeAspect="1"/>
-          </p:cNvSpPr>
-          <p:nvPr>
-            <p:ph type="sldImg" idx="2"/>
-          </p:nvPr>
-        </p:nvSpPr>
-        <p:spPr>
-          <a:xfrm>
-            <a:off x="381000" y="685800"/>
-            <a:ext cx="6096000" cy="3429000"/>
-          </a:xfrm>
-          <a:custGeom>
-            <a:avLst/>
-            <a:gdLst/>
-            <a:ahLst/>
-            <a:cxnLst/>
-            <a:rect l="0" t="0" r="0" b="0"/>
-            <a:pathLst>
-              <a:path w="120000" h="120000" extrusionOk="0">
-                <a:moveTo>
-                  <a:pt x="0" y="0"/>
-                </a:moveTo>
-                <a:lnTo>
-                  <a:pt x="120000" y="0"/>
-                </a:lnTo>
-                <a:lnTo>
-                  <a:pt x="120000" y="120000"/>
-                </a:lnTo>
-                <a:lnTo>
-                  <a:pt x="0" y="120000"/>
-                </a:lnTo>
-                <a:close/>
-              </a:path>
-            </a:pathLst>
-          </a:custGeom>
-        </p:spPr>
-      </p:sp>
-      <p:sp>
-        <p:nvSpPr>
-          <p:cNvPr id="58" name="Shape 58"/>
-          <p:cNvSpPr txBox="1">
-            <a:spLocks noGrp="1"/>
-          </p:cNvSpPr>
-          <p:nvPr>
-            <p:ph type="body" idx="1"/>
-          </p:nvPr>
-        </p:nvSpPr>
-        <p:spPr>
-          <a:xfrm>
-            <a:off x="685800" y="4343400"/>
-            <a:ext cx="5486400" cy="4114800"/>
-          </a:xfrm>
-          <a:prstGeom prst="rect">
-            <a:avLst/>
-          </a:prstGeom>
-        </p:spPr>
-        <p:txBody>
-          <a:bodyPr lIns="91425" tIns="91425" rIns="91425" bIns="91425" anchor="t" anchorCtr="0">
-            <a:noAutofit/>
-          </a:bodyPr>
-          <a:lstStyle/>
-          <a:p>
-            <a:pPr lvl="0">
-              <a:spcBef>
-                <a:spcPts val="0"/>
-              </a:spcBef>
-              <a:buNone/>
-            </a:pPr>
-            <a:endParaRPr/>
-          </a:p>
-        </p:txBody>
-      </p:sp>
-    </p:spTree>
-    <p:extLst>
-      <p:ext uri="{BB962C8B-B14F-4D97-AF65-F5344CB8AC3E}">
-        <p14:creationId xmlns:p14="http://schemas.microsoft.com/office/powerpoint/2010/main" val="20172928"/>
-      </p:ext>
-    </p:extLst>
-  </p:cSld>
-  <p:clrMapOvr>
-    <a:masterClrMapping/>
-  </p:clrMapOvr>
-</p:notes>
-</file>
-
-<file path=ppt/notesSlides/notesSlide2.xml><?xml version="1.0" encoding="utf-8"?>
-<p:notes xmlns:a="http://schemas.openxmlformats.org/drawingml/2006/main" xmlns:r="http://schemas.openxmlformats.org/officeDocument/2006/relationships" xmlns:p="http://schemas.openxmlformats.org/presentationml/2006/main" showMasterSp="0" showMasterPhAnim="0">
-  <p:cSld>
-    <p:spTree>
-      <p:nvGrpSpPr>
-        <p:cNvPr id="1" name="Shape 62"/>
-        <p:cNvGrpSpPr/>
-        <p:nvPr/>
-      </p:nvGrpSpPr>
-      <p:grpSpPr>
-        <a:xfrm>
-          <a:off x="0" y="0"/>
-          <a:ext cx="0" cy="0"/>
-          <a:chOff x="0" y="0"/>
-          <a:chExt cx="0" cy="0"/>
-        </a:xfrm>
-      </p:grpSpPr>
-      <p:sp>
-        <p:nvSpPr>
-          <p:cNvPr id="63" name="Shape 63"/>
-          <p:cNvSpPr>
-            <a:spLocks noGrp="1" noRot="1" noChangeAspect="1"/>
-          </p:cNvSpPr>
-          <p:nvPr>
-            <p:ph type="sldImg" idx="2"/>
-          </p:nvPr>
-        </p:nvSpPr>
-        <p:spPr>
-          <a:xfrm>
-            <a:off x="381000" y="685800"/>
-            <a:ext cx="6096000" cy="3429000"/>
-          </a:xfrm>
-          <a:custGeom>
-            <a:avLst/>
-            <a:gdLst/>
-            <a:ahLst/>
-            <a:cxnLst/>
-            <a:rect l="0" t="0" r="0" b="0"/>
-            <a:pathLst>
-              <a:path w="120000" h="120000" extrusionOk="0">
-                <a:moveTo>
-                  <a:pt x="0" y="0"/>
-                </a:moveTo>
-                <a:lnTo>
-                  <a:pt x="120000" y="0"/>
-                </a:lnTo>
-                <a:lnTo>
-                  <a:pt x="120000" y="120000"/>
-                </a:lnTo>
-                <a:lnTo>
-                  <a:pt x="0" y="120000"/>
-                </a:lnTo>
-                <a:close/>
-              </a:path>
-            </a:pathLst>
-          </a:custGeom>
-        </p:spPr>
-      </p:sp>
-      <p:sp>
-        <p:nvSpPr>
-          <p:cNvPr id="64" name="Shape 64"/>
-          <p:cNvSpPr txBox="1">
-            <a:spLocks noGrp="1"/>
-          </p:cNvSpPr>
-          <p:nvPr>
-            <p:ph type="body" idx="1"/>
-          </p:nvPr>
-        </p:nvSpPr>
-        <p:spPr>
-          <a:xfrm>
-            <a:off x="685800" y="4343400"/>
-            <a:ext cx="5486400" cy="4114800"/>
-          </a:xfrm>
-          <a:prstGeom prst="rect">
-            <a:avLst/>
-          </a:prstGeom>
-        </p:spPr>
-        <p:txBody>
-          <a:bodyPr lIns="91425" tIns="91425" rIns="91425" bIns="91425" anchor="t" anchorCtr="0">
-            <a:noAutofit/>
-          </a:bodyPr>
-          <a:lstStyle/>
-          <a:p>
-            <a:pPr lvl="0">
-              <a:spcBef>
-                <a:spcPts val="0"/>
-              </a:spcBef>
-              <a:buNone/>
-            </a:pPr>
-            <a:endParaRPr/>
-          </a:p>
-        </p:txBody>
-      </p:sp>
-    </p:spTree>
-    <p:extLst>
-      <p:ext uri="{BB962C8B-B14F-4D97-AF65-F5344CB8AC3E}">
-        <p14:creationId xmlns:p14="http://schemas.microsoft.com/office/powerpoint/2010/main" val="1891468317"/>
-      </p:ext>
-    </p:extLst>
-  </p:cSld>
-  <p:clrMapOvr>
-    <a:masterClrMapping/>
-  </p:clrMapOvr>
-</p:notes>
-</file>
-
-<file path=ppt/notesSlides/notesSlide3.xml><?xml version="1.0" encoding="utf-8"?>
-<p:notes xmlns:a="http://schemas.openxmlformats.org/drawingml/2006/main" xmlns:r="http://schemas.openxmlformats.org/officeDocument/2006/relationships" xmlns:p="http://schemas.openxmlformats.org/presentationml/2006/main" showMasterSp="0" showMasterPhAnim="0">
-  <p:cSld>
-    <p:spTree>
-      <p:nvGrpSpPr>
-        <p:cNvPr id="1" name="Shape 68"/>
-        <p:cNvGrpSpPr/>
-        <p:nvPr/>
-      </p:nvGrpSpPr>
-      <p:grpSpPr>
-        <a:xfrm>
-          <a:off x="0" y="0"/>
-          <a:ext cx="0" cy="0"/>
-          <a:chOff x="0" y="0"/>
-          <a:chExt cx="0" cy="0"/>
-        </a:xfrm>
-      </p:grpSpPr>
-      <p:sp>
-        <p:nvSpPr>
-          <p:cNvPr id="69" name="Shape 69"/>
-          <p:cNvSpPr>
-            <a:spLocks noGrp="1" noRot="1" noChangeAspect="1"/>
-          </p:cNvSpPr>
-          <p:nvPr>
-            <p:ph type="sldImg" idx="2"/>
-          </p:nvPr>
-        </p:nvSpPr>
-        <p:spPr>
-          <a:xfrm>
-            <a:off x="381000" y="685800"/>
-            <a:ext cx="6096000" cy="3429000"/>
-          </a:xfrm>
-          <a:custGeom>
-            <a:avLst/>
-            <a:gdLst/>
-            <a:ahLst/>
-            <a:cxnLst/>
-            <a:rect l="0" t="0" r="0" b="0"/>
-            <a:pathLst>
-              <a:path w="120000" h="120000" extrusionOk="0">
-                <a:moveTo>
-                  <a:pt x="0" y="0"/>
-                </a:moveTo>
-                <a:lnTo>
-                  <a:pt x="120000" y="0"/>
-                </a:lnTo>
-                <a:lnTo>
-                  <a:pt x="120000" y="120000"/>
-                </a:lnTo>
-                <a:lnTo>
-                  <a:pt x="0" y="120000"/>
-                </a:lnTo>
-                <a:close/>
-              </a:path>
-            </a:pathLst>
-          </a:custGeom>
-        </p:spPr>
-      </p:sp>
-      <p:sp>
-        <p:nvSpPr>
-          <p:cNvPr id="70" name="Shape 70"/>
-          <p:cNvSpPr txBox="1">
-            <a:spLocks noGrp="1"/>
-          </p:cNvSpPr>
-          <p:nvPr>
-            <p:ph type="body" idx="1"/>
-          </p:nvPr>
-        </p:nvSpPr>
-        <p:spPr>
-          <a:xfrm>
-            <a:off x="685800" y="4343400"/>
-            <a:ext cx="5486400" cy="4114800"/>
-          </a:xfrm>
-          <a:prstGeom prst="rect">
-            <a:avLst/>
-          </a:prstGeom>
-        </p:spPr>
-        <p:txBody>
-          <a:bodyPr lIns="91425" tIns="91425" rIns="91425" bIns="91425" anchor="t" anchorCtr="0">
-            <a:noAutofit/>
-          </a:bodyPr>
-          <a:lstStyle/>
-          <a:p>
-            <a:pPr lvl="0">
-              <a:spcBef>
-                <a:spcPts val="0"/>
-              </a:spcBef>
-              <a:buNone/>
-            </a:pPr>
-            <a:endParaRPr/>
-          </a:p>
-        </p:txBody>
-      </p:sp>
-    </p:spTree>
-    <p:extLst>
-      <p:ext uri="{BB962C8B-B14F-4D97-AF65-F5344CB8AC3E}">
-        <p14:creationId xmlns:p14="http://schemas.microsoft.com/office/powerpoint/2010/main" val="707577278"/>
-      </p:ext>
-    </p:extLst>
-  </p:cSld>
-  <p:clrMapOvr>
-    <a:masterClrMapping/>
-  </p:clrMapOvr>
-</p:notes>
-</file>
-
-<file path=ppt/notesSlides/notesSlide4.xml><?xml version="1.0" encoding="utf-8"?>
-<p:notes xmlns:a="http://schemas.openxmlformats.org/drawingml/2006/main" xmlns:r="http://schemas.openxmlformats.org/officeDocument/2006/relationships" xmlns:p="http://schemas.openxmlformats.org/presentationml/2006/main" showMasterSp="0" showMasterPhAnim="0">
-  <p:cSld>
-    <p:spTree>
-      <p:nvGrpSpPr>
-        <p:cNvPr id="1" name="Shape 74"/>
-        <p:cNvGrpSpPr/>
-        <p:nvPr/>
-      </p:nvGrpSpPr>
-      <p:grpSpPr>
-        <a:xfrm>
-          <a:off x="0" y="0"/>
-          <a:ext cx="0" cy="0"/>
-          <a:chOff x="0" y="0"/>
-          <a:chExt cx="0" cy="0"/>
-        </a:xfrm>
-      </p:grpSpPr>
-      <p:sp>
-        <p:nvSpPr>
-          <p:cNvPr id="75" name="Shape 75"/>
-          <p:cNvSpPr>
-            <a:spLocks noGrp="1" noRot="1" noChangeAspect="1"/>
-          </p:cNvSpPr>
-          <p:nvPr>
-            <p:ph type="sldImg" idx="2"/>
-          </p:nvPr>
-        </p:nvSpPr>
-        <p:spPr>
-          <a:xfrm>
-            <a:off x="381000" y="685800"/>
-            <a:ext cx="6096000" cy="3429000"/>
-          </a:xfrm>
-          <a:custGeom>
-            <a:avLst/>
-            <a:gdLst/>
-            <a:ahLst/>
-            <a:cxnLst/>
-            <a:rect l="0" t="0" r="0" b="0"/>
-            <a:pathLst>
-              <a:path w="120000" h="120000" extrusionOk="0">
-                <a:moveTo>
-                  <a:pt x="0" y="0"/>
-                </a:moveTo>
-                <a:lnTo>
-                  <a:pt x="120000" y="0"/>
-                </a:lnTo>
-                <a:lnTo>
-                  <a:pt x="120000" y="120000"/>
-                </a:lnTo>
-                <a:lnTo>
-                  <a:pt x="0" y="120000"/>
-                </a:lnTo>
-                <a:close/>
-              </a:path>
-            </a:pathLst>
-          </a:custGeom>
-        </p:spPr>
-      </p:sp>
-      <p:sp>
-        <p:nvSpPr>
-          <p:cNvPr id="76" name="Shape 76"/>
-          <p:cNvSpPr txBox="1">
-            <a:spLocks noGrp="1"/>
-          </p:cNvSpPr>
-          <p:nvPr>
-            <p:ph type="body" idx="1"/>
-          </p:nvPr>
-        </p:nvSpPr>
-        <p:spPr>
-          <a:xfrm>
-            <a:off x="685800" y="4343400"/>
-            <a:ext cx="5486400" cy="4114800"/>
-          </a:xfrm>
-          <a:prstGeom prst="rect">
-            <a:avLst/>
-          </a:prstGeom>
-        </p:spPr>
-        <p:txBody>
-          <a:bodyPr lIns="91425" tIns="91425" rIns="91425" bIns="91425" anchor="t" anchorCtr="0">
-            <a:noAutofit/>
-          </a:bodyPr>
-          <a:lstStyle/>
-          <a:p>
-            <a:pPr lvl="0">
-              <a:spcBef>
-                <a:spcPts val="0"/>
-              </a:spcBef>
-              <a:buNone/>
-            </a:pPr>
-            <a:endParaRPr/>
-          </a:p>
-        </p:txBody>
-      </p:sp>
-    </p:spTree>
-    <p:extLst>
-      <p:ext uri="{BB962C8B-B14F-4D97-AF65-F5344CB8AC3E}">
-        <p14:creationId xmlns:p14="http://schemas.microsoft.com/office/powerpoint/2010/main" val="1634357907"/>
-      </p:ext>
-    </p:extLst>
-  </p:cSld>
-  <p:clrMapOvr>
-    <a:masterClrMapping/>
-  </p:clrMapOvr>
-</p:notes>
-</file>
-
-<file path=ppt/notesSlides/notesSlide5.xml><?xml version="1.0" encoding="utf-8"?>
-<p:notes xmlns:a="http://schemas.openxmlformats.org/drawingml/2006/main" xmlns:r="http://schemas.openxmlformats.org/officeDocument/2006/relationships" xmlns:p="http://schemas.openxmlformats.org/presentationml/2006/main" showMasterSp="0" showMasterPhAnim="0">
-  <p:cSld>
-    <p:spTree>
-      <p:nvGrpSpPr>
-        <p:cNvPr id="1" name="Shape 80"/>
-        <p:cNvGrpSpPr/>
-        <p:nvPr/>
-      </p:nvGrpSpPr>
-      <p:grpSpPr>
-        <a:xfrm>
-          <a:off x="0" y="0"/>
-          <a:ext cx="0" cy="0"/>
-          <a:chOff x="0" y="0"/>
-          <a:chExt cx="0" cy="0"/>
-        </a:xfrm>
-      </p:grpSpPr>
-      <p:sp>
-        <p:nvSpPr>
-          <p:cNvPr id="81" name="Shape 81"/>
-          <p:cNvSpPr>
-            <a:spLocks noGrp="1" noRot="1" noChangeAspect="1"/>
-          </p:cNvSpPr>
-          <p:nvPr>
-            <p:ph type="sldImg" idx="2"/>
-          </p:nvPr>
-        </p:nvSpPr>
-        <p:spPr>
-          <a:xfrm>
-            <a:off x="381000" y="685800"/>
-            <a:ext cx="6096000" cy="3429000"/>
-          </a:xfrm>
-          <a:custGeom>
-            <a:avLst/>
-            <a:gdLst/>
-            <a:ahLst/>
-            <a:cxnLst/>
-            <a:rect l="0" t="0" r="0" b="0"/>
-            <a:pathLst>
-              <a:path w="120000" h="120000" extrusionOk="0">
-                <a:moveTo>
-                  <a:pt x="0" y="0"/>
-                </a:moveTo>
-                <a:lnTo>
-                  <a:pt x="120000" y="0"/>
-                </a:lnTo>
-                <a:lnTo>
-                  <a:pt x="120000" y="120000"/>
-                </a:lnTo>
-                <a:lnTo>
-                  <a:pt x="0" y="120000"/>
-                </a:lnTo>
-                <a:close/>
-              </a:path>
-            </a:pathLst>
-          </a:custGeom>
-        </p:spPr>
-      </p:sp>
-      <p:sp>
-        <p:nvSpPr>
-          <p:cNvPr id="82" name="Shape 82"/>
-          <p:cNvSpPr txBox="1">
-            <a:spLocks noGrp="1"/>
-          </p:cNvSpPr>
-          <p:nvPr>
-            <p:ph type="body" idx="1"/>
-          </p:nvPr>
-        </p:nvSpPr>
-        <p:spPr>
-          <a:xfrm>
-            <a:off x="685800" y="4343400"/>
-            <a:ext cx="5486400" cy="4114800"/>
-          </a:xfrm>
-          <a:prstGeom prst="rect">
-            <a:avLst/>
-          </a:prstGeom>
-        </p:spPr>
-        <p:txBody>
-          <a:bodyPr lIns="91425" tIns="91425" rIns="91425" bIns="91425" anchor="t" anchorCtr="0">
-            <a:noAutofit/>
-          </a:bodyPr>
-          <a:lstStyle/>
-          <a:p>
-            <a:pPr lvl="0">
-              <a:spcBef>
-                <a:spcPts val="0"/>
-              </a:spcBef>
-              <a:buNone/>
-            </a:pPr>
-            <a:endParaRPr/>
-          </a:p>
-        </p:txBody>
-      </p:sp>
-    </p:spTree>
-    <p:extLst>
-      <p:ext uri="{BB962C8B-B14F-4D97-AF65-F5344CB8AC3E}">
-        <p14:creationId xmlns:p14="http://schemas.microsoft.com/office/powerpoint/2010/main" val="190014172"/>
-      </p:ext>
-    </p:extLst>
-  </p:cSld>
-  <p:clrMapOvr>
-    <a:masterClrMapping/>
-  </p:clrMapOvr>
-</p:notes>
-</file>
-
 <file path=ppt/slideLayouts/slideLayout1.xml><?xml version="1.0" encoding="utf-8"?>
 <p:sldLayout xmlns:a="http://schemas.openxmlformats.org/drawingml/2006/main" xmlns:r="http://schemas.openxmlformats.org/officeDocument/2006/relationships" xmlns:p="http://schemas.openxmlformats.org/presentationml/2006/main" showMasterSp="0" type="title" preserve="1">
   <p:cSld name="Title Slide">
@@ -1275,7 +693,7 @@
           <a:p>
             <a:fld id="{1160EA64-D806-43AC-9DF2-F8C432F32B4C}" type="datetimeFigureOut">
               <a:rPr lang="en-US" smtClean="0"/>
-              <a:t>4/17/2017</a:t>
+              <a:t>4/19/2017</a:t>
             </a:fld>
             <a:endParaRPr lang="en-US" dirty="0"/>
           </a:p>
@@ -1518,7 +936,7 @@
           <a:p>
             <a:fld id="{E9F9C37B-1D36-470B-8223-D6C91242EC14}" type="datetimeFigureOut">
               <a:rPr lang="en-US" smtClean="0"/>
-              <a:t>4/17/2017</a:t>
+              <a:t>4/19/2017</a:t>
             </a:fld>
             <a:endParaRPr lang="en-US" dirty="0"/>
           </a:p>
@@ -1713,7 +1131,7 @@
           <a:p>
             <a:fld id="{67C6F52A-A82B-47A2-A83A-8C4C91F2D59F}" type="datetimeFigureOut">
               <a:rPr lang="en-US" smtClean="0"/>
-              <a:t>4/17/2017</a:t>
+              <a:t>4/19/2017</a:t>
             </a:fld>
             <a:endParaRPr lang="en-US" dirty="0"/>
           </a:p>
@@ -1949,239 +1367,6 @@
 </p:sldLayout>
 </file>
 
-<file path=ppt/slideLayouts/slideLayout13.xml><?xml version="1.0" encoding="utf-8"?>
-<p:sldLayout xmlns:a="http://schemas.openxmlformats.org/drawingml/2006/main" xmlns:r="http://schemas.openxmlformats.org/officeDocument/2006/relationships" xmlns:p="http://schemas.openxmlformats.org/presentationml/2006/main" type="tx">
-  <p:cSld name="Title and body">
-    <p:spTree>
-      <p:nvGrpSpPr>
-        <p:cNvPr id="1" name="Shape 16"/>
-        <p:cNvGrpSpPr/>
-        <p:nvPr/>
-      </p:nvGrpSpPr>
-      <p:grpSpPr>
-        <a:xfrm>
-          <a:off x="0" y="0"/>
-          <a:ext cx="0" cy="0"/>
-          <a:chOff x="0" y="0"/>
-          <a:chExt cx="0" cy="0"/>
-        </a:xfrm>
-      </p:grpSpPr>
-      <p:sp>
-        <p:nvSpPr>
-          <p:cNvPr id="17" name="Shape 17"/>
-          <p:cNvSpPr txBox="1">
-            <a:spLocks noGrp="1"/>
-          </p:cNvSpPr>
-          <p:nvPr>
-            <p:ph type="title"/>
-          </p:nvPr>
-        </p:nvSpPr>
-        <p:spPr>
-          <a:xfrm>
-            <a:off x="311700" y="445025"/>
-            <a:ext cx="8520600" cy="572700"/>
-          </a:xfrm>
-          <a:prstGeom prst="rect">
-            <a:avLst/>
-          </a:prstGeom>
-        </p:spPr>
-        <p:txBody>
-          <a:bodyPr lIns="91425" tIns="91425" rIns="91425" bIns="91425" anchor="t" anchorCtr="0"/>
-          <a:lstStyle>
-            <a:lvl1pPr lvl="0">
-              <a:spcBef>
-                <a:spcPts val="0"/>
-              </a:spcBef>
-              <a:defRPr/>
-            </a:lvl1pPr>
-            <a:lvl2pPr lvl="1">
-              <a:spcBef>
-                <a:spcPts val="0"/>
-              </a:spcBef>
-              <a:defRPr/>
-            </a:lvl2pPr>
-            <a:lvl3pPr lvl="2">
-              <a:spcBef>
-                <a:spcPts val="0"/>
-              </a:spcBef>
-              <a:defRPr/>
-            </a:lvl3pPr>
-            <a:lvl4pPr lvl="3">
-              <a:spcBef>
-                <a:spcPts val="0"/>
-              </a:spcBef>
-              <a:defRPr/>
-            </a:lvl4pPr>
-            <a:lvl5pPr lvl="4">
-              <a:spcBef>
-                <a:spcPts val="0"/>
-              </a:spcBef>
-              <a:defRPr/>
-            </a:lvl5pPr>
-            <a:lvl6pPr lvl="5">
-              <a:spcBef>
-                <a:spcPts val="0"/>
-              </a:spcBef>
-              <a:defRPr/>
-            </a:lvl6pPr>
-            <a:lvl7pPr lvl="6">
-              <a:spcBef>
-                <a:spcPts val="0"/>
-              </a:spcBef>
-              <a:defRPr/>
-            </a:lvl7pPr>
-            <a:lvl8pPr lvl="7">
-              <a:spcBef>
-                <a:spcPts val="0"/>
-              </a:spcBef>
-              <a:defRPr/>
-            </a:lvl8pPr>
-            <a:lvl9pPr lvl="8">
-              <a:spcBef>
-                <a:spcPts val="0"/>
-              </a:spcBef>
-              <a:defRPr/>
-            </a:lvl9pPr>
-          </a:lstStyle>
-          <a:p>
-            <a:endParaRPr/>
-          </a:p>
-        </p:txBody>
-      </p:sp>
-      <p:sp>
-        <p:nvSpPr>
-          <p:cNvPr id="18" name="Shape 18"/>
-          <p:cNvSpPr txBox="1">
-            <a:spLocks noGrp="1"/>
-          </p:cNvSpPr>
-          <p:nvPr>
-            <p:ph type="body" idx="1"/>
-          </p:nvPr>
-        </p:nvSpPr>
-        <p:spPr>
-          <a:xfrm>
-            <a:off x="311700" y="1152475"/>
-            <a:ext cx="8520600" cy="3416400"/>
-          </a:xfrm>
-          <a:prstGeom prst="rect">
-            <a:avLst/>
-          </a:prstGeom>
-        </p:spPr>
-        <p:txBody>
-          <a:bodyPr lIns="91425" tIns="91425" rIns="91425" bIns="91425" anchor="t" anchorCtr="0"/>
-          <a:lstStyle>
-            <a:lvl1pPr lvl="0">
-              <a:spcBef>
-                <a:spcPts val="0"/>
-              </a:spcBef>
-              <a:defRPr/>
-            </a:lvl1pPr>
-            <a:lvl2pPr lvl="1">
-              <a:spcBef>
-                <a:spcPts val="0"/>
-              </a:spcBef>
-              <a:defRPr/>
-            </a:lvl2pPr>
-            <a:lvl3pPr lvl="2">
-              <a:spcBef>
-                <a:spcPts val="0"/>
-              </a:spcBef>
-              <a:defRPr/>
-            </a:lvl3pPr>
-            <a:lvl4pPr lvl="3">
-              <a:spcBef>
-                <a:spcPts val="0"/>
-              </a:spcBef>
-              <a:defRPr/>
-            </a:lvl4pPr>
-            <a:lvl5pPr lvl="4">
-              <a:spcBef>
-                <a:spcPts val="0"/>
-              </a:spcBef>
-              <a:defRPr/>
-            </a:lvl5pPr>
-            <a:lvl6pPr lvl="5">
-              <a:spcBef>
-                <a:spcPts val="0"/>
-              </a:spcBef>
-              <a:defRPr/>
-            </a:lvl6pPr>
-            <a:lvl7pPr lvl="6">
-              <a:spcBef>
-                <a:spcPts val="0"/>
-              </a:spcBef>
-              <a:defRPr/>
-            </a:lvl7pPr>
-            <a:lvl8pPr lvl="7">
-              <a:spcBef>
-                <a:spcPts val="0"/>
-              </a:spcBef>
-              <a:defRPr/>
-            </a:lvl8pPr>
-            <a:lvl9pPr lvl="8">
-              <a:spcBef>
-                <a:spcPts val="0"/>
-              </a:spcBef>
-              <a:defRPr/>
-            </a:lvl9pPr>
-          </a:lstStyle>
-          <a:p>
-            <a:endParaRPr/>
-          </a:p>
-        </p:txBody>
-      </p:sp>
-      <p:sp>
-        <p:nvSpPr>
-          <p:cNvPr id="19" name="Shape 19"/>
-          <p:cNvSpPr txBox="1">
-            <a:spLocks noGrp="1"/>
-          </p:cNvSpPr>
-          <p:nvPr>
-            <p:ph type="sldNum" idx="12"/>
-          </p:nvPr>
-        </p:nvSpPr>
-        <p:spPr>
-          <a:xfrm>
-            <a:off x="8472457" y="4663216"/>
-            <a:ext cx="548700" cy="393600"/>
-          </a:xfrm>
-          <a:prstGeom prst="rect">
-            <a:avLst/>
-          </a:prstGeom>
-        </p:spPr>
-        <p:txBody>
-          <a:bodyPr lIns="91425" tIns="91425" rIns="91425" bIns="91425" anchor="ctr" anchorCtr="0">
-            <a:noAutofit/>
-          </a:bodyPr>
-          <a:lstStyle/>
-          <a:p>
-            <a:pPr lvl="0">
-              <a:spcBef>
-                <a:spcPts val="0"/>
-              </a:spcBef>
-              <a:buNone/>
-            </a:pPr>
-            <a:fld id="{00000000-1234-1234-1234-123412341234}" type="slidenum">
-              <a:rPr lang="en"/>
-              <a:t>‹#›</a:t>
-            </a:fld>
-            <a:endParaRPr lang="en"/>
-          </a:p>
-        </p:txBody>
-      </p:sp>
-    </p:spTree>
-    <p:extLst>
-      <p:ext uri="{BB962C8B-B14F-4D97-AF65-F5344CB8AC3E}">
-        <p14:creationId xmlns:p14="http://schemas.microsoft.com/office/powerpoint/2010/main" val="1463437369"/>
-      </p:ext>
-    </p:extLst>
-  </p:cSld>
-  <p:clrMapOvr>
-    <a:masterClrMapping/>
-  </p:clrMapOvr>
-</p:sldLayout>
-</file>
-
 <file path=ppt/slideLayouts/slideLayout2.xml><?xml version="1.0" encoding="utf-8"?>
 <p:sldLayout xmlns:a="http://schemas.openxmlformats.org/drawingml/2006/main" xmlns:r="http://schemas.openxmlformats.org/officeDocument/2006/relationships" xmlns:p="http://schemas.openxmlformats.org/presentationml/2006/main" type="obj" preserve="1">
   <p:cSld name="Title and Content">
@@ -2291,7 +1476,7 @@
           <a:p>
             <a:fld id="{F070A7B3-6521-4DCA-87E5-044747A908C1}" type="datetimeFigureOut">
               <a:rPr lang="en-US" smtClean="0"/>
-              <a:t>4/17/2017</a:t>
+              <a:t>4/19/2017</a:t>
             </a:fld>
             <a:endParaRPr lang="en-US" dirty="0"/>
           </a:p>
@@ -2560,7 +1745,7 @@
           <a:p>
             <a:fld id="{1160EA64-D806-43AC-9DF2-F8C432F32B4C}" type="datetimeFigureOut">
               <a:rPr lang="en-US" smtClean="0"/>
-              <a:t>4/17/2017</a:t>
+              <a:t>4/19/2017</a:t>
             </a:fld>
             <a:endParaRPr lang="en-US" dirty="0"/>
           </a:p>
@@ -2901,7 +2086,7 @@
           <a:p>
             <a:fld id="{AB134690-1557-4C89-A502-4959FE7FAD70}" type="datetimeFigureOut">
               <a:rPr lang="en-US" smtClean="0"/>
-              <a:t>4/17/2017</a:t>
+              <a:t>4/19/2017</a:t>
             </a:fld>
             <a:endParaRPr lang="en-US" dirty="0"/>
           </a:p>
@@ -3367,7 +2552,7 @@
           <a:p>
             <a:fld id="{4F7D4976-E339-4826-83B7-FBD03F55ECF8}" type="datetimeFigureOut">
               <a:rPr lang="en-US" smtClean="0"/>
-              <a:t>4/17/2017</a:t>
+              <a:t>4/19/2017</a:t>
             </a:fld>
             <a:endParaRPr lang="en-US" dirty="0"/>
           </a:p>
@@ -3500,7 +2685,7 @@
           <a:p>
             <a:fld id="{E1037C31-9E7A-4F99-8774-A0E530DE1A42}" type="datetimeFigureOut">
               <a:rPr lang="en-US" smtClean="0"/>
-              <a:t>4/17/2017</a:t>
+              <a:t>4/19/2017</a:t>
             </a:fld>
             <a:endParaRPr lang="en-US" dirty="0"/>
           </a:p>
@@ -3610,7 +2795,7 @@
           <a:p>
             <a:fld id="{C278504F-A551-4DE0-9316-4DCD1D8CC752}" type="datetimeFigureOut">
               <a:rPr lang="en-US" smtClean="0"/>
-              <a:t>4/17/2017</a:t>
+              <a:t>4/19/2017</a:t>
             </a:fld>
             <a:endParaRPr lang="en-US" dirty="0"/>
           </a:p>
@@ -3903,7 +3088,7 @@
           <a:p>
             <a:fld id="{D1BE4249-C0D0-4B06-8692-E8BB871AF643}" type="datetimeFigureOut">
               <a:rPr lang="en-US" smtClean="0"/>
-              <a:t>4/17/2017</a:t>
+              <a:t>4/19/2017</a:t>
             </a:fld>
             <a:endParaRPr lang="en-US" dirty="0"/>
           </a:p>
@@ -4240,7 +3425,7 @@
           <a:p>
             <a:fld id="{042B0DB6-F5C7-45FB-8CF3-31B45F9C2DAC}" type="datetimeFigureOut">
               <a:rPr lang="en-US" smtClean="0"/>
-              <a:t>4/17/2017</a:t>
+              <a:t>4/19/2017</a:t>
             </a:fld>
             <a:endParaRPr lang="en-US" dirty="0"/>
           </a:p>
@@ -4509,7 +3694,7 @@
           <a:p>
             <a:fld id="{1160EA64-D806-43AC-9DF2-F8C432F32B4C}" type="datetimeFigureOut">
               <a:rPr lang="en-US" smtClean="0"/>
-              <a:t>4/17/2017</a:t>
+              <a:t>4/19/2017</a:t>
             </a:fld>
             <a:endParaRPr lang="en-US" dirty="0"/>
           </a:p>
@@ -4632,7 +3817,6 @@
     <p:sldLayoutId id="2147483839" r:id="rId10"/>
     <p:sldLayoutId id="2147483840" r:id="rId11"/>
     <p:sldLayoutId id="2147483841" r:id="rId12"/>
-    <p:sldLayoutId id="2147483842" r:id="rId13"/>
   </p:sldLayoutIdLst>
   <p:hf sldNum="0" hdr="0" ftr="0" dt="0"/>
   <p:txStyles>
@@ -5097,7 +4281,7 @@
   <p:cSld>
     <p:spTree>
       <p:nvGrpSpPr>
-        <p:cNvPr id="1" name="Shape 77"/>
+        <p:cNvPr id="1" name=""/>
         <p:cNvGrpSpPr/>
         <p:nvPr/>
       </p:nvGrpSpPr>
@@ -5111,718 +4295,81 @@
       </p:grpSpPr>
       <p:sp>
         <p:nvSpPr>
-          <p:cNvPr id="78" name="Shape 78"/>
-          <p:cNvSpPr txBox="1">
+          <p:cNvPr id="6" name="Title 5"/>
+          <p:cNvSpPr>
             <a:spLocks noGrp="1"/>
           </p:cNvSpPr>
           <p:nvPr>
             <p:ph type="title"/>
           </p:nvPr>
         </p:nvSpPr>
+        <p:spPr/>
+        <p:txBody>
+          <a:bodyPr anchor="t"/>
+          <a:lstStyle/>
+          <a:p>
+            <a:pPr algn="ctr"/>
+            <a:r>
+              <a:rPr lang="en-US" b="1" dirty="0"/>
+              <a:t>ATE</a:t>
+            </a:r>
+          </a:p>
+        </p:txBody>
+      </p:sp>
+      <p:pic>
+        <p:nvPicPr>
+          <p:cNvPr id="5" name="Picture 4"/>
+          <p:cNvPicPr>
+            <a:picLocks noChangeAspect="1"/>
+          </p:cNvPicPr>
+          <p:nvPr/>
+        </p:nvPicPr>
+        <p:blipFill>
+          <a:blip r:embed="rId2"/>
+          <a:stretch>
+            <a:fillRect/>
+          </a:stretch>
+        </p:blipFill>
         <p:spPr>
+          <a:xfrm>
+            <a:off x="4952199" y="747428"/>
+            <a:ext cx="3004126" cy="4354032"/>
+          </a:xfrm>
           <a:prstGeom prst="rect">
             <a:avLst/>
           </a:prstGeom>
         </p:spPr>
-        <p:txBody>
-          <a:bodyPr lIns="91425" tIns="91425" rIns="91425" bIns="91425" anchor="t" anchorCtr="0">
-            <a:noAutofit/>
-          </a:bodyPr>
-          <a:lstStyle/>
-          <a:p>
-            <a:pPr lvl="0" rtl="0">
-              <a:lnSpc>
-                <a:spcPct val="142857"/>
-              </a:lnSpc>
-              <a:spcBef>
-                <a:spcPts val="0"/>
-              </a:spcBef>
-              <a:spcAft>
-                <a:spcPts val="800"/>
-              </a:spcAft>
-              <a:buClr>
-                <a:schemeClr val="dk1"/>
-              </a:buClr>
-              <a:buSzPct val="91666"/>
-              <a:buFont typeface="Arial"/>
-              <a:buNone/>
-            </a:pPr>
-            <a:r>
-              <a:rPr lang="en" sz="1200" b="1">
-                <a:solidFill>
-                  <a:srgbClr val="4C886B"/>
-                </a:solidFill>
-                <a:highlight>
-                  <a:srgbClr val="F5F5F5"/>
-                </a:highlight>
-                <a:latin typeface="Courier New"/>
-                <a:ea typeface="Courier New"/>
-                <a:cs typeface="Courier New"/>
-                <a:sym typeface="Courier New"/>
-              </a:rPr>
-              <a:t># Model 2 - Treatment &amp; gender</a:t>
-            </a:r>
-            <a:br>
-              <a:rPr lang="en" sz="1200" b="1">
-                <a:solidFill>
-                  <a:srgbClr val="333333"/>
-                </a:solidFill>
-                <a:highlight>
-                  <a:srgbClr val="F5F5F5"/>
-                </a:highlight>
-                <a:latin typeface="Courier New"/>
-                <a:ea typeface="Courier New"/>
-                <a:cs typeface="Courier New"/>
-                <a:sym typeface="Courier New"/>
-              </a:rPr>
-            </a:br>
-            <a:r>
-              <a:rPr lang="en" sz="1200" b="1">
-                <a:highlight>
-                  <a:srgbClr val="F5F5F5"/>
-                </a:highlight>
-                <a:latin typeface="Courier New"/>
-                <a:ea typeface="Courier New"/>
-                <a:cs typeface="Courier New"/>
-                <a:sym typeface="Courier New"/>
-              </a:rPr>
-              <a:t>m2</a:t>
-            </a:r>
-            <a:r>
-              <a:rPr lang="en" sz="1200" b="1">
-                <a:solidFill>
-                  <a:srgbClr val="333333"/>
-                </a:solidFill>
-                <a:highlight>
-                  <a:srgbClr val="F5F5F5"/>
-                </a:highlight>
-                <a:latin typeface="Courier New"/>
-                <a:ea typeface="Courier New"/>
-                <a:cs typeface="Courier New"/>
-                <a:sym typeface="Courier New"/>
-              </a:rPr>
-              <a:t> </a:t>
-            </a:r>
-            <a:r>
-              <a:rPr lang="en" sz="1200" b="1">
-                <a:solidFill>
-                  <a:srgbClr val="687687"/>
-                </a:solidFill>
-                <a:highlight>
-                  <a:srgbClr val="F5F5F5"/>
-                </a:highlight>
-                <a:latin typeface="Courier New"/>
-                <a:ea typeface="Courier New"/>
-                <a:cs typeface="Courier New"/>
-                <a:sym typeface="Courier New"/>
-              </a:rPr>
-              <a:t>&lt;-</a:t>
-            </a:r>
-            <a:r>
-              <a:rPr lang="en" sz="1200" b="1">
-                <a:solidFill>
-                  <a:srgbClr val="333333"/>
-                </a:solidFill>
-                <a:highlight>
-                  <a:srgbClr val="F5F5F5"/>
-                </a:highlight>
-                <a:latin typeface="Courier New"/>
-                <a:ea typeface="Courier New"/>
-                <a:cs typeface="Courier New"/>
-                <a:sym typeface="Courier New"/>
-              </a:rPr>
-              <a:t> </a:t>
-            </a:r>
-            <a:r>
-              <a:rPr lang="en" sz="1200" b="1">
-                <a:highlight>
-                  <a:srgbClr val="F5F5F5"/>
-                </a:highlight>
-                <a:latin typeface="Courier New"/>
-                <a:ea typeface="Courier New"/>
-                <a:cs typeface="Courier New"/>
-                <a:sym typeface="Courier New"/>
-              </a:rPr>
-              <a:t>lm</a:t>
-            </a:r>
-            <a:r>
-              <a:rPr lang="en" sz="1200" b="1">
-                <a:solidFill>
-                  <a:srgbClr val="687687"/>
-                </a:solidFill>
-                <a:highlight>
-                  <a:srgbClr val="F5F5F5"/>
-                </a:highlight>
-                <a:latin typeface="Courier New"/>
-                <a:ea typeface="Courier New"/>
-                <a:cs typeface="Courier New"/>
-                <a:sym typeface="Courier New"/>
-              </a:rPr>
-              <a:t>(</a:t>
-            </a:r>
-            <a:r>
-              <a:rPr lang="en" sz="1200" b="1">
-                <a:highlight>
-                  <a:srgbClr val="F5F5F5"/>
-                </a:highlight>
-                <a:latin typeface="Courier New"/>
-                <a:ea typeface="Courier New"/>
-                <a:cs typeface="Courier New"/>
-                <a:sym typeface="Courier New"/>
-              </a:rPr>
-              <a:t>outcome</a:t>
-            </a:r>
-            <a:r>
-              <a:rPr lang="en" sz="1200" b="1">
-                <a:solidFill>
-                  <a:srgbClr val="687687"/>
-                </a:solidFill>
-                <a:highlight>
-                  <a:srgbClr val="F5F5F5"/>
-                </a:highlight>
-                <a:latin typeface="Courier New"/>
-                <a:ea typeface="Courier New"/>
-                <a:cs typeface="Courier New"/>
-                <a:sym typeface="Courier New"/>
-              </a:rPr>
-              <a:t>~</a:t>
-            </a:r>
-            <a:r>
-              <a:rPr lang="en" sz="1200" b="1">
-                <a:highlight>
-                  <a:srgbClr val="F5F5F5"/>
-                </a:highlight>
-                <a:latin typeface="Courier New"/>
-                <a:ea typeface="Courier New"/>
-                <a:cs typeface="Courier New"/>
-                <a:sym typeface="Courier New"/>
-              </a:rPr>
-              <a:t>treatment</a:t>
-            </a:r>
-            <a:r>
-              <a:rPr lang="en" sz="1200" b="1">
-                <a:solidFill>
-                  <a:srgbClr val="687687"/>
-                </a:solidFill>
-                <a:highlight>
-                  <a:srgbClr val="F5F5F5"/>
-                </a:highlight>
-                <a:latin typeface="Courier New"/>
-                <a:ea typeface="Courier New"/>
-                <a:cs typeface="Courier New"/>
-                <a:sym typeface="Courier New"/>
-              </a:rPr>
-              <a:t>*</a:t>
-            </a:r>
-            <a:r>
-              <a:rPr lang="en" sz="1200" b="1">
-                <a:highlight>
-                  <a:srgbClr val="F5F5F5"/>
-                </a:highlight>
-                <a:latin typeface="Courier New"/>
-                <a:ea typeface="Courier New"/>
-                <a:cs typeface="Courier New"/>
-                <a:sym typeface="Courier New"/>
-              </a:rPr>
-              <a:t>gender</a:t>
-            </a:r>
-            <a:r>
-              <a:rPr lang="en" sz="1200" b="1">
-                <a:solidFill>
-                  <a:srgbClr val="333333"/>
-                </a:solidFill>
-                <a:highlight>
-                  <a:srgbClr val="F5F5F5"/>
-                </a:highlight>
-                <a:latin typeface="Courier New"/>
-                <a:ea typeface="Courier New"/>
-                <a:cs typeface="Courier New"/>
-                <a:sym typeface="Courier New"/>
-              </a:rPr>
-              <a:t>,</a:t>
-            </a:r>
-            <a:r>
-              <a:rPr lang="en" sz="1200" b="1">
-                <a:highlight>
-                  <a:srgbClr val="F5F5F5"/>
-                </a:highlight>
-                <a:latin typeface="Courier New"/>
-                <a:ea typeface="Courier New"/>
-                <a:cs typeface="Courier New"/>
-                <a:sym typeface="Courier New"/>
-              </a:rPr>
-              <a:t>data</a:t>
-            </a:r>
-            <a:r>
-              <a:rPr lang="en" sz="1200" b="1">
-                <a:solidFill>
-                  <a:srgbClr val="687687"/>
-                </a:solidFill>
-                <a:highlight>
-                  <a:srgbClr val="F5F5F5"/>
-                </a:highlight>
-                <a:latin typeface="Courier New"/>
-                <a:ea typeface="Courier New"/>
-                <a:cs typeface="Courier New"/>
-                <a:sym typeface="Courier New"/>
-              </a:rPr>
-              <a:t>=</a:t>
-            </a:r>
-            <a:r>
-              <a:rPr lang="en" sz="1200" b="1">
-                <a:highlight>
-                  <a:srgbClr val="F5F5F5"/>
-                </a:highlight>
-                <a:latin typeface="Courier New"/>
-                <a:ea typeface="Courier New"/>
-                <a:cs typeface="Courier New"/>
-                <a:sym typeface="Courier New"/>
-              </a:rPr>
-              <a:t>d</a:t>
-            </a:r>
-            <a:r>
-              <a:rPr lang="en" sz="1200" b="1">
-                <a:solidFill>
-                  <a:srgbClr val="687687"/>
-                </a:solidFill>
-                <a:highlight>
-                  <a:srgbClr val="F5F5F5"/>
-                </a:highlight>
-                <a:latin typeface="Courier New"/>
-                <a:ea typeface="Courier New"/>
-                <a:cs typeface="Courier New"/>
-                <a:sym typeface="Courier New"/>
-              </a:rPr>
-              <a:t>)</a:t>
-            </a:r>
-          </a:p>
-          <a:p>
-            <a:pPr lvl="0">
-              <a:spcBef>
-                <a:spcPts val="0"/>
-              </a:spcBef>
-              <a:buNone/>
-            </a:pPr>
-            <a:endParaRPr/>
-          </a:p>
-        </p:txBody>
-      </p:sp>
-      <p:sp>
-        <p:nvSpPr>
-          <p:cNvPr id="79" name="Shape 79"/>
-          <p:cNvSpPr txBox="1">
-            <a:spLocks noGrp="1"/>
-          </p:cNvSpPr>
-          <p:nvPr>
-            <p:ph type="body" idx="1"/>
-          </p:nvPr>
-        </p:nvSpPr>
+      </p:pic>
+      <p:pic>
+        <p:nvPicPr>
+          <p:cNvPr id="7" name="Picture 6"/>
+          <p:cNvPicPr>
+            <a:picLocks noChangeAspect="1"/>
+          </p:cNvPicPr>
+          <p:nvPr/>
+        </p:nvPicPr>
+        <p:blipFill>
+          <a:blip r:embed="rId3"/>
+          <a:stretch>
+            <a:fillRect/>
+          </a:stretch>
+        </p:blipFill>
         <p:spPr>
+          <a:xfrm>
+            <a:off x="486015" y="1268492"/>
+            <a:ext cx="3610479" cy="2781688"/>
+          </a:xfrm>
           <a:prstGeom prst="rect">
             <a:avLst/>
           </a:prstGeom>
         </p:spPr>
-        <p:txBody>
-          <a:bodyPr lIns="91425" tIns="91425" rIns="91425" bIns="91425" anchor="t" anchorCtr="0">
-            <a:noAutofit/>
-          </a:bodyPr>
-          <a:lstStyle/>
-          <a:p>
-            <a:pPr lvl="0" rtl="0">
-              <a:lnSpc>
-                <a:spcPct val="142857"/>
-              </a:lnSpc>
-              <a:spcBef>
-                <a:spcPts val="0"/>
-              </a:spcBef>
-              <a:spcAft>
-                <a:spcPts val="800"/>
-              </a:spcAft>
-              <a:buClr>
-                <a:schemeClr val="dk1"/>
-              </a:buClr>
-              <a:buSzPct val="91666"/>
-              <a:buFont typeface="Arial"/>
-              <a:buNone/>
-            </a:pPr>
-            <a:r>
-              <a:rPr lang="en" sz="1200" b="1" dirty="0">
-                <a:solidFill>
-                  <a:srgbClr val="333333"/>
-                </a:solidFill>
-                <a:highlight>
-                  <a:srgbClr val="FFFFFF"/>
-                </a:highlight>
-                <a:latin typeface="Courier New"/>
-                <a:ea typeface="Courier New"/>
-                <a:cs typeface="Courier New"/>
-                <a:sym typeface="Courier New"/>
-              </a:rPr>
-              <a:t>t test of coefficients:</a:t>
-            </a:r>
-            <a:br>
-              <a:rPr lang="en" sz="1200" b="1" dirty="0">
-                <a:solidFill>
-                  <a:srgbClr val="333333"/>
-                </a:solidFill>
-                <a:highlight>
-                  <a:srgbClr val="FFFFFF"/>
-                </a:highlight>
-                <a:latin typeface="Courier New"/>
-                <a:ea typeface="Courier New"/>
-                <a:cs typeface="Courier New"/>
-                <a:sym typeface="Courier New"/>
-              </a:rPr>
-            </a:br>
-            <a:br>
-              <a:rPr lang="en" sz="1200" b="1" dirty="0">
-                <a:solidFill>
-                  <a:srgbClr val="333333"/>
-                </a:solidFill>
-                <a:highlight>
-                  <a:srgbClr val="FFFFFF"/>
-                </a:highlight>
-                <a:latin typeface="Courier New"/>
-                <a:ea typeface="Courier New"/>
-                <a:cs typeface="Courier New"/>
-                <a:sym typeface="Courier New"/>
-              </a:rPr>
-            </a:br>
-            <a:r>
-              <a:rPr lang="en" sz="1200" b="1" dirty="0">
-                <a:solidFill>
-                  <a:srgbClr val="333333"/>
-                </a:solidFill>
-                <a:highlight>
-                  <a:srgbClr val="FFFFFF"/>
-                </a:highlight>
-                <a:latin typeface="Courier New"/>
-                <a:ea typeface="Courier New"/>
-                <a:cs typeface="Courier New"/>
-                <a:sym typeface="Courier New"/>
-              </a:rPr>
-              <a:t>                  Estimate Std. Error t value  </a:t>
-            </a:r>
-            <a:r>
-              <a:rPr lang="en" sz="1200" b="1" dirty="0" err="1">
-                <a:solidFill>
-                  <a:srgbClr val="333333"/>
-                </a:solidFill>
-                <a:highlight>
-                  <a:srgbClr val="FFFFFF"/>
-                </a:highlight>
-                <a:latin typeface="Courier New"/>
-                <a:ea typeface="Courier New"/>
-                <a:cs typeface="Courier New"/>
-                <a:sym typeface="Courier New"/>
-              </a:rPr>
-              <a:t>Pr</a:t>
-            </a:r>
-            <a:r>
-              <a:rPr lang="en" sz="1200" b="1" dirty="0">
-                <a:solidFill>
-                  <a:srgbClr val="333333"/>
-                </a:solidFill>
-                <a:highlight>
-                  <a:srgbClr val="FFFFFF"/>
-                </a:highlight>
-                <a:latin typeface="Courier New"/>
-                <a:ea typeface="Courier New"/>
-                <a:cs typeface="Courier New"/>
-                <a:sym typeface="Courier New"/>
-              </a:rPr>
-              <a:t>(&gt;|t|)    </a:t>
-            </a:r>
-            <a:br>
-              <a:rPr lang="en" sz="1200" b="1" dirty="0">
-                <a:solidFill>
-                  <a:srgbClr val="333333"/>
-                </a:solidFill>
-                <a:highlight>
-                  <a:srgbClr val="FFFFFF"/>
-                </a:highlight>
-                <a:latin typeface="Courier New"/>
-                <a:ea typeface="Courier New"/>
-                <a:cs typeface="Courier New"/>
-                <a:sym typeface="Courier New"/>
-              </a:rPr>
-            </a:br>
-            <a:r>
-              <a:rPr lang="en" sz="1200" b="1" dirty="0">
-                <a:solidFill>
-                  <a:srgbClr val="333333"/>
-                </a:solidFill>
-                <a:highlight>
-                  <a:srgbClr val="FFFFFF"/>
-                </a:highlight>
-                <a:latin typeface="Courier New"/>
-                <a:ea typeface="Courier New"/>
-                <a:cs typeface="Courier New"/>
-                <a:sym typeface="Courier New"/>
-              </a:rPr>
-              <a:t>(Intercept)       0.420269   0.050348  8.3472 7.548e-16 ***</a:t>
-            </a:r>
-            <a:br>
-              <a:rPr lang="en" sz="1200" b="1" dirty="0">
-                <a:solidFill>
-                  <a:srgbClr val="333333"/>
-                </a:solidFill>
-                <a:highlight>
-                  <a:srgbClr val="FFFFFF"/>
-                </a:highlight>
-                <a:latin typeface="Courier New"/>
-                <a:ea typeface="Courier New"/>
-                <a:cs typeface="Courier New"/>
-                <a:sym typeface="Courier New"/>
-              </a:rPr>
-            </a:br>
-            <a:r>
-              <a:rPr lang="en" sz="1200" b="1" dirty="0">
-                <a:solidFill>
-                  <a:srgbClr val="333333"/>
-                </a:solidFill>
-                <a:highlight>
-                  <a:srgbClr val="FFFFFF"/>
-                </a:highlight>
-                <a:latin typeface="Courier New"/>
-                <a:ea typeface="Courier New"/>
-                <a:cs typeface="Courier New"/>
-                <a:sym typeface="Courier New"/>
-              </a:rPr>
-              <a:t>treatment         0.014940   0.039035  0.3827    0.7021    </a:t>
-            </a:r>
-            <a:br>
-              <a:rPr lang="en" sz="1200" b="1" dirty="0">
-                <a:solidFill>
-                  <a:srgbClr val="333333"/>
-                </a:solidFill>
-                <a:highlight>
-                  <a:srgbClr val="FFFFFF"/>
-                </a:highlight>
-                <a:latin typeface="Courier New"/>
-                <a:ea typeface="Courier New"/>
-                <a:cs typeface="Courier New"/>
-                <a:sym typeface="Courier New"/>
-              </a:rPr>
-            </a:br>
-            <a:r>
-              <a:rPr lang="en" sz="1200" b="1" dirty="0">
-                <a:solidFill>
-                  <a:srgbClr val="333333"/>
-                </a:solidFill>
-                <a:highlight>
-                  <a:srgbClr val="FFFFFF"/>
-                </a:highlight>
-                <a:latin typeface="Courier New"/>
-                <a:ea typeface="Courier New"/>
-                <a:cs typeface="Courier New"/>
-                <a:sym typeface="Courier New"/>
-              </a:rPr>
-              <a:t>gender            0.053678   0.072275  0.7427    0.4580    </a:t>
-            </a:r>
-            <a:br>
-              <a:rPr lang="en" sz="1200" b="1" dirty="0">
-                <a:solidFill>
-                  <a:srgbClr val="333333"/>
-                </a:solidFill>
-                <a:highlight>
-                  <a:srgbClr val="FFFFFF"/>
-                </a:highlight>
-                <a:latin typeface="Courier New"/>
-                <a:ea typeface="Courier New"/>
-                <a:cs typeface="Courier New"/>
-                <a:sym typeface="Courier New"/>
-              </a:rPr>
-            </a:br>
-            <a:r>
-              <a:rPr lang="en" sz="1200" b="1" dirty="0" err="1">
-                <a:solidFill>
-                  <a:srgbClr val="333333"/>
-                </a:solidFill>
-                <a:highlight>
-                  <a:srgbClr val="FFFFFF"/>
-                </a:highlight>
-                <a:latin typeface="Courier New"/>
-                <a:ea typeface="Courier New"/>
-                <a:cs typeface="Courier New"/>
-                <a:sym typeface="Courier New"/>
-              </a:rPr>
-              <a:t>treatment:gender</a:t>
-            </a:r>
-            <a:r>
-              <a:rPr lang="en" sz="1200" b="1" dirty="0">
-                <a:solidFill>
-                  <a:srgbClr val="333333"/>
-                </a:solidFill>
-                <a:highlight>
-                  <a:srgbClr val="FFFFFF"/>
-                </a:highlight>
-                <a:latin typeface="Courier New"/>
-                <a:ea typeface="Courier New"/>
-                <a:cs typeface="Courier New"/>
-                <a:sym typeface="Courier New"/>
-              </a:rPr>
-              <a:t> -0.017544   0.055980 -0.3134    0.7541    </a:t>
-            </a:r>
-            <a:br>
-              <a:rPr lang="en" sz="1200" b="1" dirty="0">
-                <a:solidFill>
-                  <a:srgbClr val="333333"/>
-                </a:solidFill>
-                <a:highlight>
-                  <a:srgbClr val="FFFFFF"/>
-                </a:highlight>
-                <a:latin typeface="Courier New"/>
-                <a:ea typeface="Courier New"/>
-                <a:cs typeface="Courier New"/>
-                <a:sym typeface="Courier New"/>
-              </a:rPr>
-            </a:br>
-            <a:r>
-              <a:rPr lang="en" sz="1200" b="1" dirty="0">
-                <a:solidFill>
-                  <a:srgbClr val="333333"/>
-                </a:solidFill>
-                <a:highlight>
-                  <a:srgbClr val="FFFFFF"/>
-                </a:highlight>
-                <a:latin typeface="Courier New"/>
-                <a:ea typeface="Courier New"/>
-                <a:cs typeface="Courier New"/>
-                <a:sym typeface="Courier New"/>
-              </a:rPr>
-              <a:t>---</a:t>
-            </a:r>
-            <a:br>
-              <a:rPr lang="en" sz="1200" b="1" dirty="0">
-                <a:solidFill>
-                  <a:srgbClr val="333333"/>
-                </a:solidFill>
-                <a:highlight>
-                  <a:srgbClr val="FFFFFF"/>
-                </a:highlight>
-                <a:latin typeface="Courier New"/>
-                <a:ea typeface="Courier New"/>
-                <a:cs typeface="Courier New"/>
-                <a:sym typeface="Courier New"/>
-              </a:rPr>
-            </a:br>
-            <a:r>
-              <a:rPr lang="en" sz="1200" b="1" dirty="0" err="1">
-                <a:solidFill>
-                  <a:srgbClr val="333333"/>
-                </a:solidFill>
-                <a:highlight>
-                  <a:srgbClr val="FFFFFF"/>
-                </a:highlight>
-                <a:latin typeface="Courier New"/>
-                <a:ea typeface="Courier New"/>
-                <a:cs typeface="Courier New"/>
-                <a:sym typeface="Courier New"/>
-              </a:rPr>
-              <a:t>Signif</a:t>
-            </a:r>
-            <a:r>
-              <a:rPr lang="en" sz="1200" b="1" dirty="0">
-                <a:solidFill>
-                  <a:srgbClr val="333333"/>
-                </a:solidFill>
-                <a:highlight>
-                  <a:srgbClr val="FFFFFF"/>
-                </a:highlight>
-                <a:latin typeface="Courier New"/>
-                <a:ea typeface="Courier New"/>
-                <a:cs typeface="Courier New"/>
-                <a:sym typeface="Courier New"/>
-              </a:rPr>
-              <a:t>. codes:  0 ‘***’ 0.001 ‘**’ 0.01 ‘*’ 0.05 ‘.’ 0.1 ‘ ’ 1</a:t>
-            </a:r>
-          </a:p>
-          <a:p>
-            <a:pPr>
-              <a:lnSpc>
-                <a:spcPct val="142857"/>
-              </a:lnSpc>
-              <a:spcAft>
-                <a:spcPts val="800"/>
-              </a:spcAft>
-              <a:buClr>
-                <a:schemeClr val="dk1"/>
-              </a:buClr>
-              <a:buSzPct val="91666"/>
-              <a:buNone/>
-            </a:pPr>
-            <a:r>
-              <a:rPr lang="en-US" sz="1200" b="1" dirty="0">
-                <a:solidFill>
-                  <a:srgbClr val="333333"/>
-                </a:solidFill>
-                <a:highlight>
-                  <a:srgbClr val="FFFFFF"/>
-                </a:highlight>
-                <a:latin typeface="Courier New"/>
-                <a:ea typeface="Courier New"/>
-                <a:cs typeface="Courier New"/>
-                <a:sym typeface="Courier New"/>
-              </a:rPr>
-              <a:t>treatment variable is coded 2 for high, 1 for low, 0 for none</a:t>
-            </a:r>
-            <a:endParaRPr lang="en" sz="1200" b="1" dirty="0">
-              <a:solidFill>
-                <a:srgbClr val="333333"/>
-              </a:solidFill>
-              <a:highlight>
-                <a:srgbClr val="FFFFFF"/>
-              </a:highlight>
-              <a:latin typeface="Courier New"/>
-              <a:ea typeface="Courier New"/>
-              <a:cs typeface="Courier New"/>
-              <a:sym typeface="Courier New"/>
-            </a:endParaRPr>
-          </a:p>
-          <a:p>
-            <a:pPr lvl="0" rtl="0">
-              <a:lnSpc>
-                <a:spcPct val="142857"/>
-              </a:lnSpc>
-              <a:spcBef>
-                <a:spcPts val="0"/>
-              </a:spcBef>
-              <a:spcAft>
-                <a:spcPts val="800"/>
-              </a:spcAft>
-              <a:buClr>
-                <a:schemeClr val="dk1"/>
-              </a:buClr>
-              <a:buSzPct val="91666"/>
-              <a:buFont typeface="Arial"/>
-              <a:buNone/>
-            </a:pPr>
-            <a:endParaRPr lang="en" sz="1200" b="1" dirty="0">
-              <a:solidFill>
-                <a:srgbClr val="333333"/>
-              </a:solidFill>
-              <a:highlight>
-                <a:srgbClr val="FFFFFF"/>
-              </a:highlight>
-              <a:latin typeface="Courier New"/>
-              <a:ea typeface="Courier New"/>
-              <a:cs typeface="Courier New"/>
-              <a:sym typeface="Courier New"/>
-            </a:endParaRPr>
-          </a:p>
-          <a:p>
-            <a:pPr lvl="0">
-              <a:spcBef>
-                <a:spcPts val="0"/>
-              </a:spcBef>
-              <a:buNone/>
-            </a:pPr>
-            <a:endParaRPr dirty="0"/>
-          </a:p>
-        </p:txBody>
-      </p:sp>
+      </p:pic>
     </p:spTree>
+    <p:extLst>
+      <p:ext uri="{BB962C8B-B14F-4D97-AF65-F5344CB8AC3E}">
+        <p14:creationId xmlns:p14="http://schemas.microsoft.com/office/powerpoint/2010/main" val="2103020093"/>
+      </p:ext>
+    </p:extLst>
   </p:cSld>
   <p:clrMapOvr>
     <a:masterClrMapping/>
@@ -5835,7 +4382,7 @@
   <p:cSld>
     <p:spTree>
       <p:nvGrpSpPr>
-        <p:cNvPr id="1" name="Shape 83"/>
+        <p:cNvPr id="1" name=""/>
         <p:cNvGrpSpPr/>
         <p:nvPr/>
       </p:nvGrpSpPr>
@@ -5849,910 +4396,57 @@
       </p:grpSpPr>
       <p:sp>
         <p:nvSpPr>
-          <p:cNvPr id="84" name="Shape 84"/>
-          <p:cNvSpPr txBox="1">
+          <p:cNvPr id="6" name="Title 5"/>
+          <p:cNvSpPr>
             <a:spLocks noGrp="1"/>
           </p:cNvSpPr>
           <p:nvPr>
             <p:ph type="title"/>
           </p:nvPr>
         </p:nvSpPr>
+        <p:spPr/>
+        <p:txBody>
+          <a:bodyPr anchor="t"/>
+          <a:lstStyle/>
+          <a:p>
+            <a:pPr algn="ctr"/>
+            <a:r>
+              <a:rPr lang="en-US" b="1" dirty="0"/>
+              <a:t>Randomization Inference</a:t>
+            </a:r>
+          </a:p>
+        </p:txBody>
+      </p:sp>
+      <p:pic>
+        <p:nvPicPr>
+          <p:cNvPr id="5" name="Picture 4"/>
+          <p:cNvPicPr>
+            <a:picLocks noChangeAspect="1"/>
+          </p:cNvPicPr>
+          <p:nvPr/>
+        </p:nvPicPr>
+        <p:blipFill>
+          <a:blip r:embed="rId2"/>
+          <a:stretch>
+            <a:fillRect/>
+          </a:stretch>
+        </p:blipFill>
         <p:spPr>
+          <a:xfrm>
+            <a:off x="946404" y="1042804"/>
+            <a:ext cx="6630325" cy="4039164"/>
+          </a:xfrm>
           <a:prstGeom prst="rect">
             <a:avLst/>
           </a:prstGeom>
         </p:spPr>
-        <p:txBody>
-          <a:bodyPr lIns="91425" tIns="91425" rIns="91425" bIns="91425" anchor="t" anchorCtr="0">
-            <a:noAutofit/>
-          </a:bodyPr>
-          <a:lstStyle/>
-          <a:p>
-            <a:pPr lvl="0" rtl="0">
-              <a:lnSpc>
-                <a:spcPct val="142857"/>
-              </a:lnSpc>
-              <a:spcBef>
-                <a:spcPts val="0"/>
-              </a:spcBef>
-              <a:spcAft>
-                <a:spcPts val="800"/>
-              </a:spcAft>
-              <a:buClr>
-                <a:schemeClr val="dk1"/>
-              </a:buClr>
-              <a:buSzPct val="91666"/>
-              <a:buFont typeface="Arial"/>
-              <a:buNone/>
-            </a:pPr>
-            <a:r>
-              <a:rPr lang="en" sz="1200" b="1" dirty="0">
-                <a:solidFill>
-                  <a:srgbClr val="4C886B"/>
-                </a:solidFill>
-                <a:highlight>
-                  <a:srgbClr val="F5F5F5"/>
-                </a:highlight>
-                <a:latin typeface="Courier New"/>
-                <a:ea typeface="Courier New"/>
-                <a:cs typeface="Courier New"/>
-                <a:sym typeface="Courier New"/>
-              </a:rPr>
-              <a:t># Model 4 - Treatment &amp; </a:t>
-            </a:r>
-            <a:r>
-              <a:rPr lang="en" sz="1200" b="1" dirty="0" err="1">
-                <a:solidFill>
-                  <a:srgbClr val="4C886B"/>
-                </a:solidFill>
-                <a:highlight>
-                  <a:srgbClr val="F5F5F5"/>
-                </a:highlight>
-                <a:latin typeface="Courier New"/>
-                <a:ea typeface="Courier New"/>
-                <a:cs typeface="Courier New"/>
-                <a:sym typeface="Courier New"/>
-              </a:rPr>
-              <a:t>ge</a:t>
-            </a:r>
-            <a:r>
-              <a:rPr lang="en-US" sz="1200" b="1" dirty="0">
-                <a:solidFill>
-                  <a:srgbClr val="4C886B"/>
-                </a:solidFill>
-                <a:highlight>
-                  <a:srgbClr val="F5F5F5"/>
-                </a:highlight>
-                <a:latin typeface="Courier New"/>
-                <a:ea typeface="Courier New"/>
-                <a:cs typeface="Courier New"/>
-                <a:sym typeface="Courier New"/>
-              </a:rPr>
-              <a:t>n</a:t>
-            </a:r>
-            <a:r>
-              <a:rPr lang="en" sz="1200" b="1" dirty="0">
-                <a:solidFill>
-                  <a:srgbClr val="4C886B"/>
-                </a:solidFill>
-                <a:highlight>
-                  <a:srgbClr val="F5F5F5"/>
-                </a:highlight>
-                <a:latin typeface="Courier New"/>
-                <a:ea typeface="Courier New"/>
-                <a:cs typeface="Courier New"/>
-                <a:sym typeface="Courier New"/>
-              </a:rPr>
-              <a:t>der + covariates</a:t>
-            </a:r>
-            <a:br>
-              <a:rPr lang="en" sz="1200" b="1" dirty="0">
-                <a:solidFill>
-                  <a:srgbClr val="333333"/>
-                </a:solidFill>
-                <a:highlight>
-                  <a:srgbClr val="F5F5F5"/>
-                </a:highlight>
-                <a:latin typeface="Courier New"/>
-                <a:ea typeface="Courier New"/>
-                <a:cs typeface="Courier New"/>
-                <a:sym typeface="Courier New"/>
-              </a:rPr>
-            </a:br>
-            <a:r>
-              <a:rPr lang="en" sz="1200" b="1" dirty="0">
-                <a:highlight>
-                  <a:srgbClr val="F5F5F5"/>
-                </a:highlight>
-                <a:latin typeface="Courier New"/>
-                <a:ea typeface="Courier New"/>
-                <a:cs typeface="Courier New"/>
-                <a:sym typeface="Courier New"/>
-              </a:rPr>
-              <a:t>m4</a:t>
-            </a:r>
-            <a:r>
-              <a:rPr lang="en" sz="1200" b="1" dirty="0">
-                <a:solidFill>
-                  <a:srgbClr val="333333"/>
-                </a:solidFill>
-                <a:highlight>
-                  <a:srgbClr val="F5F5F5"/>
-                </a:highlight>
-                <a:latin typeface="Courier New"/>
-                <a:ea typeface="Courier New"/>
-                <a:cs typeface="Courier New"/>
-                <a:sym typeface="Courier New"/>
-              </a:rPr>
-              <a:t> </a:t>
-            </a:r>
-            <a:r>
-              <a:rPr lang="en" sz="1200" b="1" dirty="0">
-                <a:solidFill>
-                  <a:srgbClr val="687687"/>
-                </a:solidFill>
-                <a:highlight>
-                  <a:srgbClr val="F5F5F5"/>
-                </a:highlight>
-                <a:latin typeface="Courier New"/>
-                <a:ea typeface="Courier New"/>
-                <a:cs typeface="Courier New"/>
-                <a:sym typeface="Courier New"/>
-              </a:rPr>
-              <a:t>&lt;-</a:t>
-            </a:r>
-            <a:r>
-              <a:rPr lang="en" sz="1200" b="1" dirty="0">
-                <a:solidFill>
-                  <a:srgbClr val="333333"/>
-                </a:solidFill>
-                <a:highlight>
-                  <a:srgbClr val="F5F5F5"/>
-                </a:highlight>
-                <a:latin typeface="Courier New"/>
-                <a:ea typeface="Courier New"/>
-                <a:cs typeface="Courier New"/>
-                <a:sym typeface="Courier New"/>
-              </a:rPr>
-              <a:t> </a:t>
-            </a:r>
-            <a:r>
-              <a:rPr lang="en" sz="1200" b="1" dirty="0">
-                <a:highlight>
-                  <a:srgbClr val="F5F5F5"/>
-                </a:highlight>
-                <a:latin typeface="Courier New"/>
-                <a:ea typeface="Courier New"/>
-                <a:cs typeface="Courier New"/>
-                <a:sym typeface="Courier New"/>
-              </a:rPr>
-              <a:t>lm</a:t>
-            </a:r>
-            <a:r>
-              <a:rPr lang="en" sz="1200" b="1" dirty="0">
-                <a:solidFill>
-                  <a:srgbClr val="687687"/>
-                </a:solidFill>
-                <a:highlight>
-                  <a:srgbClr val="F5F5F5"/>
-                </a:highlight>
-                <a:latin typeface="Courier New"/>
-                <a:ea typeface="Courier New"/>
-                <a:cs typeface="Courier New"/>
-                <a:sym typeface="Courier New"/>
-              </a:rPr>
-              <a:t>(</a:t>
-            </a:r>
-            <a:r>
-              <a:rPr lang="en" sz="1200" b="1" dirty="0" err="1">
-                <a:highlight>
-                  <a:srgbClr val="F5F5F5"/>
-                </a:highlight>
-                <a:latin typeface="Courier New"/>
-                <a:ea typeface="Courier New"/>
-                <a:cs typeface="Courier New"/>
-                <a:sym typeface="Courier New"/>
-              </a:rPr>
-              <a:t>outcome</a:t>
-            </a:r>
-            <a:r>
-              <a:rPr lang="en" sz="1200" b="1" dirty="0" err="1">
-                <a:solidFill>
-                  <a:srgbClr val="687687"/>
-                </a:solidFill>
-                <a:highlight>
-                  <a:srgbClr val="F5F5F5"/>
-                </a:highlight>
-                <a:latin typeface="Courier New"/>
-                <a:ea typeface="Courier New"/>
-                <a:cs typeface="Courier New"/>
-                <a:sym typeface="Courier New"/>
-              </a:rPr>
-              <a:t>~</a:t>
-            </a:r>
-            <a:r>
-              <a:rPr lang="en" sz="1200" b="1" dirty="0" err="1">
-                <a:highlight>
-                  <a:srgbClr val="F5F5F5"/>
-                </a:highlight>
-                <a:latin typeface="Courier New"/>
-                <a:ea typeface="Courier New"/>
-                <a:cs typeface="Courier New"/>
-                <a:sym typeface="Courier New"/>
-              </a:rPr>
-              <a:t>treatment</a:t>
-            </a:r>
-            <a:r>
-              <a:rPr lang="en" sz="1200" b="1" dirty="0">
-                <a:solidFill>
-                  <a:srgbClr val="687687"/>
-                </a:solidFill>
-                <a:highlight>
-                  <a:srgbClr val="F5F5F5"/>
-                </a:highlight>
-                <a:latin typeface="Courier New"/>
-                <a:ea typeface="Courier New"/>
-                <a:cs typeface="Courier New"/>
-                <a:sym typeface="Courier New"/>
-              </a:rPr>
-              <a:t>*</a:t>
-            </a:r>
-            <a:r>
-              <a:rPr lang="en" sz="1200" b="1" dirty="0" err="1">
-                <a:highlight>
-                  <a:srgbClr val="F5F5F5"/>
-                </a:highlight>
-                <a:latin typeface="Courier New"/>
-                <a:ea typeface="Courier New"/>
-                <a:cs typeface="Courier New"/>
-                <a:sym typeface="Courier New"/>
-              </a:rPr>
-              <a:t>gender</a:t>
-            </a:r>
-            <a:r>
-              <a:rPr lang="en" sz="1200" b="1" dirty="0" err="1">
-                <a:solidFill>
-                  <a:srgbClr val="687687"/>
-                </a:solidFill>
-                <a:highlight>
-                  <a:srgbClr val="F5F5F5"/>
-                </a:highlight>
-                <a:latin typeface="Courier New"/>
-                <a:ea typeface="Courier New"/>
-                <a:cs typeface="Courier New"/>
-                <a:sym typeface="Courier New"/>
-              </a:rPr>
-              <a:t>+</a:t>
-            </a:r>
-            <a:r>
-              <a:rPr lang="en" sz="1200" b="1" dirty="0" err="1">
-                <a:highlight>
-                  <a:srgbClr val="F5F5F5"/>
-                </a:highlight>
-                <a:latin typeface="Courier New"/>
-                <a:ea typeface="Courier New"/>
-                <a:cs typeface="Courier New"/>
-                <a:sym typeface="Courier New"/>
-              </a:rPr>
-              <a:t>factor</a:t>
-            </a:r>
-            <a:r>
-              <a:rPr lang="en" sz="1200" b="1" dirty="0">
-                <a:solidFill>
-                  <a:srgbClr val="687687"/>
-                </a:solidFill>
-                <a:highlight>
-                  <a:srgbClr val="F5F5F5"/>
-                </a:highlight>
-                <a:latin typeface="Courier New"/>
-                <a:ea typeface="Courier New"/>
-                <a:cs typeface="Courier New"/>
-                <a:sym typeface="Courier New"/>
-              </a:rPr>
-              <a:t>(</a:t>
-            </a:r>
-            <a:r>
-              <a:rPr lang="en" sz="1200" b="1" dirty="0">
-                <a:highlight>
-                  <a:srgbClr val="F5F5F5"/>
-                </a:highlight>
-                <a:latin typeface="Courier New"/>
-                <a:ea typeface="Courier New"/>
-                <a:cs typeface="Courier New"/>
-                <a:sym typeface="Courier New"/>
-              </a:rPr>
-              <a:t>city</a:t>
-            </a:r>
-            <a:r>
-              <a:rPr lang="en" sz="1200" b="1" dirty="0">
-                <a:solidFill>
-                  <a:srgbClr val="687687"/>
-                </a:solidFill>
-                <a:highlight>
-                  <a:srgbClr val="F5F5F5"/>
-                </a:highlight>
-                <a:latin typeface="Courier New"/>
-                <a:ea typeface="Courier New"/>
-                <a:cs typeface="Courier New"/>
-                <a:sym typeface="Courier New"/>
-              </a:rPr>
-              <a:t>)+</a:t>
-            </a:r>
-            <a:r>
-              <a:rPr lang="en" sz="1200" b="1" dirty="0">
-                <a:highlight>
-                  <a:srgbClr val="F5F5F5"/>
-                </a:highlight>
-                <a:latin typeface="Courier New"/>
-                <a:ea typeface="Courier New"/>
-                <a:cs typeface="Courier New"/>
-                <a:sym typeface="Courier New"/>
-              </a:rPr>
-              <a:t>factor</a:t>
-            </a:r>
-            <a:r>
-              <a:rPr lang="en" sz="1200" b="1" dirty="0">
-                <a:solidFill>
-                  <a:srgbClr val="687687"/>
-                </a:solidFill>
-                <a:highlight>
-                  <a:srgbClr val="F5F5F5"/>
-                </a:highlight>
-                <a:latin typeface="Courier New"/>
-                <a:ea typeface="Courier New"/>
-                <a:cs typeface="Courier New"/>
-                <a:sym typeface="Courier New"/>
-              </a:rPr>
-              <a:t>(</a:t>
-            </a:r>
-            <a:r>
-              <a:rPr lang="en" sz="1200" b="1" dirty="0">
-                <a:highlight>
-                  <a:srgbClr val="F5F5F5"/>
-                </a:highlight>
-                <a:latin typeface="Courier New"/>
-                <a:ea typeface="Courier New"/>
-                <a:cs typeface="Courier New"/>
-                <a:sym typeface="Courier New"/>
-              </a:rPr>
-              <a:t>bedrooms</a:t>
-            </a:r>
-            <a:r>
-              <a:rPr lang="en" sz="1200" b="1" dirty="0">
-                <a:solidFill>
-                  <a:srgbClr val="687687"/>
-                </a:solidFill>
-                <a:highlight>
-                  <a:srgbClr val="F5F5F5"/>
-                </a:highlight>
-                <a:latin typeface="Courier New"/>
-                <a:ea typeface="Courier New"/>
-                <a:cs typeface="Courier New"/>
-                <a:sym typeface="Courier New"/>
-              </a:rPr>
-              <a:t>)+</a:t>
-            </a:r>
-            <a:r>
-              <a:rPr lang="en" sz="1200" b="1" dirty="0" err="1">
-                <a:highlight>
-                  <a:srgbClr val="F5F5F5"/>
-                </a:highlight>
-                <a:latin typeface="Courier New"/>
-                <a:ea typeface="Courier New"/>
-                <a:cs typeface="Courier New"/>
-                <a:sym typeface="Courier New"/>
-              </a:rPr>
-              <a:t>price</a:t>
-            </a:r>
-            <a:r>
-              <a:rPr lang="en" sz="1200" b="1" dirty="0" err="1">
-                <a:solidFill>
-                  <a:srgbClr val="333333"/>
-                </a:solidFill>
-                <a:highlight>
-                  <a:srgbClr val="F5F5F5"/>
-                </a:highlight>
-                <a:latin typeface="Courier New"/>
-                <a:ea typeface="Courier New"/>
-                <a:cs typeface="Courier New"/>
-                <a:sym typeface="Courier New"/>
-              </a:rPr>
-              <a:t>,</a:t>
-            </a:r>
-            <a:r>
-              <a:rPr lang="en" sz="1200" b="1" dirty="0" err="1">
-                <a:highlight>
-                  <a:srgbClr val="F5F5F5"/>
-                </a:highlight>
-                <a:latin typeface="Courier New"/>
-                <a:ea typeface="Courier New"/>
-                <a:cs typeface="Courier New"/>
-                <a:sym typeface="Courier New"/>
-              </a:rPr>
-              <a:t>data</a:t>
-            </a:r>
-            <a:r>
-              <a:rPr lang="en" sz="1200" b="1" dirty="0">
-                <a:solidFill>
-                  <a:srgbClr val="687687"/>
-                </a:solidFill>
-                <a:highlight>
-                  <a:srgbClr val="F5F5F5"/>
-                </a:highlight>
-                <a:latin typeface="Courier New"/>
-                <a:ea typeface="Courier New"/>
-                <a:cs typeface="Courier New"/>
-                <a:sym typeface="Courier New"/>
-              </a:rPr>
-              <a:t>=</a:t>
-            </a:r>
-            <a:r>
-              <a:rPr lang="en" sz="1200" b="1" dirty="0">
-                <a:highlight>
-                  <a:srgbClr val="F5F5F5"/>
-                </a:highlight>
-                <a:latin typeface="Courier New"/>
-                <a:ea typeface="Courier New"/>
-                <a:cs typeface="Courier New"/>
-                <a:sym typeface="Courier New"/>
-              </a:rPr>
-              <a:t>d</a:t>
-            </a:r>
-            <a:r>
-              <a:rPr lang="en" sz="1200" b="1" dirty="0">
-                <a:solidFill>
-                  <a:srgbClr val="687687"/>
-                </a:solidFill>
-                <a:highlight>
-                  <a:srgbClr val="F5F5F5"/>
-                </a:highlight>
-                <a:latin typeface="Courier New"/>
-                <a:ea typeface="Courier New"/>
-                <a:cs typeface="Courier New"/>
-                <a:sym typeface="Courier New"/>
-              </a:rPr>
-              <a:t>)</a:t>
-            </a:r>
-          </a:p>
-          <a:p>
-            <a:pPr lvl="0">
-              <a:spcBef>
-                <a:spcPts val="0"/>
-              </a:spcBef>
-              <a:buNone/>
-            </a:pPr>
-            <a:endParaRPr dirty="0"/>
-          </a:p>
-        </p:txBody>
-      </p:sp>
-      <p:sp>
-        <p:nvSpPr>
-          <p:cNvPr id="85" name="Shape 85"/>
-          <p:cNvSpPr txBox="1">
-            <a:spLocks noGrp="1"/>
-          </p:cNvSpPr>
-          <p:nvPr>
-            <p:ph type="body" idx="1"/>
-          </p:nvPr>
-        </p:nvSpPr>
-        <p:spPr>
-          <a:prstGeom prst="rect">
-            <a:avLst/>
-          </a:prstGeom>
-        </p:spPr>
-        <p:txBody>
-          <a:bodyPr lIns="91425" tIns="91425" rIns="91425" bIns="91425" anchor="t" anchorCtr="0">
-            <a:noAutofit/>
-          </a:bodyPr>
-          <a:lstStyle/>
-          <a:p>
-            <a:pPr lvl="0" rtl="0">
-              <a:lnSpc>
-                <a:spcPct val="142857"/>
-              </a:lnSpc>
-              <a:spcBef>
-                <a:spcPts val="0"/>
-              </a:spcBef>
-              <a:spcAft>
-                <a:spcPts val="800"/>
-              </a:spcAft>
-              <a:buClr>
-                <a:schemeClr val="dk1"/>
-              </a:buClr>
-              <a:buSzPct val="91666"/>
-              <a:buFont typeface="Arial"/>
-              <a:buNone/>
-            </a:pPr>
-            <a:r>
-              <a:rPr lang="en" sz="1200" b="1">
-                <a:solidFill>
-                  <a:srgbClr val="333333"/>
-                </a:solidFill>
-                <a:highlight>
-                  <a:srgbClr val="FFFFFF"/>
-                </a:highlight>
-                <a:latin typeface="Courier New"/>
-                <a:ea typeface="Courier New"/>
-                <a:cs typeface="Courier New"/>
-                <a:sym typeface="Courier New"/>
-              </a:rPr>
-              <a:t>t test of coefficients:</a:t>
-            </a:r>
-            <a:br>
-              <a:rPr lang="en" sz="1200" b="1">
-                <a:solidFill>
-                  <a:srgbClr val="333333"/>
-                </a:solidFill>
-                <a:highlight>
-                  <a:srgbClr val="FFFFFF"/>
-                </a:highlight>
-                <a:latin typeface="Courier New"/>
-                <a:ea typeface="Courier New"/>
-                <a:cs typeface="Courier New"/>
-                <a:sym typeface="Courier New"/>
-              </a:rPr>
-            </a:br>
-            <a:br>
-              <a:rPr lang="en" sz="1200" b="1">
-                <a:solidFill>
-                  <a:srgbClr val="333333"/>
-                </a:solidFill>
-                <a:highlight>
-                  <a:srgbClr val="FFFFFF"/>
-                </a:highlight>
-                <a:latin typeface="Courier New"/>
-                <a:ea typeface="Courier New"/>
-                <a:cs typeface="Courier New"/>
-                <a:sym typeface="Courier New"/>
-              </a:rPr>
-            </a:br>
-            <a:r>
-              <a:rPr lang="en" sz="1200" b="1">
-                <a:solidFill>
-                  <a:srgbClr val="333333"/>
-                </a:solidFill>
-                <a:highlight>
-                  <a:srgbClr val="FFFFFF"/>
-                </a:highlight>
-                <a:latin typeface="Courier New"/>
-                <a:ea typeface="Courier New"/>
-                <a:cs typeface="Courier New"/>
-                <a:sym typeface="Courier New"/>
-              </a:rPr>
-              <a:t>                        Estimate  Std. Error t value  Pr(&gt;|t|)    </a:t>
-            </a:r>
-            <a:br>
-              <a:rPr lang="en" sz="1200" b="1">
-                <a:solidFill>
-                  <a:srgbClr val="333333"/>
-                </a:solidFill>
-                <a:highlight>
-                  <a:srgbClr val="FFFFFF"/>
-                </a:highlight>
-                <a:latin typeface="Courier New"/>
-                <a:ea typeface="Courier New"/>
-                <a:cs typeface="Courier New"/>
-                <a:sym typeface="Courier New"/>
-              </a:rPr>
-            </a:br>
-            <a:r>
-              <a:rPr lang="en" sz="1200" b="1">
-                <a:solidFill>
-                  <a:srgbClr val="333333"/>
-                </a:solidFill>
-                <a:highlight>
-                  <a:srgbClr val="FFFFFF"/>
-                </a:highlight>
-                <a:latin typeface="Courier New"/>
-                <a:ea typeface="Courier New"/>
-                <a:cs typeface="Courier New"/>
-                <a:sym typeface="Courier New"/>
-              </a:rPr>
-              <a:t>(Intercept)           4.5237e-01  8.8895e-02  5.0887 5.205e-07 ***</a:t>
-            </a:r>
-            <a:br>
-              <a:rPr lang="en" sz="1200" b="1">
-                <a:solidFill>
-                  <a:srgbClr val="333333"/>
-                </a:solidFill>
-                <a:highlight>
-                  <a:srgbClr val="FFFFFF"/>
-                </a:highlight>
-                <a:latin typeface="Courier New"/>
-                <a:ea typeface="Courier New"/>
-                <a:cs typeface="Courier New"/>
-                <a:sym typeface="Courier New"/>
-              </a:rPr>
-            </a:br>
-            <a:r>
-              <a:rPr lang="en" sz="1200" b="1">
-                <a:solidFill>
-                  <a:srgbClr val="333333"/>
-                </a:solidFill>
-                <a:highlight>
-                  <a:srgbClr val="FFFFFF"/>
-                </a:highlight>
-                <a:latin typeface="Courier New"/>
-                <a:ea typeface="Courier New"/>
-                <a:cs typeface="Courier New"/>
-                <a:sym typeface="Courier New"/>
-              </a:rPr>
-              <a:t>treatment             1.5360e-02  3.9044e-02  0.3934   0.69420    </a:t>
-            </a:r>
-            <a:br>
-              <a:rPr lang="en" sz="1200" b="1">
-                <a:solidFill>
-                  <a:srgbClr val="333333"/>
-                </a:solidFill>
-                <a:highlight>
-                  <a:srgbClr val="FFFFFF"/>
-                </a:highlight>
-                <a:latin typeface="Courier New"/>
-                <a:ea typeface="Courier New"/>
-                <a:cs typeface="Courier New"/>
-                <a:sym typeface="Courier New"/>
-              </a:rPr>
-            </a:br>
-            <a:r>
-              <a:rPr lang="en" sz="1200" b="1">
-                <a:solidFill>
-                  <a:srgbClr val="333333"/>
-                </a:solidFill>
-                <a:highlight>
-                  <a:srgbClr val="FFFFFF"/>
-                </a:highlight>
-                <a:latin typeface="Courier New"/>
-                <a:ea typeface="Courier New"/>
-                <a:cs typeface="Courier New"/>
-                <a:sym typeface="Courier New"/>
-              </a:rPr>
-              <a:t>gender                5.1775e-02  7.2094e-02  0.7182   0.47301    </a:t>
-            </a:r>
-            <a:br>
-              <a:rPr lang="en" sz="1200" b="1">
-                <a:solidFill>
-                  <a:srgbClr val="333333"/>
-                </a:solidFill>
-                <a:highlight>
-                  <a:srgbClr val="FFFFFF"/>
-                </a:highlight>
-                <a:latin typeface="Courier New"/>
-                <a:ea typeface="Courier New"/>
-                <a:cs typeface="Courier New"/>
-                <a:sym typeface="Courier New"/>
-              </a:rPr>
-            </a:br>
-            <a:r>
-              <a:rPr lang="en" sz="1200" b="1">
-                <a:solidFill>
-                  <a:srgbClr val="333333"/>
-                </a:solidFill>
-                <a:highlight>
-                  <a:srgbClr val="FFFFFF"/>
-                </a:highlight>
-                <a:latin typeface="Courier New"/>
-                <a:ea typeface="Courier New"/>
-                <a:cs typeface="Courier New"/>
-                <a:sym typeface="Courier New"/>
-              </a:rPr>
-              <a:t>factor(city)houston  -1.5451e-01  6.3680e-02 -2.4263   0.01563 *  </a:t>
-            </a:r>
-            <a:br>
-              <a:rPr lang="en" sz="1200" b="1">
-                <a:solidFill>
-                  <a:srgbClr val="333333"/>
-                </a:solidFill>
-                <a:highlight>
-                  <a:srgbClr val="FFFFFF"/>
-                </a:highlight>
-                <a:latin typeface="Courier New"/>
-                <a:ea typeface="Courier New"/>
-                <a:cs typeface="Courier New"/>
-                <a:sym typeface="Courier New"/>
-              </a:rPr>
-            </a:br>
-            <a:r>
-              <a:rPr lang="en" sz="1200" b="1">
-                <a:solidFill>
-                  <a:srgbClr val="333333"/>
-                </a:solidFill>
-                <a:highlight>
-                  <a:srgbClr val="FFFFFF"/>
-                </a:highlight>
-                <a:latin typeface="Courier New"/>
-                <a:ea typeface="Courier New"/>
-                <a:cs typeface="Courier New"/>
-                <a:sym typeface="Courier New"/>
-              </a:rPr>
-              <a:t>factor(city)sandiego -4.5650e-02  6.5718e-02 -0.6946   0.48763    </a:t>
-            </a:r>
-            <a:br>
-              <a:rPr lang="en" sz="1200" b="1">
-                <a:solidFill>
-                  <a:srgbClr val="333333"/>
-                </a:solidFill>
-                <a:highlight>
-                  <a:srgbClr val="FFFFFF"/>
-                </a:highlight>
-                <a:latin typeface="Courier New"/>
-                <a:ea typeface="Courier New"/>
-                <a:cs typeface="Courier New"/>
-                <a:sym typeface="Courier New"/>
-              </a:rPr>
-            </a:br>
-            <a:r>
-              <a:rPr lang="en" sz="1200" b="1">
-                <a:solidFill>
-                  <a:srgbClr val="333333"/>
-                </a:solidFill>
-                <a:highlight>
-                  <a:srgbClr val="FFFFFF"/>
-                </a:highlight>
-                <a:latin typeface="Courier New"/>
-                <a:ea typeface="Courier New"/>
-                <a:cs typeface="Courier New"/>
-                <a:sym typeface="Courier New"/>
-              </a:rPr>
-              <a:t>factor(city)seattle   4.7687e-02  6.4965e-02  0.7340   0.46329    </a:t>
-            </a:r>
-            <a:br>
-              <a:rPr lang="en" sz="1200" b="1">
-                <a:solidFill>
-                  <a:srgbClr val="333333"/>
-                </a:solidFill>
-                <a:highlight>
-                  <a:srgbClr val="FFFFFF"/>
-                </a:highlight>
-                <a:latin typeface="Courier New"/>
-                <a:ea typeface="Courier New"/>
-                <a:cs typeface="Courier New"/>
-                <a:sym typeface="Courier New"/>
-              </a:rPr>
-            </a:br>
-            <a:r>
-              <a:rPr lang="en" sz="1200" b="1">
-                <a:solidFill>
-                  <a:srgbClr val="333333"/>
-                </a:solidFill>
-                <a:highlight>
-                  <a:srgbClr val="FFFFFF"/>
-                </a:highlight>
-                <a:latin typeface="Courier New"/>
-                <a:ea typeface="Courier New"/>
-                <a:cs typeface="Courier New"/>
-                <a:sym typeface="Courier New"/>
-              </a:rPr>
-              <a:t>factor(bedrooms)2     3.0561e-02  4.8223e-02  0.6337   0.52655    </a:t>
-            </a:r>
-            <a:br>
-              <a:rPr lang="en" sz="1200" b="1">
-                <a:solidFill>
-                  <a:srgbClr val="333333"/>
-                </a:solidFill>
-                <a:highlight>
-                  <a:srgbClr val="FFFFFF"/>
-                </a:highlight>
-                <a:latin typeface="Courier New"/>
-                <a:ea typeface="Courier New"/>
-                <a:cs typeface="Courier New"/>
-                <a:sym typeface="Courier New"/>
-              </a:rPr>
-            </a:br>
-            <a:r>
-              <a:rPr lang="en" sz="1200" b="1">
-                <a:solidFill>
-                  <a:srgbClr val="333333"/>
-                </a:solidFill>
-                <a:highlight>
-                  <a:srgbClr val="FFFFFF"/>
-                </a:highlight>
-                <a:latin typeface="Courier New"/>
-                <a:ea typeface="Courier New"/>
-                <a:cs typeface="Courier New"/>
-                <a:sym typeface="Courier New"/>
-              </a:rPr>
-              <a:t>price                -4.8779e-06  3.0726e-05 -0.1588   0.87393    </a:t>
-            </a:r>
-            <a:br>
-              <a:rPr lang="en" sz="1200" b="1">
-                <a:solidFill>
-                  <a:srgbClr val="333333"/>
-                </a:solidFill>
-                <a:highlight>
-                  <a:srgbClr val="FFFFFF"/>
-                </a:highlight>
-                <a:latin typeface="Courier New"/>
-                <a:ea typeface="Courier New"/>
-                <a:cs typeface="Courier New"/>
-                <a:sym typeface="Courier New"/>
-              </a:rPr>
-            </a:br>
-            <a:r>
-              <a:rPr lang="en" sz="1200" b="1">
-                <a:solidFill>
-                  <a:srgbClr val="333333"/>
-                </a:solidFill>
-                <a:highlight>
-                  <a:srgbClr val="FFFFFF"/>
-                </a:highlight>
-                <a:latin typeface="Courier New"/>
-                <a:ea typeface="Courier New"/>
-                <a:cs typeface="Courier New"/>
-                <a:sym typeface="Courier New"/>
-              </a:rPr>
-              <a:t>treatment:gender     -1.7236e-02  5.5989e-02 -0.3078   0.75834    </a:t>
-            </a:r>
-            <a:br>
-              <a:rPr lang="en" sz="1200" b="1">
-                <a:solidFill>
-                  <a:srgbClr val="333333"/>
-                </a:solidFill>
-                <a:highlight>
-                  <a:srgbClr val="FFFFFF"/>
-                </a:highlight>
-                <a:latin typeface="Courier New"/>
-                <a:ea typeface="Courier New"/>
-                <a:cs typeface="Courier New"/>
-                <a:sym typeface="Courier New"/>
-              </a:rPr>
-            </a:br>
-            <a:r>
-              <a:rPr lang="en" sz="1200" b="1">
-                <a:solidFill>
-                  <a:srgbClr val="333333"/>
-                </a:solidFill>
-                <a:highlight>
-                  <a:srgbClr val="FFFFFF"/>
-                </a:highlight>
-                <a:latin typeface="Courier New"/>
-                <a:ea typeface="Courier New"/>
-                <a:cs typeface="Courier New"/>
-                <a:sym typeface="Courier New"/>
-              </a:rPr>
-              <a:t>---</a:t>
-            </a:r>
-            <a:br>
-              <a:rPr lang="en" sz="1200" b="1">
-                <a:solidFill>
-                  <a:srgbClr val="333333"/>
-                </a:solidFill>
-                <a:highlight>
-                  <a:srgbClr val="FFFFFF"/>
-                </a:highlight>
-                <a:latin typeface="Courier New"/>
-                <a:ea typeface="Courier New"/>
-                <a:cs typeface="Courier New"/>
-                <a:sym typeface="Courier New"/>
-              </a:rPr>
-            </a:br>
-            <a:r>
-              <a:rPr lang="en" sz="1200" b="1">
-                <a:solidFill>
-                  <a:srgbClr val="333333"/>
-                </a:solidFill>
-                <a:highlight>
-                  <a:srgbClr val="FFFFFF"/>
-                </a:highlight>
-                <a:latin typeface="Courier New"/>
-                <a:ea typeface="Courier New"/>
-                <a:cs typeface="Courier New"/>
-                <a:sym typeface="Courier New"/>
-              </a:rPr>
-              <a:t>Signif. codes:  0 ‘***’ 0.001 ‘**’ 0.01 ‘*’ 0.05 ‘.’ 0.1 ‘ ’ 1</a:t>
-            </a:r>
-          </a:p>
-          <a:p>
-            <a:pPr lvl="0">
-              <a:spcBef>
-                <a:spcPts val="0"/>
-              </a:spcBef>
-              <a:buNone/>
-            </a:pPr>
-            <a:endParaRPr/>
-          </a:p>
-        </p:txBody>
-      </p:sp>
+      </p:pic>
     </p:spTree>
+    <p:extLst>
+      <p:ext uri="{BB962C8B-B14F-4D97-AF65-F5344CB8AC3E}">
+        <p14:creationId xmlns:p14="http://schemas.microsoft.com/office/powerpoint/2010/main" val="2784490164"/>
+      </p:ext>
+    </p:extLst>
   </p:cSld>
   <p:clrMapOvr>
     <a:masterClrMapping/>
@@ -6779,7 +4473,7 @@
       </p:grpSpPr>
       <p:sp>
         <p:nvSpPr>
-          <p:cNvPr id="4" name="Title 3"/>
+          <p:cNvPr id="6" name="Title 5"/>
           <p:cNvSpPr>
             <a:spLocks noGrp="1"/>
           </p:cNvSpPr>
@@ -6789,26 +4483,47 @@
         </p:nvSpPr>
         <p:spPr/>
         <p:txBody>
-          <a:bodyPr>
-            <a:normAutofit/>
+          <a:bodyPr anchor="t">
+            <a:normAutofit fontScale="90000"/>
           </a:bodyPr>
           <a:lstStyle/>
           <a:p>
+            <a:pPr algn="ctr"/>
             <a:r>
               <a:rPr lang="en-US" b="1" dirty="0"/>
-              <a:t>Conclusions and </a:t>
-            </a:r>
-            <a:r>
-              <a:rPr lang="en-US" b="1"/>
-              <a:t>Next Steps</a:t>
-            </a:r>
-          </a:p>
-        </p:txBody>
-      </p:sp>
+              <a:t>CACE (One-sided Noncompliance)</a:t>
+            </a:r>
+          </a:p>
+        </p:txBody>
+      </p:sp>
+      <p:pic>
+        <p:nvPicPr>
+          <p:cNvPr id="7" name="Picture 6"/>
+          <p:cNvPicPr>
+            <a:picLocks noChangeAspect="1"/>
+          </p:cNvPicPr>
+          <p:nvPr/>
+        </p:nvPicPr>
+        <p:blipFill>
+          <a:blip r:embed="rId2"/>
+          <a:stretch>
+            <a:fillRect/>
+          </a:stretch>
+        </p:blipFill>
+        <p:spPr>
+          <a:xfrm>
+            <a:off x="668954" y="1541761"/>
+            <a:ext cx="7197930" cy="2108233"/>
+          </a:xfrm>
+          <a:prstGeom prst="rect">
+            <a:avLst/>
+          </a:prstGeom>
+        </p:spPr>
+      </p:pic>
     </p:spTree>
     <p:extLst>
       <p:ext uri="{BB962C8B-B14F-4D97-AF65-F5344CB8AC3E}">
-        <p14:creationId xmlns:p14="http://schemas.microsoft.com/office/powerpoint/2010/main" val="1440170364"/>
+        <p14:creationId xmlns:p14="http://schemas.microsoft.com/office/powerpoint/2010/main" val="1277387922"/>
       </p:ext>
     </p:extLst>
   </p:cSld>
@@ -6837,6 +4552,64 @@
       </p:grpSpPr>
       <p:sp>
         <p:nvSpPr>
+          <p:cNvPr id="4" name="Title 3"/>
+          <p:cNvSpPr>
+            <a:spLocks noGrp="1"/>
+          </p:cNvSpPr>
+          <p:nvPr>
+            <p:ph type="title"/>
+          </p:nvPr>
+        </p:nvSpPr>
+        <p:spPr/>
+        <p:txBody>
+          <a:bodyPr>
+            <a:normAutofit/>
+          </a:bodyPr>
+          <a:lstStyle/>
+          <a:p>
+            <a:r>
+              <a:rPr lang="en-US" b="1" dirty="0"/>
+              <a:t>Conclusions and </a:t>
+            </a:r>
+            <a:r>
+              <a:rPr lang="en-US" b="1"/>
+              <a:t>Next Steps</a:t>
+            </a:r>
+          </a:p>
+        </p:txBody>
+      </p:sp>
+    </p:spTree>
+    <p:extLst>
+      <p:ext uri="{BB962C8B-B14F-4D97-AF65-F5344CB8AC3E}">
+        <p14:creationId xmlns:p14="http://schemas.microsoft.com/office/powerpoint/2010/main" val="1440170364"/>
+      </p:ext>
+    </p:extLst>
+  </p:cSld>
+  <p:clrMapOvr>
+    <a:masterClrMapping/>
+  </p:clrMapOvr>
+</p:sld>
+</file>
+
+<file path=ppt/slides/slide14.xml><?xml version="1.0" encoding="utf-8"?>
+<p:sld xmlns:a="http://schemas.openxmlformats.org/drawingml/2006/main" xmlns:r="http://schemas.openxmlformats.org/officeDocument/2006/relationships" xmlns:p="http://schemas.openxmlformats.org/presentationml/2006/main">
+  <p:cSld>
+    <p:spTree>
+      <p:nvGrpSpPr>
+        <p:cNvPr id="1" name=""/>
+        <p:cNvGrpSpPr/>
+        <p:nvPr/>
+      </p:nvGrpSpPr>
+      <p:grpSpPr>
+        <a:xfrm>
+          <a:off x="0" y="0"/>
+          <a:ext cx="0" cy="0"/>
+          <a:chOff x="0" y="0"/>
+          <a:chExt cx="0" cy="0"/>
+        </a:xfrm>
+      </p:grpSpPr>
+      <p:sp>
+        <p:nvSpPr>
           <p:cNvPr id="3" name="Title 2"/>
           <p:cNvSpPr>
             <a:spLocks noGrp="1"/>
@@ -6913,7 +4686,7 @@
 </p:sld>
 </file>
 
-<file path=ppt/slides/slide14.xml><?xml version="1.0" encoding="utf-8"?>
+<file path=ppt/slides/slide15.xml><?xml version="1.0" encoding="utf-8"?>
 <p:sld xmlns:a="http://schemas.openxmlformats.org/drawingml/2006/main" xmlns:r="http://schemas.openxmlformats.org/officeDocument/2006/relationships" xmlns:p="http://schemas.openxmlformats.org/presentationml/2006/main">
   <p:cSld>
     <p:spTree>
@@ -7458,7 +5231,7 @@
   <p:cSld>
     <p:spTree>
       <p:nvGrpSpPr>
-        <p:cNvPr id="1" name="Shape 59"/>
+        <p:cNvPr id="1" name=""/>
         <p:cNvGrpSpPr/>
         <p:nvPr/>
       </p:nvGrpSpPr>
@@ -7472,548 +5245,94 @@
       </p:grpSpPr>
       <p:sp>
         <p:nvSpPr>
-          <p:cNvPr id="60" name="Shape 60"/>
-          <p:cNvSpPr txBox="1">
+          <p:cNvPr id="6" name="Title 5"/>
+          <p:cNvSpPr>
             <a:spLocks noGrp="1"/>
           </p:cNvSpPr>
           <p:nvPr>
             <p:ph type="title"/>
           </p:nvPr>
         </p:nvSpPr>
+        <p:spPr/>
+        <p:txBody>
+          <a:bodyPr anchor="t"/>
+          <a:lstStyle/>
+          <a:p>
+            <a:pPr algn="ctr"/>
+            <a:r>
+              <a:rPr lang="en-US" b="1" dirty="0"/>
+              <a:t>Data Validation</a:t>
+            </a:r>
+          </a:p>
+        </p:txBody>
+      </p:sp>
+      <p:sp>
+        <p:nvSpPr>
+          <p:cNvPr id="4" name="Content Placeholder 3"/>
+          <p:cNvSpPr>
+            <a:spLocks noGrp="1"/>
+          </p:cNvSpPr>
+          <p:nvPr>
+            <p:ph idx="1"/>
+          </p:nvPr>
+        </p:nvSpPr>
         <p:spPr>
-          <a:prstGeom prst="rect">
-            <a:avLst/>
-          </a:prstGeom>
+          <a:xfrm>
+            <a:off x="946404" y="1392865"/>
+            <a:ext cx="6446520" cy="3263503"/>
+          </a:xfrm>
         </p:spPr>
         <p:txBody>
-          <a:bodyPr lIns="91425" tIns="91425" rIns="91425" bIns="91425" anchor="t" anchorCtr="0">
-            <a:noAutofit/>
+          <a:bodyPr>
+            <a:normAutofit/>
           </a:bodyPr>
           <a:lstStyle/>
           <a:p>
-            <a:pPr lvl="0">
-              <a:spcBef>
-                <a:spcPts val="0"/>
-              </a:spcBef>
-              <a:buNone/>
-            </a:pPr>
-            <a:r>
-              <a:rPr lang="en" dirty="0"/>
-              <a:t>Outcomes</a:t>
-            </a:r>
-          </a:p>
-        </p:txBody>
-      </p:sp>
-      <p:sp>
-        <p:nvSpPr>
-          <p:cNvPr id="61" name="Shape 61"/>
-          <p:cNvSpPr txBox="1">
-            <a:spLocks noGrp="1"/>
-          </p:cNvSpPr>
-          <p:nvPr>
-            <p:ph type="body" idx="1"/>
-          </p:nvPr>
-        </p:nvSpPr>
-        <p:spPr>
-          <a:prstGeom prst="rect">
-            <a:avLst/>
-          </a:prstGeom>
-        </p:spPr>
-        <p:txBody>
-          <a:bodyPr lIns="91425" tIns="91425" rIns="91425" bIns="91425" anchor="t" anchorCtr="0">
-            <a:noAutofit/>
-          </a:bodyPr>
-          <a:lstStyle/>
-          <a:p>
-            <a:pPr lvl="0" rtl="0">
-              <a:lnSpc>
-                <a:spcPct val="142857"/>
-              </a:lnSpc>
-              <a:spcBef>
-                <a:spcPts val="0"/>
-              </a:spcBef>
-              <a:spcAft>
-                <a:spcPts val="800"/>
-              </a:spcAft>
-              <a:buNone/>
-            </a:pPr>
-            <a:r>
-              <a:rPr lang="en" sz="1000" b="1" dirty="0">
-                <a:solidFill>
-                  <a:srgbClr val="333333"/>
-                </a:solidFill>
-                <a:highlight>
-                  <a:srgbClr val="FFFFFF"/>
-                </a:highlight>
-                <a:latin typeface="Courier New"/>
-                <a:ea typeface="Courier New"/>
-                <a:cs typeface="Courier New"/>
-                <a:sym typeface="Courier New"/>
-              </a:rPr>
-              <a:t>Table of Outcomes:</a:t>
-            </a:r>
-            <a:br>
-              <a:rPr lang="en" sz="1000" b="1" dirty="0">
-                <a:solidFill>
-                  <a:srgbClr val="333333"/>
-                </a:solidFill>
-                <a:highlight>
-                  <a:srgbClr val="FFFFFF"/>
-                </a:highlight>
-                <a:latin typeface="Courier New"/>
-                <a:ea typeface="Courier New"/>
-                <a:cs typeface="Courier New"/>
-                <a:sym typeface="Courier New"/>
-              </a:rPr>
-            </a:br>
-            <a:r>
-              <a:rPr lang="en" sz="1000" b="1" dirty="0">
-                <a:solidFill>
-                  <a:srgbClr val="333333"/>
-                </a:solidFill>
-                <a:highlight>
-                  <a:srgbClr val="FFFFFF"/>
-                </a:highlight>
-                <a:latin typeface="Courier New"/>
-                <a:ea typeface="Courier New"/>
-                <a:cs typeface="Courier New"/>
-                <a:sym typeface="Courier New"/>
-              </a:rPr>
-              <a:t>  </a:t>
-            </a:r>
-            <a:r>
-              <a:rPr lang="en-US" sz="1000" b="1" dirty="0">
-                <a:solidFill>
-                  <a:srgbClr val="333333"/>
-                </a:solidFill>
-                <a:highlight>
-                  <a:srgbClr val="FFFFFF"/>
-                </a:highlight>
-                <a:latin typeface="Courier New"/>
-                <a:ea typeface="Courier New"/>
-                <a:cs typeface="Courier New"/>
-                <a:sym typeface="Courier New"/>
-              </a:rPr>
-              <a:t>No Response 	Positive Response</a:t>
-            </a:r>
-            <a:br>
-              <a:rPr lang="en" sz="1000" b="1" dirty="0">
-                <a:solidFill>
-                  <a:srgbClr val="333333"/>
-                </a:solidFill>
-                <a:highlight>
-                  <a:srgbClr val="FFFFFF"/>
-                </a:highlight>
-                <a:latin typeface="Courier New"/>
-                <a:ea typeface="Courier New"/>
-                <a:cs typeface="Courier New"/>
-                <a:sym typeface="Courier New"/>
-              </a:rPr>
-            </a:br>
-            <a:r>
-              <a:rPr lang="en-US" sz="1000" b="1" dirty="0">
-                <a:solidFill>
-                  <a:srgbClr val="333333"/>
-                </a:solidFill>
-                <a:highlight>
-                  <a:srgbClr val="FFFFFF"/>
-                </a:highlight>
-                <a:latin typeface="Courier New"/>
-                <a:ea typeface="Courier New"/>
-                <a:cs typeface="Courier New"/>
-                <a:sym typeface="Courier New"/>
-              </a:rPr>
-              <a:t>  </a:t>
-            </a:r>
-            <a:r>
-              <a:rPr lang="en" sz="1000" b="1" dirty="0">
-                <a:solidFill>
-                  <a:srgbClr val="333333"/>
-                </a:solidFill>
-                <a:highlight>
-                  <a:srgbClr val="FFFFFF"/>
-                </a:highlight>
-                <a:latin typeface="Courier New"/>
-                <a:ea typeface="Courier New"/>
-                <a:cs typeface="Courier New"/>
-                <a:sym typeface="Courier New"/>
-              </a:rPr>
-              <a:t>264</a:t>
-            </a:r>
-            <a:r>
-              <a:rPr lang="en-US" sz="1000" b="1" dirty="0">
-                <a:solidFill>
-                  <a:srgbClr val="333333"/>
-                </a:solidFill>
-                <a:highlight>
-                  <a:srgbClr val="FFFFFF"/>
-                </a:highlight>
-                <a:latin typeface="Courier New"/>
-                <a:ea typeface="Courier New"/>
-                <a:cs typeface="Courier New"/>
-                <a:sym typeface="Courier New"/>
-              </a:rPr>
-              <a:t>  		</a:t>
-            </a:r>
-            <a:r>
-              <a:rPr lang="en" sz="1000" b="1" dirty="0">
-                <a:solidFill>
-                  <a:srgbClr val="333333"/>
-                </a:solidFill>
-                <a:highlight>
-                  <a:srgbClr val="FFFFFF"/>
-                </a:highlight>
-                <a:latin typeface="Courier New"/>
-                <a:ea typeface="Courier New"/>
-                <a:cs typeface="Courier New"/>
-                <a:sym typeface="Courier New"/>
-              </a:rPr>
-              <a:t>219</a:t>
-            </a:r>
-          </a:p>
-          <a:p>
-            <a:pPr lvl="0" rtl="0">
-              <a:lnSpc>
-                <a:spcPct val="142857"/>
-              </a:lnSpc>
-              <a:spcBef>
-                <a:spcPts val="0"/>
-              </a:spcBef>
-              <a:spcAft>
-                <a:spcPts val="800"/>
-              </a:spcAft>
-              <a:buNone/>
-            </a:pPr>
-            <a:br>
-              <a:rPr lang="en" sz="1000" b="1" dirty="0">
-                <a:solidFill>
-                  <a:srgbClr val="333333"/>
-                </a:solidFill>
-                <a:highlight>
-                  <a:srgbClr val="FFFFFF"/>
-                </a:highlight>
-                <a:latin typeface="Courier New"/>
-                <a:ea typeface="Courier New"/>
-                <a:cs typeface="Courier New"/>
-                <a:sym typeface="Courier New"/>
-              </a:rPr>
-            </a:br>
-            <a:r>
-              <a:rPr lang="en" sz="1000" b="1" dirty="0">
-                <a:solidFill>
-                  <a:srgbClr val="333333"/>
-                </a:solidFill>
-                <a:highlight>
-                  <a:srgbClr val="FFFFFF"/>
-                </a:highlight>
-                <a:latin typeface="Courier New"/>
-                <a:ea typeface="Courier New"/>
-                <a:cs typeface="Courier New"/>
-                <a:sym typeface="Courier New"/>
-              </a:rPr>
-              <a:t>Table of Outcomes (By Gender):</a:t>
-            </a:r>
-            <a:br>
-              <a:rPr lang="en" sz="1000" b="1" dirty="0">
-                <a:solidFill>
-                  <a:srgbClr val="333333"/>
-                </a:solidFill>
-                <a:highlight>
-                  <a:srgbClr val="FFFFFF"/>
-                </a:highlight>
-                <a:latin typeface="Courier New"/>
-                <a:ea typeface="Courier New"/>
-                <a:cs typeface="Courier New"/>
-                <a:sym typeface="Courier New"/>
-              </a:rPr>
-            </a:br>
-            <a:r>
-              <a:rPr lang="en" sz="1000" b="1" dirty="0">
-                <a:solidFill>
-                  <a:srgbClr val="333333"/>
-                </a:solidFill>
-                <a:highlight>
-                  <a:srgbClr val="FFFFFF"/>
-                </a:highlight>
-                <a:latin typeface="Courier New"/>
-                <a:ea typeface="Courier New"/>
-                <a:cs typeface="Courier New"/>
-                <a:sym typeface="Courier New"/>
-              </a:rPr>
-              <a:t>      			Male	Female</a:t>
-            </a:r>
-            <a:br>
-              <a:rPr lang="en" sz="1000" b="1" dirty="0">
-                <a:solidFill>
-                  <a:srgbClr val="333333"/>
-                </a:solidFill>
-                <a:highlight>
-                  <a:srgbClr val="FFFFFF"/>
-                </a:highlight>
-                <a:latin typeface="Courier New"/>
-                <a:ea typeface="Courier New"/>
-                <a:cs typeface="Courier New"/>
-                <a:sym typeface="Courier New"/>
-              </a:rPr>
-            </a:br>
-            <a:r>
-              <a:rPr lang="en" sz="1000" b="1" dirty="0">
-                <a:solidFill>
-                  <a:srgbClr val="333333"/>
-                </a:solidFill>
-                <a:highlight>
-                  <a:srgbClr val="FFFFFF"/>
-                </a:highlight>
-                <a:latin typeface="Courier New"/>
-                <a:ea typeface="Courier New"/>
-                <a:cs typeface="Courier New"/>
-                <a:sym typeface="Courier New"/>
-              </a:rPr>
-              <a:t>  No Response	 	135 	129</a:t>
-            </a:r>
-            <a:br>
-              <a:rPr lang="en" sz="1000" b="1" dirty="0">
-                <a:solidFill>
-                  <a:srgbClr val="333333"/>
-                </a:solidFill>
-                <a:highlight>
-                  <a:srgbClr val="FFFFFF"/>
-                </a:highlight>
-                <a:latin typeface="Courier New"/>
-                <a:ea typeface="Courier New"/>
-                <a:cs typeface="Courier New"/>
-                <a:sym typeface="Courier New"/>
-              </a:rPr>
-            </a:br>
-            <a:r>
-              <a:rPr lang="en" sz="1000" b="1" dirty="0">
-                <a:solidFill>
-                  <a:srgbClr val="333333"/>
-                </a:solidFill>
-                <a:highlight>
-                  <a:srgbClr val="FFFFFF"/>
-                </a:highlight>
-                <a:latin typeface="Courier New"/>
-                <a:ea typeface="Courier New"/>
-                <a:cs typeface="Courier New"/>
-                <a:sym typeface="Courier New"/>
-              </a:rPr>
-              <a:t>  Positive Response 	104 	115</a:t>
-            </a:r>
-          </a:p>
-          <a:p>
-            <a:pPr lvl="0" rtl="0">
-              <a:lnSpc>
-                <a:spcPct val="142857"/>
-              </a:lnSpc>
-              <a:spcBef>
-                <a:spcPts val="0"/>
-              </a:spcBef>
-              <a:spcAft>
-                <a:spcPts val="800"/>
-              </a:spcAft>
-              <a:buNone/>
-            </a:pPr>
-            <a:endParaRPr sz="1000" b="1" dirty="0">
-              <a:solidFill>
-                <a:srgbClr val="333333"/>
-              </a:solidFill>
-              <a:highlight>
-                <a:srgbClr val="FFFFFF"/>
-              </a:highlight>
-              <a:latin typeface="Courier New"/>
-              <a:ea typeface="Courier New"/>
-              <a:cs typeface="Courier New"/>
-              <a:sym typeface="Courier New"/>
-            </a:endParaRPr>
-          </a:p>
-          <a:p>
-            <a:pPr lvl="0">
-              <a:lnSpc>
-                <a:spcPct val="142857"/>
-              </a:lnSpc>
-              <a:spcAft>
-                <a:spcPts val="800"/>
-              </a:spcAft>
-              <a:buNone/>
-            </a:pPr>
-            <a:r>
-              <a:rPr lang="en" sz="1000" b="1" dirty="0">
-                <a:solidFill>
-                  <a:srgbClr val="333333"/>
-                </a:solidFill>
-                <a:highlight>
-                  <a:srgbClr val="FFFFFF"/>
-                </a:highlight>
-                <a:latin typeface="Courier New"/>
-                <a:ea typeface="Courier New"/>
-                <a:cs typeface="Courier New"/>
-                <a:sym typeface="Courier New"/>
-              </a:rPr>
-              <a:t>Table of Outcomes (By Treatment and Gender)</a:t>
-            </a:r>
-            <a:br>
-              <a:rPr lang="en" sz="1000" b="1" dirty="0">
-                <a:solidFill>
-                  <a:srgbClr val="333333"/>
-                </a:solidFill>
-                <a:highlight>
-                  <a:srgbClr val="FFFFFF"/>
-                </a:highlight>
-                <a:latin typeface="Courier New"/>
-                <a:ea typeface="Courier New"/>
-                <a:cs typeface="Courier New"/>
-                <a:sym typeface="Courier New"/>
-              </a:rPr>
-            </a:br>
-            <a:r>
-              <a:rPr lang="en" sz="1000" b="1" dirty="0">
-                <a:solidFill>
-                  <a:srgbClr val="333333"/>
-                </a:solidFill>
-                <a:highlight>
-                  <a:srgbClr val="FFFFFF"/>
-                </a:highlight>
-                <a:latin typeface="Courier New"/>
-                <a:ea typeface="Courier New"/>
-                <a:cs typeface="Courier New"/>
-                <a:sym typeface="Courier New"/>
-              </a:rPr>
-              <a:t>    	        Jane_Control Jane_Treat_High Jane_Treat_Low John_Control John_Treat_High John_Treat_Low</a:t>
-            </a:r>
-            <a:br>
-              <a:rPr lang="en" sz="1000" b="1" dirty="0">
-                <a:solidFill>
-                  <a:srgbClr val="333333"/>
-                </a:solidFill>
-                <a:highlight>
-                  <a:srgbClr val="FFFFFF"/>
-                </a:highlight>
-                <a:latin typeface="Courier New"/>
-                <a:ea typeface="Courier New"/>
-                <a:cs typeface="Courier New"/>
-                <a:sym typeface="Courier New"/>
-              </a:rPr>
-            </a:br>
-            <a:r>
-              <a:rPr lang="en" sz="1000" b="1" dirty="0">
-                <a:solidFill>
-                  <a:srgbClr val="333333"/>
-                </a:solidFill>
-                <a:highlight>
-                  <a:srgbClr val="FFFFFF"/>
-                </a:highlight>
-                <a:latin typeface="Courier New"/>
-                <a:ea typeface="Courier New"/>
-                <a:cs typeface="Courier New"/>
-                <a:sym typeface="Courier New"/>
-              </a:rPr>
-              <a:t>  No Response          39              41             49           49              46             40</a:t>
-            </a:r>
-            <a:br>
-              <a:rPr lang="en" sz="1000" b="1" dirty="0">
-                <a:solidFill>
-                  <a:srgbClr val="333333"/>
-                </a:solidFill>
-                <a:highlight>
-                  <a:srgbClr val="FFFFFF"/>
-                </a:highlight>
-                <a:latin typeface="Courier New"/>
-                <a:ea typeface="Courier New"/>
-                <a:cs typeface="Courier New"/>
-                <a:sym typeface="Courier New"/>
-              </a:rPr>
-            </a:br>
-            <a:r>
-              <a:rPr lang="en" sz="1000" b="1" dirty="0">
-                <a:solidFill>
-                  <a:srgbClr val="333333"/>
-                </a:solidFill>
-                <a:highlight>
-                  <a:srgbClr val="FFFFFF"/>
-                </a:highlight>
-                <a:latin typeface="Courier New"/>
-                <a:ea typeface="Courier New"/>
-                <a:cs typeface="Courier New"/>
-                <a:sym typeface="Courier New"/>
-              </a:rPr>
-              <a:t> Positive Respons      39              40             36           33              35             36</a:t>
-            </a:r>
-          </a:p>
-          <a:p>
-            <a:pPr lvl="0" rtl="0">
-              <a:lnSpc>
-                <a:spcPct val="142857"/>
-              </a:lnSpc>
-              <a:spcBef>
-                <a:spcPts val="0"/>
-              </a:spcBef>
-              <a:spcAft>
-                <a:spcPts val="800"/>
-              </a:spcAft>
-              <a:buNone/>
-            </a:pPr>
-            <a:endParaRPr sz="1000" b="1" dirty="0">
-              <a:solidFill>
-                <a:srgbClr val="333333"/>
-              </a:solidFill>
-              <a:highlight>
-                <a:srgbClr val="FFFFFF"/>
-              </a:highlight>
-              <a:latin typeface="Courier New"/>
-              <a:ea typeface="Courier New"/>
-              <a:cs typeface="Courier New"/>
-              <a:sym typeface="Courier New"/>
-            </a:endParaRPr>
-          </a:p>
-          <a:p>
-            <a:pPr lvl="0" rtl="0">
-              <a:lnSpc>
-                <a:spcPct val="142857"/>
-              </a:lnSpc>
-              <a:spcBef>
-                <a:spcPts val="0"/>
-              </a:spcBef>
-              <a:spcAft>
-                <a:spcPts val="800"/>
-              </a:spcAft>
-              <a:buClr>
-                <a:schemeClr val="dk1"/>
-              </a:buClr>
-              <a:buSzPct val="110000"/>
-              <a:buFont typeface="Arial"/>
-              <a:buNone/>
-            </a:pPr>
-            <a:endParaRPr sz="1000" b="1" dirty="0">
-              <a:solidFill>
-                <a:srgbClr val="333333"/>
-              </a:solidFill>
-              <a:highlight>
-                <a:srgbClr val="FFFFFF"/>
-              </a:highlight>
-              <a:latin typeface="Courier New"/>
-              <a:ea typeface="Courier New"/>
-              <a:cs typeface="Courier New"/>
-              <a:sym typeface="Courier New"/>
-            </a:endParaRPr>
-          </a:p>
-          <a:p>
-            <a:pPr lvl="0">
-              <a:spcBef>
-                <a:spcPts val="0"/>
-              </a:spcBef>
-              <a:buNone/>
-            </a:pPr>
-            <a:endParaRPr b="1" dirty="0">
-              <a:latin typeface="Courier New"/>
-              <a:ea typeface="Courier New"/>
-              <a:cs typeface="Courier New"/>
-              <a:sym typeface="Courier New"/>
-            </a:endParaRPr>
+            <a:r>
+              <a:rPr lang="en-US" sz="1600" dirty="0"/>
+              <a:t>Administrative Errors</a:t>
+            </a:r>
+          </a:p>
+          <a:p>
+            <a:pPr lvl="1"/>
+            <a:r>
+              <a:rPr lang="en-US" sz="1450" dirty="0"/>
+              <a:t>Verified the number of treatments and outcomes recorded</a:t>
+            </a:r>
+          </a:p>
+          <a:p>
+            <a:pPr lvl="1"/>
+            <a:r>
+              <a:rPr lang="en-US" sz="1450" dirty="0"/>
+              <a:t>Checked for differences across treatments – important due to our multifactor design</a:t>
+            </a:r>
+          </a:p>
+          <a:p>
+            <a:endParaRPr lang="en-US" sz="1600" dirty="0"/>
+          </a:p>
+          <a:p>
+            <a:r>
+              <a:rPr lang="en-US" sz="1600" dirty="0"/>
+              <a:t> Measured for covariate imbalance</a:t>
+            </a:r>
+          </a:p>
+          <a:p>
+            <a:endParaRPr lang="en-US" sz="1600" dirty="0"/>
+          </a:p>
+          <a:p>
+            <a:r>
+              <a:rPr lang="en-US" sz="1600" dirty="0"/>
+              <a:t>Validity of randomization</a:t>
+            </a:r>
           </a:p>
         </p:txBody>
       </p:sp>
     </p:spTree>
+    <p:extLst>
+      <p:ext uri="{BB962C8B-B14F-4D97-AF65-F5344CB8AC3E}">
+        <p14:creationId xmlns:p14="http://schemas.microsoft.com/office/powerpoint/2010/main" val="552636589"/>
+      </p:ext>
+    </p:extLst>
   </p:cSld>
   <p:clrMapOvr>
     <a:masterClrMapping/>
@@ -8026,7 +5345,7 @@
   <p:cSld>
     <p:spTree>
       <p:nvGrpSpPr>
-        <p:cNvPr id="1" name="Shape 65"/>
+        <p:cNvPr id="1" name=""/>
         <p:cNvGrpSpPr/>
         <p:nvPr/>
       </p:nvGrpSpPr>
@@ -8040,369 +5359,57 @@
       </p:grpSpPr>
       <p:sp>
         <p:nvSpPr>
-          <p:cNvPr id="66" name="Shape 66"/>
-          <p:cNvSpPr txBox="1">
+          <p:cNvPr id="6" name="Title 5"/>
+          <p:cNvSpPr>
             <a:spLocks noGrp="1"/>
           </p:cNvSpPr>
           <p:nvPr>
             <p:ph type="title"/>
           </p:nvPr>
         </p:nvSpPr>
+        <p:spPr/>
+        <p:txBody>
+          <a:bodyPr anchor="t"/>
+          <a:lstStyle/>
+          <a:p>
+            <a:pPr algn="ctr"/>
+            <a:r>
+              <a:rPr lang="en-US" b="1" dirty="0"/>
+              <a:t>Data Profiling</a:t>
+            </a:r>
+          </a:p>
+        </p:txBody>
+      </p:sp>
+      <p:pic>
+        <p:nvPicPr>
+          <p:cNvPr id="7" name="Content Placeholder 4"/>
+          <p:cNvPicPr>
+            <a:picLocks noChangeAspect="1"/>
+          </p:cNvPicPr>
+          <p:nvPr/>
+        </p:nvPicPr>
+        <p:blipFill>
+          <a:blip r:embed="rId2"/>
+          <a:stretch>
+            <a:fillRect/>
+          </a:stretch>
+        </p:blipFill>
         <p:spPr>
+          <a:xfrm>
+            <a:off x="1116411" y="903890"/>
+            <a:ext cx="6258352" cy="3823545"/>
+          </a:xfrm>
           <a:prstGeom prst="rect">
             <a:avLst/>
           </a:prstGeom>
         </p:spPr>
-        <p:txBody>
-          <a:bodyPr lIns="91425" tIns="91425" rIns="91425" bIns="91425" anchor="t" anchorCtr="0">
-            <a:noAutofit/>
-          </a:bodyPr>
-          <a:lstStyle/>
-          <a:p>
-            <a:pPr lvl="0">
-              <a:spcBef>
-                <a:spcPts val="0"/>
-              </a:spcBef>
-              <a:buNone/>
-            </a:pPr>
-            <a:r>
-              <a:rPr lang="en"/>
-              <a:t>Outcomes</a:t>
-            </a:r>
-          </a:p>
-        </p:txBody>
-      </p:sp>
-      <p:sp>
-        <p:nvSpPr>
-          <p:cNvPr id="67" name="Shape 67"/>
-          <p:cNvSpPr txBox="1">
-            <a:spLocks noGrp="1"/>
-          </p:cNvSpPr>
-          <p:nvPr>
-            <p:ph type="body" idx="1"/>
-          </p:nvPr>
-        </p:nvSpPr>
-        <p:spPr>
-          <a:prstGeom prst="rect">
-            <a:avLst/>
-          </a:prstGeom>
-        </p:spPr>
-        <p:txBody>
-          <a:bodyPr lIns="91425" tIns="91425" rIns="91425" bIns="91425" anchor="t" anchorCtr="0">
-            <a:noAutofit/>
-          </a:bodyPr>
-          <a:lstStyle/>
-          <a:p>
-            <a:pPr lvl="0" rtl="0">
-              <a:lnSpc>
-                <a:spcPct val="142857"/>
-              </a:lnSpc>
-              <a:spcBef>
-                <a:spcPts val="0"/>
-              </a:spcBef>
-              <a:spcAft>
-                <a:spcPts val="800"/>
-              </a:spcAft>
-              <a:buClr>
-                <a:schemeClr val="dk1"/>
-              </a:buClr>
-              <a:buSzPct val="110000"/>
-              <a:buFont typeface="Arial"/>
-              <a:buNone/>
-            </a:pPr>
-            <a:r>
-              <a:rPr lang="en" sz="1000" b="1" dirty="0">
-                <a:solidFill>
-                  <a:srgbClr val="333333"/>
-                </a:solidFill>
-                <a:highlight>
-                  <a:srgbClr val="FFFFFF"/>
-                </a:highlight>
-                <a:latin typeface="Courier New"/>
-                <a:ea typeface="Courier New"/>
-                <a:cs typeface="Courier New"/>
-                <a:sym typeface="Courier New"/>
-              </a:rPr>
-              <a:t>Table of Outcomes (By City):</a:t>
-            </a:r>
-          </a:p>
-          <a:p>
-            <a:pPr lvl="0" rtl="0">
-              <a:lnSpc>
-                <a:spcPct val="142857"/>
-              </a:lnSpc>
-              <a:spcBef>
-                <a:spcPts val="0"/>
-              </a:spcBef>
-              <a:spcAft>
-                <a:spcPts val="800"/>
-              </a:spcAft>
-              <a:buClr>
-                <a:schemeClr val="dk1"/>
-              </a:buClr>
-              <a:buSzPct val="110000"/>
-              <a:buFont typeface="Arial"/>
-              <a:buNone/>
-            </a:pPr>
-            <a:br>
-              <a:rPr lang="en" sz="1000" b="1" dirty="0">
-                <a:solidFill>
-                  <a:srgbClr val="333333"/>
-                </a:solidFill>
-                <a:highlight>
-                  <a:srgbClr val="FFFFFF"/>
-                </a:highlight>
-                <a:latin typeface="Courier New"/>
-                <a:ea typeface="Courier New"/>
-                <a:cs typeface="Courier New"/>
-                <a:sym typeface="Courier New"/>
-              </a:rPr>
-            </a:br>
-            <a:r>
-              <a:rPr lang="en" sz="1000" b="1" dirty="0">
-                <a:solidFill>
-                  <a:srgbClr val="333333"/>
-                </a:solidFill>
-                <a:highlight>
-                  <a:srgbClr val="FFFFFF"/>
-                </a:highlight>
-                <a:latin typeface="Courier New"/>
-                <a:ea typeface="Courier New"/>
-                <a:cs typeface="Courier New"/>
-                <a:sym typeface="Courier New"/>
-              </a:rPr>
-              <a:t>    		chicago houston sandiego seattle</a:t>
-            </a:r>
-            <a:br>
-              <a:rPr lang="en" sz="1000" b="1" dirty="0">
-                <a:solidFill>
-                  <a:srgbClr val="333333"/>
-                </a:solidFill>
-                <a:highlight>
-                  <a:srgbClr val="FFFFFF"/>
-                </a:highlight>
-                <a:latin typeface="Courier New"/>
-                <a:ea typeface="Courier New"/>
-                <a:cs typeface="Courier New"/>
-                <a:sym typeface="Courier New"/>
-              </a:rPr>
-            </a:br>
-            <a:r>
-              <a:rPr lang="en" sz="1000" b="1" dirty="0">
-                <a:solidFill>
-                  <a:srgbClr val="333333"/>
-                </a:solidFill>
-                <a:highlight>
-                  <a:srgbClr val="FFFFFF"/>
-                </a:highlight>
-                <a:latin typeface="Courier New"/>
-                <a:ea typeface="Courier New"/>
-                <a:cs typeface="Courier New"/>
-                <a:sym typeface="Courier New"/>
-              </a:rPr>
-              <a:t>  No Response      63      79       65      57</a:t>
-            </a:r>
-            <a:br>
-              <a:rPr lang="en" sz="1000" b="1" dirty="0">
-                <a:solidFill>
-                  <a:srgbClr val="333333"/>
-                </a:solidFill>
-                <a:highlight>
-                  <a:srgbClr val="FFFFFF"/>
-                </a:highlight>
-                <a:latin typeface="Courier New"/>
-                <a:ea typeface="Courier New"/>
-                <a:cs typeface="Courier New"/>
-                <a:sym typeface="Courier New"/>
-              </a:rPr>
-            </a:br>
-            <a:r>
-              <a:rPr lang="en" sz="1000" b="1" dirty="0">
-                <a:solidFill>
-                  <a:srgbClr val="333333"/>
-                </a:solidFill>
-                <a:highlight>
-                  <a:srgbClr val="FFFFFF"/>
-                </a:highlight>
-                <a:latin typeface="Courier New"/>
-                <a:ea typeface="Courier New"/>
-                <a:cs typeface="Courier New"/>
-                <a:sym typeface="Courier New"/>
-              </a:rPr>
-              <a:t>  Pos Response     61      40       52      66</a:t>
-            </a:r>
-          </a:p>
-          <a:p>
-            <a:pPr lvl="0" rtl="0">
-              <a:lnSpc>
-                <a:spcPct val="142857"/>
-              </a:lnSpc>
-              <a:spcBef>
-                <a:spcPts val="0"/>
-              </a:spcBef>
-              <a:spcAft>
-                <a:spcPts val="800"/>
-              </a:spcAft>
-              <a:buClr>
-                <a:schemeClr val="dk1"/>
-              </a:buClr>
-              <a:buSzPct val="110000"/>
-              <a:buFont typeface="Arial"/>
-              <a:buNone/>
-            </a:pPr>
-            <a:br>
-              <a:rPr lang="en" sz="1000" b="1" dirty="0">
-                <a:solidFill>
-                  <a:srgbClr val="333333"/>
-                </a:solidFill>
-                <a:highlight>
-                  <a:srgbClr val="FFFFFF"/>
-                </a:highlight>
-                <a:latin typeface="Courier New"/>
-                <a:ea typeface="Courier New"/>
-                <a:cs typeface="Courier New"/>
-                <a:sym typeface="Courier New"/>
-              </a:rPr>
-            </a:br>
-            <a:r>
-              <a:rPr lang="en" sz="1000" b="1" dirty="0">
-                <a:solidFill>
-                  <a:srgbClr val="333333"/>
-                </a:solidFill>
-                <a:highlight>
-                  <a:srgbClr val="FFFFFF"/>
-                </a:highlight>
-                <a:latin typeface="Courier New"/>
-                <a:ea typeface="Courier New"/>
-                <a:cs typeface="Courier New"/>
-                <a:sym typeface="Courier New"/>
-              </a:rPr>
-              <a:t>Table of Outcomes (By Rooms):</a:t>
-            </a:r>
-          </a:p>
-          <a:p>
-            <a:pPr lvl="0" rtl="0">
-              <a:lnSpc>
-                <a:spcPct val="142857"/>
-              </a:lnSpc>
-              <a:spcBef>
-                <a:spcPts val="0"/>
-              </a:spcBef>
-              <a:spcAft>
-                <a:spcPts val="800"/>
-              </a:spcAft>
-              <a:buClr>
-                <a:schemeClr val="dk1"/>
-              </a:buClr>
-              <a:buSzPct val="110000"/>
-              <a:buFont typeface="Arial"/>
-              <a:buNone/>
-            </a:pPr>
-            <a:br>
-              <a:rPr lang="en" sz="1000" b="1" dirty="0">
-                <a:solidFill>
-                  <a:srgbClr val="333333"/>
-                </a:solidFill>
-                <a:highlight>
-                  <a:srgbClr val="FFFFFF"/>
-                </a:highlight>
-                <a:latin typeface="Courier New"/>
-                <a:ea typeface="Courier New"/>
-                <a:cs typeface="Courier New"/>
-                <a:sym typeface="Courier New"/>
-              </a:rPr>
-            </a:br>
-            <a:r>
-              <a:rPr lang="en" sz="1000" b="1" dirty="0">
-                <a:solidFill>
-                  <a:srgbClr val="333333"/>
-                </a:solidFill>
-                <a:highlight>
-                  <a:srgbClr val="FFFFFF"/>
-                </a:highlight>
-                <a:latin typeface="Courier New"/>
-                <a:ea typeface="Courier New"/>
-                <a:cs typeface="Courier New"/>
-                <a:sym typeface="Courier New"/>
-              </a:rPr>
-              <a:t>      		1   2 (Bedrooms)</a:t>
-            </a:r>
-            <a:br>
-              <a:rPr lang="en" sz="1000" b="1" dirty="0">
-                <a:solidFill>
-                  <a:srgbClr val="333333"/>
-                </a:solidFill>
-                <a:highlight>
-                  <a:srgbClr val="FFFFFF"/>
-                </a:highlight>
-                <a:latin typeface="Courier New"/>
-                <a:ea typeface="Courier New"/>
-                <a:cs typeface="Courier New"/>
-                <a:sym typeface="Courier New"/>
-              </a:rPr>
-            </a:br>
-            <a:r>
-              <a:rPr lang="en" sz="1000" b="1" dirty="0">
-                <a:solidFill>
-                  <a:srgbClr val="333333"/>
-                </a:solidFill>
-                <a:highlight>
-                  <a:srgbClr val="FFFFFF"/>
-                </a:highlight>
-                <a:latin typeface="Courier New"/>
-                <a:ea typeface="Courier New"/>
-                <a:cs typeface="Courier New"/>
-                <a:sym typeface="Courier New"/>
-              </a:rPr>
-              <a:t>  No Response 	130 134</a:t>
-            </a:r>
-            <a:br>
-              <a:rPr lang="en" sz="1000" b="1" dirty="0">
-                <a:solidFill>
-                  <a:srgbClr val="333333"/>
-                </a:solidFill>
-                <a:highlight>
-                  <a:srgbClr val="FFFFFF"/>
-                </a:highlight>
-                <a:latin typeface="Courier New"/>
-                <a:ea typeface="Courier New"/>
-                <a:cs typeface="Courier New"/>
-                <a:sym typeface="Courier New"/>
-              </a:rPr>
-            </a:br>
-            <a:r>
-              <a:rPr lang="en" sz="1000" b="1" dirty="0">
-                <a:solidFill>
-                  <a:srgbClr val="333333"/>
-                </a:solidFill>
-                <a:highlight>
-                  <a:srgbClr val="FFFFFF"/>
-                </a:highlight>
-                <a:latin typeface="Courier New"/>
-                <a:ea typeface="Courier New"/>
-                <a:cs typeface="Courier New"/>
-                <a:sym typeface="Courier New"/>
-              </a:rPr>
-              <a:t>  Pos Response 	103 116</a:t>
-            </a:r>
-          </a:p>
-          <a:p>
-            <a:pPr lvl="0">
-              <a:spcBef>
-                <a:spcPts val="0"/>
-              </a:spcBef>
-              <a:buNone/>
-            </a:pPr>
-            <a:endParaRPr b="1" dirty="0">
-              <a:latin typeface="Courier New"/>
-              <a:ea typeface="Courier New"/>
-              <a:cs typeface="Courier New"/>
-              <a:sym typeface="Courier New"/>
-            </a:endParaRPr>
-          </a:p>
-        </p:txBody>
-      </p:sp>
+      </p:pic>
     </p:spTree>
+    <p:extLst>
+      <p:ext uri="{BB962C8B-B14F-4D97-AF65-F5344CB8AC3E}">
+        <p14:creationId xmlns:p14="http://schemas.microsoft.com/office/powerpoint/2010/main" val="3046774244"/>
+      </p:ext>
+    </p:extLst>
   </p:cSld>
   <p:clrMapOvr>
     <a:masterClrMapping/>
@@ -8415,7 +5422,7 @@
   <p:cSld>
     <p:spTree>
       <p:nvGrpSpPr>
-        <p:cNvPr id="1" name="Shape 71"/>
+        <p:cNvPr id="1" name=""/>
         <p:cNvGrpSpPr/>
         <p:nvPr/>
       </p:nvGrpSpPr>
@@ -8429,672 +5436,182 @@
       </p:grpSpPr>
       <p:sp>
         <p:nvSpPr>
-          <p:cNvPr id="72" name="Shape 72"/>
-          <p:cNvSpPr txBox="1">
+          <p:cNvPr id="6" name="Title 5"/>
+          <p:cNvSpPr>
             <a:spLocks noGrp="1"/>
           </p:cNvSpPr>
           <p:nvPr>
             <p:ph type="title"/>
           </p:nvPr>
         </p:nvSpPr>
+        <p:spPr/>
+        <p:txBody>
+          <a:bodyPr anchor="t"/>
+          <a:lstStyle/>
+          <a:p>
+            <a:pPr algn="ctr"/>
+            <a:r>
+              <a:rPr lang="en-US" b="1" dirty="0"/>
+              <a:t>Outcomes</a:t>
+            </a:r>
+          </a:p>
+        </p:txBody>
+      </p:sp>
+      <p:pic>
+        <p:nvPicPr>
+          <p:cNvPr id="8" name="Picture 7"/>
+          <p:cNvPicPr>
+            <a:picLocks noChangeAspect="1"/>
+          </p:cNvPicPr>
+          <p:nvPr/>
+        </p:nvPicPr>
+        <p:blipFill>
+          <a:blip r:embed="rId2"/>
+          <a:stretch>
+            <a:fillRect/>
+          </a:stretch>
+        </p:blipFill>
         <p:spPr>
+          <a:xfrm>
+            <a:off x="108066" y="2975957"/>
+            <a:ext cx="8262850" cy="795938"/>
+          </a:xfrm>
           <a:prstGeom prst="rect">
             <a:avLst/>
           </a:prstGeom>
         </p:spPr>
-        <p:txBody>
-          <a:bodyPr lIns="91425" tIns="91425" rIns="91425" bIns="91425" anchor="t" anchorCtr="0">
-            <a:noAutofit/>
-          </a:bodyPr>
-          <a:lstStyle/>
-          <a:p>
-            <a:pPr lvl="0" rtl="0">
-              <a:lnSpc>
-                <a:spcPct val="142857"/>
-              </a:lnSpc>
-              <a:spcBef>
-                <a:spcPts val="0"/>
-              </a:spcBef>
-              <a:spcAft>
-                <a:spcPts val="800"/>
-              </a:spcAft>
-              <a:buClr>
-                <a:schemeClr val="dk1"/>
-              </a:buClr>
-              <a:buSzPct val="91666"/>
-              <a:buFont typeface="Arial"/>
-              <a:buNone/>
-            </a:pPr>
-            <a:r>
-              <a:rPr lang="en" sz="1200" b="1" dirty="0">
-                <a:solidFill>
-                  <a:srgbClr val="4C886B"/>
-                </a:solidFill>
-                <a:highlight>
-                  <a:srgbClr val="F5F5F5"/>
-                </a:highlight>
-                <a:latin typeface="Courier New"/>
-                <a:ea typeface="Courier New"/>
-                <a:cs typeface="Courier New"/>
-                <a:sym typeface="Courier New"/>
-              </a:rPr>
-              <a:t># Model 1 - Basic model</a:t>
-            </a:r>
-            <a:br>
-              <a:rPr lang="en" sz="1200" b="1" dirty="0">
-                <a:solidFill>
-                  <a:srgbClr val="333333"/>
-                </a:solidFill>
-                <a:highlight>
-                  <a:srgbClr val="F5F5F5"/>
-                </a:highlight>
-                <a:latin typeface="Courier New"/>
-                <a:ea typeface="Courier New"/>
-                <a:cs typeface="Courier New"/>
-                <a:sym typeface="Courier New"/>
-              </a:rPr>
-            </a:br>
-            <a:r>
-              <a:rPr lang="en" sz="1200" b="1" dirty="0">
-                <a:highlight>
-                  <a:srgbClr val="F5F5F5"/>
-                </a:highlight>
-                <a:latin typeface="Courier New"/>
-                <a:ea typeface="Courier New"/>
-                <a:cs typeface="Courier New"/>
-                <a:sym typeface="Courier New"/>
-              </a:rPr>
-              <a:t>m1</a:t>
-            </a:r>
-            <a:r>
-              <a:rPr lang="en" sz="1200" b="1" dirty="0">
-                <a:solidFill>
-                  <a:srgbClr val="333333"/>
-                </a:solidFill>
-                <a:highlight>
-                  <a:srgbClr val="F5F5F5"/>
-                </a:highlight>
-                <a:latin typeface="Courier New"/>
-                <a:ea typeface="Courier New"/>
-                <a:cs typeface="Courier New"/>
-                <a:sym typeface="Courier New"/>
-              </a:rPr>
-              <a:t> </a:t>
-            </a:r>
-            <a:r>
-              <a:rPr lang="en" sz="1200" b="1" dirty="0">
-                <a:solidFill>
-                  <a:srgbClr val="687687"/>
-                </a:solidFill>
-                <a:highlight>
-                  <a:srgbClr val="F5F5F5"/>
-                </a:highlight>
-                <a:latin typeface="Courier New"/>
-                <a:ea typeface="Courier New"/>
-                <a:cs typeface="Courier New"/>
-                <a:sym typeface="Courier New"/>
-              </a:rPr>
-              <a:t>&lt;-</a:t>
-            </a:r>
-            <a:r>
-              <a:rPr lang="en" sz="1200" b="1" dirty="0">
-                <a:solidFill>
-                  <a:srgbClr val="333333"/>
-                </a:solidFill>
-                <a:highlight>
-                  <a:srgbClr val="F5F5F5"/>
-                </a:highlight>
-                <a:latin typeface="Courier New"/>
-                <a:ea typeface="Courier New"/>
-                <a:cs typeface="Courier New"/>
-                <a:sym typeface="Courier New"/>
-              </a:rPr>
-              <a:t> </a:t>
-            </a:r>
-            <a:r>
-              <a:rPr lang="en" sz="1200" b="1" dirty="0">
-                <a:highlight>
-                  <a:srgbClr val="F5F5F5"/>
-                </a:highlight>
-                <a:latin typeface="Courier New"/>
-                <a:ea typeface="Courier New"/>
-                <a:cs typeface="Courier New"/>
-                <a:sym typeface="Courier New"/>
-              </a:rPr>
-              <a:t>lm</a:t>
-            </a:r>
-            <a:r>
-              <a:rPr lang="en" sz="1200" b="1" dirty="0">
-                <a:solidFill>
-                  <a:srgbClr val="687687"/>
-                </a:solidFill>
-                <a:highlight>
-                  <a:srgbClr val="F5F5F5"/>
-                </a:highlight>
-                <a:latin typeface="Courier New"/>
-                <a:ea typeface="Courier New"/>
-                <a:cs typeface="Courier New"/>
-                <a:sym typeface="Courier New"/>
-              </a:rPr>
-              <a:t>(</a:t>
-            </a:r>
-            <a:r>
-              <a:rPr lang="en" sz="1200" b="1" dirty="0" err="1">
-                <a:highlight>
-                  <a:srgbClr val="F5F5F5"/>
-                </a:highlight>
-                <a:latin typeface="Courier New"/>
-                <a:ea typeface="Courier New"/>
-                <a:cs typeface="Courier New"/>
-                <a:sym typeface="Courier New"/>
-              </a:rPr>
-              <a:t>outcome</a:t>
-            </a:r>
-            <a:r>
-              <a:rPr lang="en" sz="1200" b="1" dirty="0" err="1">
-                <a:solidFill>
-                  <a:srgbClr val="687687"/>
-                </a:solidFill>
-                <a:highlight>
-                  <a:srgbClr val="F5F5F5"/>
-                </a:highlight>
-                <a:latin typeface="Courier New"/>
-                <a:ea typeface="Courier New"/>
-                <a:cs typeface="Courier New"/>
-                <a:sym typeface="Courier New"/>
-              </a:rPr>
-              <a:t>~</a:t>
-            </a:r>
-            <a:r>
-              <a:rPr lang="en" sz="1200" b="1" dirty="0" err="1">
-                <a:highlight>
-                  <a:srgbClr val="F5F5F5"/>
-                </a:highlight>
-                <a:latin typeface="Courier New"/>
-                <a:ea typeface="Courier New"/>
-                <a:cs typeface="Courier New"/>
-                <a:sym typeface="Courier New"/>
-              </a:rPr>
-              <a:t>treatment</a:t>
-            </a:r>
-            <a:r>
-              <a:rPr lang="en" sz="1200" b="1" dirty="0" err="1">
-                <a:solidFill>
-                  <a:srgbClr val="333333"/>
-                </a:solidFill>
-                <a:highlight>
-                  <a:srgbClr val="F5F5F5"/>
-                </a:highlight>
-                <a:latin typeface="Courier New"/>
-                <a:ea typeface="Courier New"/>
-                <a:cs typeface="Courier New"/>
-                <a:sym typeface="Courier New"/>
-              </a:rPr>
-              <a:t>,</a:t>
-            </a:r>
-            <a:r>
-              <a:rPr lang="en" sz="1200" b="1" dirty="0" err="1">
-                <a:highlight>
-                  <a:srgbClr val="F5F5F5"/>
-                </a:highlight>
-                <a:latin typeface="Courier New"/>
-                <a:ea typeface="Courier New"/>
-                <a:cs typeface="Courier New"/>
-                <a:sym typeface="Courier New"/>
-              </a:rPr>
-              <a:t>data</a:t>
-            </a:r>
-            <a:r>
-              <a:rPr lang="en" sz="1200" b="1" dirty="0">
-                <a:solidFill>
-                  <a:srgbClr val="687687"/>
-                </a:solidFill>
-                <a:highlight>
-                  <a:srgbClr val="F5F5F5"/>
-                </a:highlight>
-                <a:latin typeface="Courier New"/>
-                <a:ea typeface="Courier New"/>
-                <a:cs typeface="Courier New"/>
-                <a:sym typeface="Courier New"/>
-              </a:rPr>
-              <a:t>=</a:t>
-            </a:r>
-            <a:r>
-              <a:rPr lang="en" sz="1200" b="1" dirty="0">
-                <a:highlight>
-                  <a:srgbClr val="F5F5F5"/>
-                </a:highlight>
-                <a:latin typeface="Courier New"/>
-                <a:ea typeface="Courier New"/>
-                <a:cs typeface="Courier New"/>
-                <a:sym typeface="Courier New"/>
-              </a:rPr>
-              <a:t>d</a:t>
-            </a:r>
-            <a:r>
-              <a:rPr lang="en" sz="1200" b="1" dirty="0">
-                <a:solidFill>
-                  <a:srgbClr val="687687"/>
-                </a:solidFill>
-                <a:highlight>
-                  <a:srgbClr val="F5F5F5"/>
-                </a:highlight>
-                <a:latin typeface="Courier New"/>
-                <a:ea typeface="Courier New"/>
-                <a:cs typeface="Courier New"/>
-                <a:sym typeface="Courier New"/>
-              </a:rPr>
-              <a:t>)</a:t>
-            </a:r>
-          </a:p>
-        </p:txBody>
-      </p:sp>
-      <p:sp>
-        <p:nvSpPr>
-          <p:cNvPr id="73" name="Shape 73"/>
-          <p:cNvSpPr txBox="1">
-            <a:spLocks noGrp="1"/>
-          </p:cNvSpPr>
-          <p:nvPr>
-            <p:ph type="body" idx="1"/>
-          </p:nvPr>
-        </p:nvSpPr>
+      </p:pic>
+      <p:pic>
+        <p:nvPicPr>
+          <p:cNvPr id="9" name="Picture 8"/>
+          <p:cNvPicPr>
+            <a:picLocks noChangeAspect="1"/>
+          </p:cNvPicPr>
+          <p:nvPr/>
+        </p:nvPicPr>
+        <p:blipFill>
+          <a:blip r:embed="rId3"/>
+          <a:stretch>
+            <a:fillRect/>
+          </a:stretch>
+        </p:blipFill>
         <p:spPr>
+          <a:xfrm>
+            <a:off x="3490006" y="1591338"/>
+            <a:ext cx="2182275" cy="464533"/>
+          </a:xfrm>
           <a:prstGeom prst="rect">
             <a:avLst/>
           </a:prstGeom>
         </p:spPr>
-        <p:txBody>
-          <a:bodyPr lIns="91425" tIns="91425" rIns="91425" bIns="91425" anchor="t" anchorCtr="0">
-            <a:noAutofit/>
-          </a:bodyPr>
-          <a:lstStyle/>
-          <a:p>
-            <a:pPr lvl="0" rtl="0">
-              <a:lnSpc>
-                <a:spcPct val="142857"/>
-              </a:lnSpc>
-              <a:spcBef>
-                <a:spcPts val="0"/>
-              </a:spcBef>
-              <a:spcAft>
-                <a:spcPts val="800"/>
-              </a:spcAft>
-              <a:buClr>
-                <a:schemeClr val="dk1"/>
-              </a:buClr>
-              <a:buSzPct val="91666"/>
-              <a:buFont typeface="Arial"/>
-              <a:buNone/>
-            </a:pPr>
-            <a:r>
-              <a:rPr lang="en" sz="1200" b="1" dirty="0">
-                <a:solidFill>
-                  <a:srgbClr val="333333"/>
-                </a:solidFill>
-                <a:highlight>
-                  <a:srgbClr val="FFFFFF"/>
-                </a:highlight>
-                <a:latin typeface="Courier New"/>
-                <a:ea typeface="Courier New"/>
-                <a:cs typeface="Courier New"/>
-                <a:sym typeface="Courier New"/>
-              </a:rPr>
-              <a:t>t test of coefficients:</a:t>
-            </a:r>
-            <a:br>
-              <a:rPr lang="en" sz="1200" b="1" dirty="0">
-                <a:solidFill>
-                  <a:srgbClr val="333333"/>
-                </a:solidFill>
-                <a:highlight>
-                  <a:srgbClr val="FFFFFF"/>
-                </a:highlight>
-                <a:latin typeface="Courier New"/>
-                <a:ea typeface="Courier New"/>
-                <a:cs typeface="Courier New"/>
-                <a:sym typeface="Courier New"/>
-              </a:rPr>
-            </a:br>
-            <a:br>
-              <a:rPr lang="en" sz="1200" b="1" dirty="0">
-                <a:solidFill>
-                  <a:srgbClr val="333333"/>
-                </a:solidFill>
-                <a:highlight>
-                  <a:srgbClr val="FFFFFF"/>
-                </a:highlight>
-                <a:latin typeface="Courier New"/>
-                <a:ea typeface="Courier New"/>
-                <a:cs typeface="Courier New"/>
-                <a:sym typeface="Courier New"/>
-              </a:rPr>
-            </a:br>
-            <a:r>
-              <a:rPr lang="en" sz="1200" b="1" dirty="0">
-                <a:solidFill>
-                  <a:srgbClr val="333333"/>
-                </a:solidFill>
-                <a:highlight>
-                  <a:srgbClr val="FFFFFF"/>
-                </a:highlight>
-                <a:latin typeface="Courier New"/>
-                <a:ea typeface="Courier New"/>
-                <a:cs typeface="Courier New"/>
-                <a:sym typeface="Courier New"/>
-              </a:rPr>
-              <a:t>             Estimate Std. Error t value </a:t>
-            </a:r>
-            <a:r>
-              <a:rPr lang="en" sz="1200" b="1" dirty="0" err="1">
-                <a:solidFill>
-                  <a:srgbClr val="333333"/>
-                </a:solidFill>
-                <a:highlight>
-                  <a:srgbClr val="FFFFFF"/>
-                </a:highlight>
-                <a:latin typeface="Courier New"/>
-                <a:ea typeface="Courier New"/>
-                <a:cs typeface="Courier New"/>
-                <a:sym typeface="Courier New"/>
-              </a:rPr>
-              <a:t>Pr</a:t>
-            </a:r>
-            <a:r>
-              <a:rPr lang="en" sz="1200" b="1" dirty="0">
-                <a:solidFill>
-                  <a:srgbClr val="333333"/>
-                </a:solidFill>
-                <a:highlight>
-                  <a:srgbClr val="FFFFFF"/>
-                </a:highlight>
-                <a:latin typeface="Courier New"/>
-                <a:ea typeface="Courier New"/>
-                <a:cs typeface="Courier New"/>
-                <a:sym typeface="Courier New"/>
-              </a:rPr>
-              <a:t>(&gt;|t|)    </a:t>
-            </a:r>
-            <a:br>
-              <a:rPr lang="en" sz="1200" b="1" dirty="0">
-                <a:solidFill>
-                  <a:srgbClr val="333333"/>
-                </a:solidFill>
-                <a:highlight>
-                  <a:srgbClr val="FFFFFF"/>
-                </a:highlight>
-                <a:latin typeface="Courier New"/>
-                <a:ea typeface="Courier New"/>
-                <a:cs typeface="Courier New"/>
-                <a:sym typeface="Courier New"/>
-              </a:rPr>
-            </a:br>
-            <a:r>
-              <a:rPr lang="en" sz="1200" b="1" dirty="0">
-                <a:solidFill>
-                  <a:srgbClr val="333333"/>
-                </a:solidFill>
-                <a:highlight>
-                  <a:srgbClr val="FFFFFF"/>
-                </a:highlight>
-                <a:latin typeface="Courier New"/>
-                <a:ea typeface="Courier New"/>
-                <a:cs typeface="Courier New"/>
-                <a:sym typeface="Courier New"/>
-              </a:rPr>
-              <a:t>(Intercept) 0.4468885  0.0360544  12.395   &lt;2e-16 ***</a:t>
-            </a:r>
-            <a:br>
-              <a:rPr lang="en" sz="1200" b="1" dirty="0">
-                <a:solidFill>
-                  <a:srgbClr val="333333"/>
-                </a:solidFill>
-                <a:highlight>
-                  <a:srgbClr val="FFFFFF"/>
-                </a:highlight>
-                <a:latin typeface="Courier New"/>
-                <a:ea typeface="Courier New"/>
-                <a:cs typeface="Courier New"/>
-                <a:sym typeface="Courier New"/>
-              </a:rPr>
-            </a:br>
-            <a:r>
-              <a:rPr lang="en" sz="1200" b="1" dirty="0">
-                <a:solidFill>
-                  <a:srgbClr val="333333"/>
-                </a:solidFill>
-                <a:highlight>
-                  <a:srgbClr val="FFFFFF"/>
-                </a:highlight>
-                <a:latin typeface="Courier New"/>
-                <a:ea typeface="Courier New"/>
-                <a:cs typeface="Courier New"/>
-                <a:sym typeface="Courier New"/>
-              </a:rPr>
-              <a:t>treatment   0.0065007  0.0279011   0.233   0.8159    </a:t>
-            </a:r>
-            <a:br>
-              <a:rPr lang="en" sz="1200" b="1" dirty="0">
-                <a:solidFill>
-                  <a:srgbClr val="333333"/>
-                </a:solidFill>
-                <a:highlight>
-                  <a:srgbClr val="FFFFFF"/>
-                </a:highlight>
-                <a:latin typeface="Courier New"/>
-                <a:ea typeface="Courier New"/>
-                <a:cs typeface="Courier New"/>
-                <a:sym typeface="Courier New"/>
-              </a:rPr>
-            </a:br>
-            <a:r>
-              <a:rPr lang="en" sz="1200" b="1" dirty="0">
-                <a:solidFill>
-                  <a:srgbClr val="333333"/>
-                </a:solidFill>
-                <a:highlight>
-                  <a:srgbClr val="FFFFFF"/>
-                </a:highlight>
-                <a:latin typeface="Courier New"/>
-                <a:ea typeface="Courier New"/>
-                <a:cs typeface="Courier New"/>
-                <a:sym typeface="Courier New"/>
-              </a:rPr>
-              <a:t>---</a:t>
-            </a:r>
-            <a:br>
-              <a:rPr lang="en" sz="1200" b="1" dirty="0">
-                <a:solidFill>
-                  <a:srgbClr val="333333"/>
-                </a:solidFill>
-                <a:highlight>
-                  <a:srgbClr val="FFFFFF"/>
-                </a:highlight>
-                <a:latin typeface="Courier New"/>
-                <a:ea typeface="Courier New"/>
-                <a:cs typeface="Courier New"/>
-                <a:sym typeface="Courier New"/>
-              </a:rPr>
-            </a:br>
-            <a:r>
-              <a:rPr lang="en" sz="1200" b="1" dirty="0" err="1">
-                <a:solidFill>
-                  <a:srgbClr val="333333"/>
-                </a:solidFill>
-                <a:highlight>
-                  <a:srgbClr val="FFFFFF"/>
-                </a:highlight>
-                <a:latin typeface="Courier New"/>
-                <a:ea typeface="Courier New"/>
-                <a:cs typeface="Courier New"/>
-                <a:sym typeface="Courier New"/>
-              </a:rPr>
-              <a:t>Signif</a:t>
-            </a:r>
-            <a:r>
-              <a:rPr lang="en" sz="1200" b="1" dirty="0">
-                <a:solidFill>
-                  <a:srgbClr val="333333"/>
-                </a:solidFill>
-                <a:highlight>
-                  <a:srgbClr val="FFFFFF"/>
-                </a:highlight>
-                <a:latin typeface="Courier New"/>
-                <a:ea typeface="Courier New"/>
-                <a:cs typeface="Courier New"/>
-                <a:sym typeface="Courier New"/>
-              </a:rPr>
-              <a:t>. codes:  0 ‘***’ 0.001 ‘**’ 0.01 ‘*’ 0.05 ‘.’ 0.1 ‘ ’ 1</a:t>
-            </a:r>
-          </a:p>
-          <a:p>
-            <a:pPr lvl="0" rtl="0">
-              <a:lnSpc>
-                <a:spcPct val="142857"/>
-              </a:lnSpc>
-              <a:spcBef>
-                <a:spcPts val="0"/>
-              </a:spcBef>
-              <a:spcAft>
-                <a:spcPts val="800"/>
-              </a:spcAft>
-              <a:buClr>
-                <a:schemeClr val="dk1"/>
-              </a:buClr>
-              <a:buSzPct val="91666"/>
-              <a:buFont typeface="Arial"/>
-              <a:buNone/>
-            </a:pPr>
-            <a:endParaRPr lang="en" sz="1200" b="1" dirty="0">
-              <a:solidFill>
-                <a:srgbClr val="333333"/>
-              </a:solidFill>
-              <a:highlight>
-                <a:srgbClr val="FFFFFF"/>
-              </a:highlight>
-              <a:latin typeface="Courier New"/>
-              <a:ea typeface="Courier New"/>
-              <a:cs typeface="Courier New"/>
-              <a:sym typeface="Courier New"/>
-            </a:endParaRPr>
-          </a:p>
-          <a:p>
-            <a:pPr lvl="0" rtl="0">
-              <a:lnSpc>
-                <a:spcPct val="142857"/>
-              </a:lnSpc>
-              <a:spcBef>
-                <a:spcPts val="0"/>
-              </a:spcBef>
-              <a:spcAft>
-                <a:spcPts val="800"/>
-              </a:spcAft>
-              <a:buClr>
-                <a:schemeClr val="dk1"/>
-              </a:buClr>
-              <a:buSzPct val="91666"/>
-              <a:buFont typeface="Arial"/>
-              <a:buNone/>
-            </a:pPr>
-            <a:r>
-              <a:rPr lang="en-US" sz="1200" b="1" dirty="0">
-                <a:solidFill>
-                  <a:srgbClr val="333333"/>
-                </a:solidFill>
-                <a:highlight>
-                  <a:srgbClr val="FFFFFF"/>
-                </a:highlight>
-                <a:latin typeface="Courier New"/>
-                <a:ea typeface="Courier New"/>
-                <a:cs typeface="Courier New"/>
-                <a:sym typeface="Courier New"/>
-              </a:rPr>
-              <a:t>Note: treatment variable is coded 2 for high, 1 for low, 0 for none</a:t>
-            </a:r>
-          </a:p>
-          <a:p>
-            <a:pPr lvl="0" rtl="0">
-              <a:lnSpc>
-                <a:spcPct val="142857"/>
-              </a:lnSpc>
-              <a:spcBef>
-                <a:spcPts val="0"/>
-              </a:spcBef>
-              <a:spcAft>
-                <a:spcPts val="800"/>
-              </a:spcAft>
-              <a:buClr>
-                <a:schemeClr val="dk1"/>
-              </a:buClr>
-              <a:buSzPct val="91666"/>
-              <a:buFont typeface="Arial"/>
-              <a:buNone/>
-            </a:pPr>
-            <a:r>
-              <a:rPr lang="en" sz="1200" b="1" dirty="0">
-                <a:solidFill>
-                  <a:srgbClr val="333333"/>
-                </a:solidFill>
-                <a:highlight>
-                  <a:srgbClr val="FFFFFF"/>
-                </a:highlight>
-                <a:latin typeface="Courier New"/>
-                <a:ea typeface="Courier New"/>
-                <a:cs typeface="Courier New"/>
-                <a:sym typeface="Courier New"/>
-              </a:rPr>
-              <a:t>We also ran this regression in complete form ie. </a:t>
-            </a:r>
-            <a:r>
-              <a:rPr lang="en-US" sz="1200" b="1" dirty="0">
-                <a:solidFill>
-                  <a:srgbClr val="333333"/>
-                </a:solidFill>
-                <a:highlight>
-                  <a:srgbClr val="FFFFFF"/>
-                </a:highlight>
-                <a:latin typeface="Courier New"/>
-                <a:ea typeface="Courier New"/>
-                <a:cs typeface="Courier New"/>
-                <a:sym typeface="Courier New"/>
-              </a:rPr>
-              <a:t>F</a:t>
-            </a:r>
-            <a:r>
-              <a:rPr lang="en" sz="1200" b="1" dirty="0">
-                <a:solidFill>
-                  <a:srgbClr val="333333"/>
-                </a:solidFill>
-                <a:highlight>
-                  <a:srgbClr val="FFFFFF"/>
-                </a:highlight>
-                <a:latin typeface="Courier New"/>
-                <a:ea typeface="Courier New"/>
-                <a:cs typeface="Courier New"/>
-                <a:sym typeface="Courier New"/>
-              </a:rPr>
-              <a:t>actors for each treatment/control assignment</a:t>
-            </a:r>
-          </a:p>
-          <a:p>
-            <a:pPr lvl="0">
-              <a:spcBef>
-                <a:spcPts val="0"/>
-              </a:spcBef>
-              <a:buNone/>
-            </a:pPr>
-            <a:endParaRPr sz="1000" dirty="0">
-              <a:solidFill>
-                <a:srgbClr val="333333"/>
-              </a:solidFill>
-              <a:highlight>
-                <a:srgbClr val="FFFFFF"/>
-              </a:highlight>
-            </a:endParaRPr>
-          </a:p>
-        </p:txBody>
-      </p:sp>
+      </p:pic>
+      <p:cxnSp>
+        <p:nvCxnSpPr>
+          <p:cNvPr id="11" name="Straight Arrow Connector 10"/>
+          <p:cNvCxnSpPr/>
+          <p:nvPr/>
+        </p:nvCxnSpPr>
+        <p:spPr>
+          <a:xfrm flipH="1">
+            <a:off x="3490006" y="2055871"/>
+            <a:ext cx="408663" cy="371445"/>
+          </a:xfrm>
+          <a:prstGeom prst="straightConnector1">
+            <a:avLst/>
+          </a:prstGeom>
+          <a:ln>
+            <a:tailEnd type="triangle"/>
+          </a:ln>
+        </p:spPr>
+        <p:style>
+          <a:lnRef idx="1">
+            <a:schemeClr val="accent1"/>
+          </a:lnRef>
+          <a:fillRef idx="0">
+            <a:schemeClr val="accent1"/>
+          </a:fillRef>
+          <a:effectRef idx="0">
+            <a:schemeClr val="accent1"/>
+          </a:effectRef>
+          <a:fontRef idx="minor">
+            <a:schemeClr val="tx1"/>
+          </a:fontRef>
+        </p:style>
+      </p:cxnSp>
+      <p:cxnSp>
+        <p:nvCxnSpPr>
+          <p:cNvPr id="13" name="Straight Arrow Connector 12"/>
+          <p:cNvCxnSpPr>
+            <a:stCxn id="9" idx="2"/>
+          </p:cNvCxnSpPr>
+          <p:nvPr/>
+        </p:nvCxnSpPr>
+        <p:spPr>
+          <a:xfrm flipH="1">
+            <a:off x="4581143" y="2055871"/>
+            <a:ext cx="1" cy="429634"/>
+          </a:xfrm>
+          <a:prstGeom prst="straightConnector1">
+            <a:avLst/>
+          </a:prstGeom>
+          <a:ln>
+            <a:tailEnd type="triangle"/>
+          </a:ln>
+        </p:spPr>
+        <p:style>
+          <a:lnRef idx="1">
+            <a:schemeClr val="accent1"/>
+          </a:lnRef>
+          <a:fillRef idx="0">
+            <a:schemeClr val="accent1"/>
+          </a:fillRef>
+          <a:effectRef idx="0">
+            <a:schemeClr val="accent1"/>
+          </a:effectRef>
+          <a:fontRef idx="minor">
+            <a:schemeClr val="tx1"/>
+          </a:fontRef>
+        </p:style>
+      </p:cxnSp>
+      <p:cxnSp>
+        <p:nvCxnSpPr>
+          <p:cNvPr id="15" name="Straight Arrow Connector 14"/>
+          <p:cNvCxnSpPr/>
+          <p:nvPr/>
+        </p:nvCxnSpPr>
+        <p:spPr>
+          <a:xfrm>
+            <a:off x="5237018" y="2055871"/>
+            <a:ext cx="266007" cy="322846"/>
+          </a:xfrm>
+          <a:prstGeom prst="straightConnector1">
+            <a:avLst/>
+          </a:prstGeom>
+          <a:ln>
+            <a:tailEnd type="triangle"/>
+          </a:ln>
+        </p:spPr>
+        <p:style>
+          <a:lnRef idx="1">
+            <a:schemeClr val="accent1"/>
+          </a:lnRef>
+          <a:fillRef idx="0">
+            <a:schemeClr val="accent1"/>
+          </a:fillRef>
+          <a:effectRef idx="0">
+            <a:schemeClr val="accent1"/>
+          </a:effectRef>
+          <a:fontRef idx="minor">
+            <a:schemeClr val="tx1"/>
+          </a:fontRef>
+        </p:style>
+      </p:cxnSp>
     </p:spTree>
+    <p:extLst>
+      <p:ext uri="{BB962C8B-B14F-4D97-AF65-F5344CB8AC3E}">
+        <p14:creationId xmlns:p14="http://schemas.microsoft.com/office/powerpoint/2010/main" val="2037569847"/>
+      </p:ext>
+    </p:extLst>
   </p:cSld>
   <p:clrMapOvr>
     <a:masterClrMapping/>

</xml_diff>